<commit_message>
changes to format of analysis boxes
</commit_message>
<xml_diff>
--- a/Products/AW_fin.pptx
+++ b/Products/AW_fin.pptx
@@ -13,7 +13,6 @@
     <p:sldId id="269" r:id="rId7"/>
     <p:sldId id="271" r:id="rId8"/>
     <p:sldId id="270" r:id="rId9"/>
-    <p:sldId id="261" r:id="rId10"/>
   </p:sldIdLst>
   <p:sldSz cx="12192000" cy="6858000"/>
   <p:notesSz cx="6858000" cy="9144000"/>
@@ -267,7 +266,7 @@
           <a:p>
             <a:fld id="{F60B097C-15D3-4C10-907C-9D6BDD5AB733}" type="datetimeFigureOut">
               <a:rPr lang="en-US" smtClean="0"/>
-              <a:t>5/20/2019</a:t>
+              <a:t>5/22/2019</a:t>
             </a:fld>
             <a:endParaRPr lang="en-US"/>
           </a:p>
@@ -465,7 +464,7 @@
           <a:p>
             <a:fld id="{F60B097C-15D3-4C10-907C-9D6BDD5AB733}" type="datetimeFigureOut">
               <a:rPr lang="en-US" smtClean="0"/>
-              <a:t>5/20/2019</a:t>
+              <a:t>5/22/2019</a:t>
             </a:fld>
             <a:endParaRPr lang="en-US"/>
           </a:p>
@@ -673,7 +672,7 @@
           <a:p>
             <a:fld id="{F60B097C-15D3-4C10-907C-9D6BDD5AB733}" type="datetimeFigureOut">
               <a:rPr lang="en-US" smtClean="0"/>
-              <a:t>5/20/2019</a:t>
+              <a:t>5/22/2019</a:t>
             </a:fld>
             <a:endParaRPr lang="en-US"/>
           </a:p>
@@ -871,7 +870,7 @@
           <a:p>
             <a:fld id="{F60B097C-15D3-4C10-907C-9D6BDD5AB733}" type="datetimeFigureOut">
               <a:rPr lang="en-US" smtClean="0"/>
-              <a:t>5/20/2019</a:t>
+              <a:t>5/22/2019</a:t>
             </a:fld>
             <a:endParaRPr lang="en-US"/>
           </a:p>
@@ -1146,7 +1145,7 @@
           <a:p>
             <a:fld id="{F60B097C-15D3-4C10-907C-9D6BDD5AB733}" type="datetimeFigureOut">
               <a:rPr lang="en-US" smtClean="0"/>
-              <a:t>5/20/2019</a:t>
+              <a:t>5/22/2019</a:t>
             </a:fld>
             <a:endParaRPr lang="en-US"/>
           </a:p>
@@ -1411,7 +1410,7 @@
           <a:p>
             <a:fld id="{F60B097C-15D3-4C10-907C-9D6BDD5AB733}" type="datetimeFigureOut">
               <a:rPr lang="en-US" smtClean="0"/>
-              <a:t>5/20/2019</a:t>
+              <a:t>5/22/2019</a:t>
             </a:fld>
             <a:endParaRPr lang="en-US"/>
           </a:p>
@@ -1823,7 +1822,7 @@
           <a:p>
             <a:fld id="{F60B097C-15D3-4C10-907C-9D6BDD5AB733}" type="datetimeFigureOut">
               <a:rPr lang="en-US" smtClean="0"/>
-              <a:t>5/20/2019</a:t>
+              <a:t>5/22/2019</a:t>
             </a:fld>
             <a:endParaRPr lang="en-US"/>
           </a:p>
@@ -1964,7 +1963,7 @@
           <a:p>
             <a:fld id="{F60B097C-15D3-4C10-907C-9D6BDD5AB733}" type="datetimeFigureOut">
               <a:rPr lang="en-US" smtClean="0"/>
-              <a:t>5/20/2019</a:t>
+              <a:t>5/22/2019</a:t>
             </a:fld>
             <a:endParaRPr lang="en-US"/>
           </a:p>
@@ -2077,7 +2076,7 @@
           <a:p>
             <a:fld id="{F60B097C-15D3-4C10-907C-9D6BDD5AB733}" type="datetimeFigureOut">
               <a:rPr lang="en-US" smtClean="0"/>
-              <a:t>5/20/2019</a:t>
+              <a:t>5/22/2019</a:t>
             </a:fld>
             <a:endParaRPr lang="en-US"/>
           </a:p>
@@ -2388,7 +2387,7 @@
           <a:p>
             <a:fld id="{F60B097C-15D3-4C10-907C-9D6BDD5AB733}" type="datetimeFigureOut">
               <a:rPr lang="en-US" smtClean="0"/>
-              <a:t>5/20/2019</a:t>
+              <a:t>5/22/2019</a:t>
             </a:fld>
             <a:endParaRPr lang="en-US"/>
           </a:p>
@@ -2676,7 +2675,7 @@
           <a:p>
             <a:fld id="{F60B097C-15D3-4C10-907C-9D6BDD5AB733}" type="datetimeFigureOut">
               <a:rPr lang="en-US" smtClean="0"/>
-              <a:t>5/20/2019</a:t>
+              <a:t>5/22/2019</a:t>
             </a:fld>
             <a:endParaRPr lang="en-US"/>
           </a:p>
@@ -2917,7 +2916,7 @@
           <a:p>
             <a:fld id="{F60B097C-15D3-4C10-907C-9D6BDD5AB733}" type="datetimeFigureOut">
               <a:rPr lang="en-US" smtClean="0"/>
-              <a:t>5/20/2019</a:t>
+              <a:t>5/22/2019</a:t>
             </a:fld>
             <a:endParaRPr lang="en-US"/>
           </a:p>
@@ -9205,6 +9204,232 @@
           </a:p>
         </p:txBody>
       </p:sp>
+      <mc:AlternateContent xmlns:mc="http://schemas.openxmlformats.org/markup-compatibility/2006">
+        <mc:Choice xmlns:a14="http://schemas.microsoft.com/office/drawing/2010/main" Requires="a14">
+          <p:sp>
+            <p:nvSpPr>
+              <p:cNvPr id="2" name="TextBox 1">
+                <a:extLst>
+                  <a:ext uri="{FF2B5EF4-FFF2-40B4-BE49-F238E27FC236}">
+                    <a16:creationId xmlns:a16="http://schemas.microsoft.com/office/drawing/2014/main" id="{14086DAB-715F-4472-A179-C941C2F2049F}"/>
+                  </a:ext>
+                </a:extLst>
+              </p:cNvPr>
+              <p:cNvSpPr txBox="1"/>
+              <p:nvPr/>
+            </p:nvSpPr>
+            <p:spPr>
+              <a:xfrm>
+                <a:off x="6969416" y="4856159"/>
+                <a:ext cx="3778620" cy="646331"/>
+              </a:xfrm>
+              <a:prstGeom prst="rect">
+                <a:avLst/>
+              </a:prstGeom>
+              <a:noFill/>
+            </p:spPr>
+            <p:txBody>
+              <a:bodyPr wrap="square" rtlCol="0">
+                <a:spAutoFit/>
+              </a:bodyPr>
+              <a:lstStyle/>
+              <a:p>
+                <a14:m>
+                  <m:oMathPara xmlns:m="http://schemas.openxmlformats.org/officeDocument/2006/math">
+                    <m:oMathParaPr>
+                      <m:jc m:val="centerGroup"/>
+                    </m:oMathParaPr>
+                    <m:oMath xmlns:m="http://schemas.openxmlformats.org/officeDocument/2006/math">
+                      <m:r>
+                        <a:rPr lang="en-US" b="0" i="1" smtClean="0">
+                          <a:latin typeface="Cambria Math" panose="02040503050406030204" pitchFamily="18" charset="0"/>
+                        </a:rPr>
+                        <m:t>𝑓</m:t>
+                      </m:r>
+                      <m:d>
+                        <m:dPr>
+                          <m:ctrlPr>
+                            <a:rPr lang="en-US" b="0" i="1" smtClean="0">
+                              <a:latin typeface="Cambria Math" panose="02040503050406030204" pitchFamily="18" charset="0"/>
+                            </a:rPr>
+                          </m:ctrlPr>
+                        </m:dPr>
+                        <m:e>
+                          <m:r>
+                            <a:rPr lang="en-US" b="0" i="1" smtClean="0">
+                              <a:latin typeface="Cambria Math" panose="02040503050406030204" pitchFamily="18" charset="0"/>
+                            </a:rPr>
+                            <m:t>𝑠</m:t>
+                          </m:r>
+                          <m:r>
+                            <a:rPr lang="en-US" b="0" i="1" smtClean="0">
+                              <a:latin typeface="Cambria Math" panose="02040503050406030204" pitchFamily="18" charset="0"/>
+                            </a:rPr>
+                            <m:t>,</m:t>
+                          </m:r>
+                          <m:r>
+                            <a:rPr lang="en-US" b="0" i="1" smtClean="0">
+                              <a:latin typeface="Cambria Math" panose="02040503050406030204" pitchFamily="18" charset="0"/>
+                            </a:rPr>
+                            <m:t>𝑒</m:t>
+                          </m:r>
+                        </m:e>
+                      </m:d>
+                      <m:r>
+                        <a:rPr lang="en-US" b="0" i="1" smtClean="0">
+                          <a:latin typeface="Cambria Math" panose="02040503050406030204" pitchFamily="18" charset="0"/>
+                        </a:rPr>
+                        <m:t>&gt;0 ∀</m:t>
+                      </m:r>
+                      <m:r>
+                        <a:rPr lang="en-US" b="0" i="1" smtClean="0">
+                          <a:latin typeface="Cambria Math" panose="02040503050406030204" pitchFamily="18" charset="0"/>
+                        </a:rPr>
+                        <m:t>𝑠</m:t>
+                      </m:r>
+                      <m:r>
+                        <a:rPr lang="en-US" b="0" i="1" smtClean="0">
+                          <a:latin typeface="Cambria Math" panose="02040503050406030204" pitchFamily="18" charset="0"/>
+                        </a:rPr>
+                        <m:t>,</m:t>
+                      </m:r>
+                      <m:r>
+                        <a:rPr lang="en-US" b="0" i="1" smtClean="0">
+                          <a:latin typeface="Cambria Math" panose="02040503050406030204" pitchFamily="18" charset="0"/>
+                        </a:rPr>
+                        <m:t>𝑒</m:t>
+                      </m:r>
+                      <m:r>
+                        <a:rPr lang="en-US" b="0" i="1" smtClean="0">
+                          <a:latin typeface="Cambria Math" panose="02040503050406030204" pitchFamily="18" charset="0"/>
+                        </a:rPr>
+                        <m:t>&gt;0</m:t>
+                      </m:r>
+                    </m:oMath>
+                    <m:oMath xmlns:m="http://schemas.openxmlformats.org/officeDocument/2006/math">
+                      <m:r>
+                        <a:rPr lang="en-US" b="0" i="1" smtClean="0">
+                          <a:latin typeface="Cambria Math" panose="02040503050406030204" pitchFamily="18" charset="0"/>
+                        </a:rPr>
+                        <m:t>𝑓</m:t>
+                      </m:r>
+                      <m:d>
+                        <m:dPr>
+                          <m:ctrlPr>
+                            <a:rPr lang="en-US" b="0" i="1" smtClean="0">
+                              <a:latin typeface="Cambria Math" panose="02040503050406030204" pitchFamily="18" charset="0"/>
+                            </a:rPr>
+                          </m:ctrlPr>
+                        </m:dPr>
+                        <m:e>
+                          <m:r>
+                            <a:rPr lang="en-US" b="0" i="1" smtClean="0">
+                              <a:latin typeface="Cambria Math" panose="02040503050406030204" pitchFamily="18" charset="0"/>
+                            </a:rPr>
+                            <m:t>0,</m:t>
+                          </m:r>
+                          <m:r>
+                            <a:rPr lang="en-US" b="0" i="1" smtClean="0">
+                              <a:latin typeface="Cambria Math" panose="02040503050406030204" pitchFamily="18" charset="0"/>
+                            </a:rPr>
+                            <m:t>𝑒</m:t>
+                          </m:r>
+                        </m:e>
+                      </m:d>
+                      <m:r>
+                        <a:rPr lang="en-US" b="0" i="1" smtClean="0">
+                          <a:latin typeface="Cambria Math" panose="02040503050406030204" pitchFamily="18" charset="0"/>
+                        </a:rPr>
+                        <m:t>=</m:t>
+                      </m:r>
+                      <m:r>
+                        <a:rPr lang="en-US" b="0" i="1" smtClean="0">
+                          <a:latin typeface="Cambria Math" panose="02040503050406030204" pitchFamily="18" charset="0"/>
+                        </a:rPr>
+                        <m:t>𝑓</m:t>
+                      </m:r>
+                      <m:d>
+                        <m:dPr>
+                          <m:ctrlPr>
+                            <a:rPr lang="en-US" b="0" i="1" smtClean="0">
+                              <a:latin typeface="Cambria Math" panose="02040503050406030204" pitchFamily="18" charset="0"/>
+                            </a:rPr>
+                          </m:ctrlPr>
+                        </m:dPr>
+                        <m:e>
+                          <m:r>
+                            <a:rPr lang="en-US" b="0" i="1" smtClean="0">
+                              <a:latin typeface="Cambria Math" panose="02040503050406030204" pitchFamily="18" charset="0"/>
+                            </a:rPr>
+                            <m:t>𝑠</m:t>
+                          </m:r>
+                          <m:r>
+                            <a:rPr lang="en-US" b="0" i="1" smtClean="0">
+                              <a:latin typeface="Cambria Math" panose="02040503050406030204" pitchFamily="18" charset="0"/>
+                            </a:rPr>
+                            <m:t>,0</m:t>
+                          </m:r>
+                        </m:e>
+                      </m:d>
+                      <m:r>
+                        <a:rPr lang="en-US" b="0" i="1" smtClean="0">
+                          <a:latin typeface="Cambria Math" panose="02040503050406030204" pitchFamily="18" charset="0"/>
+                        </a:rPr>
+                        <m:t>=0</m:t>
+                      </m:r>
+                    </m:oMath>
+                  </m:oMathPara>
+                </a14:m>
+                <a:endParaRPr lang="en-US" dirty="0"/>
+              </a:p>
+            </p:txBody>
+          </p:sp>
+        </mc:Choice>
+        <mc:Fallback>
+          <p:sp>
+            <p:nvSpPr>
+              <p:cNvPr id="2" name="TextBox 1">
+                <a:extLst>
+                  <a:ext uri="{FF2B5EF4-FFF2-40B4-BE49-F238E27FC236}">
+                    <a16:creationId xmlns:a16="http://schemas.microsoft.com/office/drawing/2014/main" id="{14086DAB-715F-4472-A179-C941C2F2049F}"/>
+                  </a:ext>
+                </a:extLst>
+              </p:cNvPr>
+              <p:cNvSpPr txBox="1">
+                <a:spLocks noRot="1" noChangeAspect="1" noMove="1" noResize="1" noEditPoints="1" noAdjustHandles="1" noChangeArrowheads="1" noChangeShapeType="1" noTextEdit="1"/>
+              </p:cNvSpPr>
+              <p:nvPr/>
+            </p:nvSpPr>
+            <p:spPr>
+              <a:xfrm>
+                <a:off x="6969416" y="4856159"/>
+                <a:ext cx="3778620" cy="646331"/>
+              </a:xfrm>
+              <a:prstGeom prst="rect">
+                <a:avLst/>
+              </a:prstGeom>
+              <a:blipFill>
+                <a:blip r:embed="rId8"/>
+                <a:stretch>
+                  <a:fillRect b="-6604"/>
+                </a:stretch>
+              </a:blipFill>
+            </p:spPr>
+            <p:txBody>
+              <a:bodyPr/>
+              <a:lstStyle/>
+              <a:p>
+                <a:r>
+                  <a:rPr lang="en-US">
+                    <a:noFill/>
+                  </a:rPr>
+                  <a:t> </a:t>
+                </a:r>
+              </a:p>
+            </p:txBody>
+          </p:sp>
+        </mc:Fallback>
+      </mc:AlternateContent>
     </p:spTree>
     <p:extLst>
       <p:ext uri="{BB962C8B-B14F-4D97-AF65-F5344CB8AC3E}">
@@ -10298,8 +10523,8 @@
           </p:sp>
         </mc:Fallback>
       </mc:AlternateContent>
-      <mc:AlternateContent xmlns:mc="http://schemas.openxmlformats.org/markup-compatibility/2006" xmlns:a14="http://schemas.microsoft.com/office/drawing/2010/main">
-        <mc:Choice Requires="a14">
+      <mc:AlternateContent xmlns:mc="http://schemas.openxmlformats.org/markup-compatibility/2006">
+        <mc:Choice xmlns:a14="http://schemas.microsoft.com/office/drawing/2010/main" Requires="a14">
           <p:sp>
             <p:nvSpPr>
               <p:cNvPr id="23" name="TextBox 22">
@@ -10314,8 +10539,8 @@
             </p:nvSpPr>
             <p:spPr>
               <a:xfrm>
-                <a:off x="897911" y="3595561"/>
-                <a:ext cx="2975430" cy="1938992"/>
+                <a:off x="897910" y="3595561"/>
+                <a:ext cx="3768357" cy="1938992"/>
               </a:xfrm>
               <a:prstGeom prst="rect">
                 <a:avLst/>
@@ -10337,111 +10562,120 @@
                   <a:rPr lang="en-US" b="0" dirty="0">
                     <a:latin typeface="Cambria Math" panose="02040503050406030204" pitchFamily="18" charset="0"/>
                   </a:rPr>
-                  <a:t> Analysis says: </a:t>
+                  <a:t> Analysis says,  </a:t>
                 </a:r>
+                <a14:m>
+                  <m:oMath xmlns:m="http://schemas.openxmlformats.org/officeDocument/2006/math">
+                    <m:sSub>
+                      <m:sSubPr>
+                        <m:ctrlPr>
+                          <a:rPr lang="en-US" b="0" i="1" smtClean="0">
+                            <a:latin typeface="Cambria Math" panose="02040503050406030204" pitchFamily="18" charset="0"/>
+                          </a:rPr>
+                        </m:ctrlPr>
+                      </m:sSubPr>
+                      <m:e>
+                        <m:r>
+                          <a:rPr lang="en-US" b="0" i="1" smtClean="0">
+                            <a:latin typeface="Cambria Math" panose="02040503050406030204" pitchFamily="18" charset="0"/>
+                          </a:rPr>
+                          <m:t>𝑥</m:t>
+                        </m:r>
+                      </m:e>
+                      <m:sub>
+                        <m:r>
+                          <a:rPr lang="en-US" b="0" i="1" smtClean="0">
+                            <a:latin typeface="Cambria Math" panose="02040503050406030204" pitchFamily="18" charset="0"/>
+                          </a:rPr>
+                          <m:t>2</m:t>
+                        </m:r>
+                      </m:sub>
+                    </m:sSub>
+                    <m:r>
+                      <a:rPr lang="en-US" b="0" i="1" smtClean="0">
+                        <a:latin typeface="Cambria Math" panose="02040503050406030204" pitchFamily="18" charset="0"/>
+                      </a:rPr>
+                      <m:t>&gt;0, </m:t>
+                    </m:r>
+                    <m:sSub>
+                      <m:sSubPr>
+                        <m:ctrlPr>
+                          <a:rPr lang="en-US" b="0" i="1" smtClean="0">
+                            <a:latin typeface="Cambria Math" panose="02040503050406030204" pitchFamily="18" charset="0"/>
+                          </a:rPr>
+                        </m:ctrlPr>
+                      </m:sSubPr>
+                      <m:e>
+                        <m:r>
+                          <a:rPr lang="en-US" b="0" i="1" smtClean="0">
+                            <a:latin typeface="Cambria Math" panose="02040503050406030204" pitchFamily="18" charset="0"/>
+                          </a:rPr>
+                          <m:t>𝑥</m:t>
+                        </m:r>
+                      </m:e>
+                      <m:sub>
+                        <m:r>
+                          <a:rPr lang="en-US" b="0" i="1" smtClean="0">
+                            <a:latin typeface="Cambria Math" panose="02040503050406030204" pitchFamily="18" charset="0"/>
+                          </a:rPr>
+                          <m:t>1</m:t>
+                        </m:r>
+                      </m:sub>
+                    </m:sSub>
+                    <m:r>
+                      <a:rPr lang="en-US" b="0" i="1" smtClean="0">
+                        <a:latin typeface="Cambria Math" panose="02040503050406030204" pitchFamily="18" charset="0"/>
+                      </a:rPr>
+                      <m:t>=</m:t>
+                    </m:r>
+                    <m:sSub>
+                      <m:sSubPr>
+                        <m:ctrlPr>
+                          <a:rPr lang="en-US" b="0" i="1" smtClean="0">
+                            <a:latin typeface="Cambria Math" panose="02040503050406030204" pitchFamily="18" charset="0"/>
+                          </a:rPr>
+                        </m:ctrlPr>
+                      </m:sSubPr>
+                      <m:e>
+                        <m:r>
+                          <a:rPr lang="en-US" b="0" i="1" smtClean="0">
+                            <a:latin typeface="Cambria Math" panose="02040503050406030204" pitchFamily="18" charset="0"/>
+                          </a:rPr>
+                          <m:t>𝑥</m:t>
+                        </m:r>
+                      </m:e>
+                      <m:sub>
+                        <m:r>
+                          <a:rPr lang="en-US" b="0" i="1" smtClean="0">
+                            <a:latin typeface="Cambria Math" panose="02040503050406030204" pitchFamily="18" charset="0"/>
+                          </a:rPr>
+                          <m:t>3</m:t>
+                        </m:r>
+                      </m:sub>
+                    </m:sSub>
+                    <m:r>
+                      <a:rPr lang="en-US" b="0" i="1" smtClean="0">
+                        <a:latin typeface="Cambria Math" panose="02040503050406030204" pitchFamily="18" charset="0"/>
+                      </a:rPr>
+                      <m:t>=0:</m:t>
+                    </m:r>
+                  </m:oMath>
+                </a14:m>
+                <a:br>
+                  <a:rPr lang="en-US" b="0" i="1" dirty="0">
+                    <a:latin typeface="Cambria Math" panose="02040503050406030204" pitchFamily="18" charset="0"/>
+                  </a:rPr>
+                </a:br>
+                <a:endParaRPr lang="en-US" b="0" i="1" dirty="0">
+                  <a:latin typeface="Cambria Math" panose="02040503050406030204" pitchFamily="18" charset="0"/>
+                </a:endParaRPr>
               </a:p>
               <a:p>
-                <a:pPr/>
                 <a14:m>
                   <m:oMathPara xmlns:m="http://schemas.openxmlformats.org/officeDocument/2006/math">
                     <m:oMathParaPr>
                       <m:jc m:val="centerGroup"/>
                     </m:oMathParaPr>
-                    <m:oMath xmlns:m="http://schemas.openxmlformats.org/officeDocument/2006/math">
-                      <m:sSub>
-                        <m:sSubPr>
-                          <m:ctrlPr>
-                            <a:rPr lang="en-US" b="0" i="1" smtClean="0">
-                              <a:latin typeface="Cambria Math" panose="02040503050406030204" pitchFamily="18" charset="0"/>
-                            </a:rPr>
-                          </m:ctrlPr>
-                        </m:sSubPr>
-                        <m:e>
-                          <m:r>
-                            <a:rPr lang="en-US" b="0" i="1" smtClean="0">
-                              <a:latin typeface="Cambria Math" panose="02040503050406030204" pitchFamily="18" charset="0"/>
-                            </a:rPr>
-                            <m:t>𝑥</m:t>
-                          </m:r>
-                        </m:e>
-                        <m:sub>
-                          <m:r>
-                            <a:rPr lang="en-US" b="0" i="1" smtClean="0">
-                              <a:latin typeface="Cambria Math" panose="02040503050406030204" pitchFamily="18" charset="0"/>
-                            </a:rPr>
-                            <m:t>2</m:t>
-                          </m:r>
-                        </m:sub>
-                      </m:sSub>
-                      <m:r>
-                        <a:rPr lang="en-US" b="0" i="1" smtClean="0">
-                          <a:latin typeface="Cambria Math" panose="02040503050406030204" pitchFamily="18" charset="0"/>
-                        </a:rPr>
-                        <m:t>&gt;0, </m:t>
-                      </m:r>
-                      <m:sSub>
-                        <m:sSubPr>
-                          <m:ctrlPr>
-                            <a:rPr lang="en-US" b="0" i="1" smtClean="0">
-                              <a:latin typeface="Cambria Math" panose="02040503050406030204" pitchFamily="18" charset="0"/>
-                            </a:rPr>
-                          </m:ctrlPr>
-                        </m:sSubPr>
-                        <m:e>
-                          <m:r>
-                            <a:rPr lang="en-US" b="0" i="1" smtClean="0">
-                              <a:latin typeface="Cambria Math" panose="02040503050406030204" pitchFamily="18" charset="0"/>
-                            </a:rPr>
-                            <m:t>𝑥</m:t>
-                          </m:r>
-                        </m:e>
-                        <m:sub>
-                          <m:r>
-                            <a:rPr lang="en-US" b="0" i="1" smtClean="0">
-                              <a:latin typeface="Cambria Math" panose="02040503050406030204" pitchFamily="18" charset="0"/>
-                            </a:rPr>
-                            <m:t>1</m:t>
-                          </m:r>
-                        </m:sub>
-                      </m:sSub>
-                      <m:r>
-                        <a:rPr lang="en-US" b="0" i="1" smtClean="0">
-                          <a:latin typeface="Cambria Math" panose="02040503050406030204" pitchFamily="18" charset="0"/>
-                        </a:rPr>
-                        <m:t>=</m:t>
-                      </m:r>
-                      <m:sSub>
-                        <m:sSubPr>
-                          <m:ctrlPr>
-                            <a:rPr lang="en-US" b="0" i="1" smtClean="0">
-                              <a:latin typeface="Cambria Math" panose="02040503050406030204" pitchFamily="18" charset="0"/>
-                            </a:rPr>
-                          </m:ctrlPr>
-                        </m:sSubPr>
-                        <m:e>
-                          <m:r>
-                            <a:rPr lang="en-US" b="0" i="1" smtClean="0">
-                              <a:latin typeface="Cambria Math" panose="02040503050406030204" pitchFamily="18" charset="0"/>
-                            </a:rPr>
-                            <m:t>𝑥</m:t>
-                          </m:r>
-                        </m:e>
-                        <m:sub>
-                          <m:r>
-                            <a:rPr lang="en-US" b="0" i="1" smtClean="0">
-                              <a:latin typeface="Cambria Math" panose="02040503050406030204" pitchFamily="18" charset="0"/>
-                            </a:rPr>
-                            <m:t>3</m:t>
-                          </m:r>
-                        </m:sub>
-                      </m:sSub>
-                      <m:r>
-                        <a:rPr lang="en-US" b="0" i="1" smtClean="0">
-                          <a:latin typeface="Cambria Math" panose="02040503050406030204" pitchFamily="18" charset="0"/>
-                        </a:rPr>
-                        <m:t>=0:</m:t>
-                      </m:r>
-                    </m:oMath>
                     <m:oMath xmlns:m="http://schemas.openxmlformats.org/officeDocument/2006/math">
                       <m:sSub>
                         <m:sSubPr>
@@ -10555,7 +10789,7 @@
             </p:txBody>
           </p:sp>
         </mc:Choice>
-        <mc:Fallback xmlns="">
+        <mc:Fallback>
           <p:sp>
             <p:nvSpPr>
               <p:cNvPr id="23" name="TextBox 22">
@@ -10572,8 +10806,8 @@
             </p:nvSpPr>
             <p:spPr>
               <a:xfrm>
-                <a:off x="897911" y="3595561"/>
-                <a:ext cx="2975430" cy="1938992"/>
+                <a:off x="897910" y="3595561"/>
+                <a:ext cx="3768357" cy="1938992"/>
               </a:xfrm>
               <a:prstGeom prst="rect">
                 <a:avLst/>
@@ -10581,7 +10815,7 @@
               <a:blipFill>
                 <a:blip r:embed="rId6"/>
                 <a:stretch>
-                  <a:fillRect l="-2857" t="-4063" b="-5938"/>
+                  <a:fillRect l="-2258" t="-4063" b="-5938"/>
                 </a:stretch>
               </a:blipFill>
               <a:ln>
@@ -10704,8 +10938,8 @@
           </a:p>
         </p:txBody>
       </p:sp>
-      <mc:AlternateContent xmlns:mc="http://schemas.openxmlformats.org/markup-compatibility/2006" xmlns:a14="http://schemas.microsoft.com/office/drawing/2010/main">
-        <mc:Choice Requires="a14">
+      <mc:AlternateContent xmlns:mc="http://schemas.openxmlformats.org/markup-compatibility/2006">
+        <mc:Choice xmlns:a14="http://schemas.microsoft.com/office/drawing/2010/main" Requires="a14">
           <p:sp>
             <p:nvSpPr>
               <p:cNvPr id="23" name="TextBox 22">
@@ -10721,7 +10955,7 @@
             <p:spPr>
               <a:xfrm>
                 <a:off x="897911" y="3595561"/>
-                <a:ext cx="2975430" cy="1938992"/>
+                <a:ext cx="3711796" cy="1938992"/>
               </a:xfrm>
               <a:prstGeom prst="rect">
                 <a:avLst/>
@@ -10743,111 +10977,120 @@
                   <a:rPr lang="en-US" b="0" dirty="0">
                     <a:latin typeface="Cambria Math" panose="02040503050406030204" pitchFamily="18" charset="0"/>
                   </a:rPr>
-                  <a:t> Analysis says: </a:t>
+                  <a:t> Analysis says, </a:t>
                 </a:r>
+                <a14:m>
+                  <m:oMath xmlns:m="http://schemas.openxmlformats.org/officeDocument/2006/math">
+                    <m:sSub>
+                      <m:sSubPr>
+                        <m:ctrlPr>
+                          <a:rPr lang="en-US" b="0" i="1" smtClean="0">
+                            <a:latin typeface="Cambria Math" panose="02040503050406030204" pitchFamily="18" charset="0"/>
+                          </a:rPr>
+                        </m:ctrlPr>
+                      </m:sSubPr>
+                      <m:e>
+                        <m:r>
+                          <a:rPr lang="en-US" b="0" i="1" smtClean="0">
+                            <a:latin typeface="Cambria Math" panose="02040503050406030204" pitchFamily="18" charset="0"/>
+                          </a:rPr>
+                          <m:t>𝑥</m:t>
+                        </m:r>
+                      </m:e>
+                      <m:sub>
+                        <m:r>
+                          <a:rPr lang="en-US" b="0" i="1" smtClean="0">
+                            <a:latin typeface="Cambria Math" panose="02040503050406030204" pitchFamily="18" charset="0"/>
+                          </a:rPr>
+                          <m:t>3</m:t>
+                        </m:r>
+                      </m:sub>
+                    </m:sSub>
+                    <m:r>
+                      <a:rPr lang="en-US" b="0" i="1" smtClean="0">
+                        <a:latin typeface="Cambria Math" panose="02040503050406030204" pitchFamily="18" charset="0"/>
+                      </a:rPr>
+                      <m:t>&gt;0, </m:t>
+                    </m:r>
+                    <m:sSub>
+                      <m:sSubPr>
+                        <m:ctrlPr>
+                          <a:rPr lang="en-US" b="0" i="1" smtClean="0">
+                            <a:latin typeface="Cambria Math" panose="02040503050406030204" pitchFamily="18" charset="0"/>
+                          </a:rPr>
+                        </m:ctrlPr>
+                      </m:sSubPr>
+                      <m:e>
+                        <m:r>
+                          <a:rPr lang="en-US" b="0" i="1" smtClean="0">
+                            <a:latin typeface="Cambria Math" panose="02040503050406030204" pitchFamily="18" charset="0"/>
+                          </a:rPr>
+                          <m:t>𝑥</m:t>
+                        </m:r>
+                      </m:e>
+                      <m:sub>
+                        <m:r>
+                          <a:rPr lang="en-US" b="0" i="1" smtClean="0">
+                            <a:latin typeface="Cambria Math" panose="02040503050406030204" pitchFamily="18" charset="0"/>
+                          </a:rPr>
+                          <m:t>1</m:t>
+                        </m:r>
+                      </m:sub>
+                    </m:sSub>
+                    <m:r>
+                      <a:rPr lang="en-US" b="0" i="1" smtClean="0">
+                        <a:latin typeface="Cambria Math" panose="02040503050406030204" pitchFamily="18" charset="0"/>
+                      </a:rPr>
+                      <m:t>=</m:t>
+                    </m:r>
+                    <m:sSub>
+                      <m:sSubPr>
+                        <m:ctrlPr>
+                          <a:rPr lang="en-US" b="0" i="1" smtClean="0">
+                            <a:latin typeface="Cambria Math" panose="02040503050406030204" pitchFamily="18" charset="0"/>
+                          </a:rPr>
+                        </m:ctrlPr>
+                      </m:sSubPr>
+                      <m:e>
+                        <m:r>
+                          <a:rPr lang="en-US" b="0" i="1" smtClean="0">
+                            <a:latin typeface="Cambria Math" panose="02040503050406030204" pitchFamily="18" charset="0"/>
+                          </a:rPr>
+                          <m:t>𝑥</m:t>
+                        </m:r>
+                      </m:e>
+                      <m:sub>
+                        <m:r>
+                          <a:rPr lang="en-US" b="0" i="1" smtClean="0">
+                            <a:latin typeface="Cambria Math" panose="02040503050406030204" pitchFamily="18" charset="0"/>
+                          </a:rPr>
+                          <m:t>2</m:t>
+                        </m:r>
+                      </m:sub>
+                    </m:sSub>
+                    <m:r>
+                      <a:rPr lang="en-US" b="0" i="1" smtClean="0">
+                        <a:latin typeface="Cambria Math" panose="02040503050406030204" pitchFamily="18" charset="0"/>
+                      </a:rPr>
+                      <m:t>=0:</m:t>
+                    </m:r>
+                  </m:oMath>
+                </a14:m>
+                <a:br>
+                  <a:rPr lang="en-US" b="0" i="1" dirty="0">
+                    <a:latin typeface="Cambria Math" panose="02040503050406030204" pitchFamily="18" charset="0"/>
+                  </a:rPr>
+                </a:br>
+                <a:endParaRPr lang="en-US" b="0" i="1" dirty="0">
+                  <a:latin typeface="Cambria Math" panose="02040503050406030204" pitchFamily="18" charset="0"/>
+                </a:endParaRPr>
               </a:p>
               <a:p>
-                <a:pPr/>
                 <a14:m>
                   <m:oMathPara xmlns:m="http://schemas.openxmlformats.org/officeDocument/2006/math">
                     <m:oMathParaPr>
                       <m:jc m:val="centerGroup"/>
                     </m:oMathParaPr>
-                    <m:oMath xmlns:m="http://schemas.openxmlformats.org/officeDocument/2006/math">
-                      <m:sSub>
-                        <m:sSubPr>
-                          <m:ctrlPr>
-                            <a:rPr lang="en-US" b="0" i="1" smtClean="0">
-                              <a:latin typeface="Cambria Math" panose="02040503050406030204" pitchFamily="18" charset="0"/>
-                            </a:rPr>
-                          </m:ctrlPr>
-                        </m:sSubPr>
-                        <m:e>
-                          <m:r>
-                            <a:rPr lang="en-US" b="0" i="1" smtClean="0">
-                              <a:latin typeface="Cambria Math" panose="02040503050406030204" pitchFamily="18" charset="0"/>
-                            </a:rPr>
-                            <m:t>𝑥</m:t>
-                          </m:r>
-                        </m:e>
-                        <m:sub>
-                          <m:r>
-                            <a:rPr lang="en-US" b="0" i="1" smtClean="0">
-                              <a:latin typeface="Cambria Math" panose="02040503050406030204" pitchFamily="18" charset="0"/>
-                            </a:rPr>
-                            <m:t>3</m:t>
-                          </m:r>
-                        </m:sub>
-                      </m:sSub>
-                      <m:r>
-                        <a:rPr lang="en-US" b="0" i="1" smtClean="0">
-                          <a:latin typeface="Cambria Math" panose="02040503050406030204" pitchFamily="18" charset="0"/>
-                        </a:rPr>
-                        <m:t>&gt;0, </m:t>
-                      </m:r>
-                      <m:sSub>
-                        <m:sSubPr>
-                          <m:ctrlPr>
-                            <a:rPr lang="en-US" b="0" i="1" smtClean="0">
-                              <a:latin typeface="Cambria Math" panose="02040503050406030204" pitchFamily="18" charset="0"/>
-                            </a:rPr>
-                          </m:ctrlPr>
-                        </m:sSubPr>
-                        <m:e>
-                          <m:r>
-                            <a:rPr lang="en-US" b="0" i="1" smtClean="0">
-                              <a:latin typeface="Cambria Math" panose="02040503050406030204" pitchFamily="18" charset="0"/>
-                            </a:rPr>
-                            <m:t>𝑥</m:t>
-                          </m:r>
-                        </m:e>
-                        <m:sub>
-                          <m:r>
-                            <a:rPr lang="en-US" b="0" i="1" smtClean="0">
-                              <a:latin typeface="Cambria Math" panose="02040503050406030204" pitchFamily="18" charset="0"/>
-                            </a:rPr>
-                            <m:t>1</m:t>
-                          </m:r>
-                        </m:sub>
-                      </m:sSub>
-                      <m:r>
-                        <a:rPr lang="en-US" b="0" i="1" smtClean="0">
-                          <a:latin typeface="Cambria Math" panose="02040503050406030204" pitchFamily="18" charset="0"/>
-                        </a:rPr>
-                        <m:t>=</m:t>
-                      </m:r>
-                      <m:sSub>
-                        <m:sSubPr>
-                          <m:ctrlPr>
-                            <a:rPr lang="en-US" b="0" i="1" smtClean="0">
-                              <a:latin typeface="Cambria Math" panose="02040503050406030204" pitchFamily="18" charset="0"/>
-                            </a:rPr>
-                          </m:ctrlPr>
-                        </m:sSubPr>
-                        <m:e>
-                          <m:r>
-                            <a:rPr lang="en-US" b="0" i="1" smtClean="0">
-                              <a:latin typeface="Cambria Math" panose="02040503050406030204" pitchFamily="18" charset="0"/>
-                            </a:rPr>
-                            <m:t>𝑥</m:t>
-                          </m:r>
-                        </m:e>
-                        <m:sub>
-                          <m:r>
-                            <a:rPr lang="en-US" b="0" i="1" smtClean="0">
-                              <a:latin typeface="Cambria Math" panose="02040503050406030204" pitchFamily="18" charset="0"/>
-                            </a:rPr>
-                            <m:t>2</m:t>
-                          </m:r>
-                        </m:sub>
-                      </m:sSub>
-                      <m:r>
-                        <a:rPr lang="en-US" b="0" i="1" smtClean="0">
-                          <a:latin typeface="Cambria Math" panose="02040503050406030204" pitchFamily="18" charset="0"/>
-                        </a:rPr>
-                        <m:t>=0:</m:t>
-                      </m:r>
-                    </m:oMath>
                     <m:oMath xmlns:m="http://schemas.openxmlformats.org/officeDocument/2006/math">
                       <m:sSub>
                         <m:sSubPr>
@@ -10961,7 +11204,7 @@
             </p:txBody>
           </p:sp>
         </mc:Choice>
-        <mc:Fallback xmlns="">
+        <mc:Fallback>
           <p:sp>
             <p:nvSpPr>
               <p:cNvPr id="23" name="TextBox 22">
@@ -10979,7 +11222,7 @@
             <p:spPr>
               <a:xfrm>
                 <a:off x="897911" y="3595561"/>
-                <a:ext cx="2975430" cy="1938992"/>
+                <a:ext cx="3711796" cy="1938992"/>
               </a:xfrm>
               <a:prstGeom prst="rect">
                 <a:avLst/>
@@ -10987,7 +11230,7 @@
               <a:blipFill>
                 <a:blip r:embed="rId2"/>
                 <a:stretch>
-                  <a:fillRect l="-2857" t="-4063" b="-5938"/>
+                  <a:fillRect l="-2291" t="-4063" b="-5938"/>
                 </a:stretch>
               </a:blipFill>
               <a:ln>
@@ -11970,8 +12213,8 @@
           </a:p>
         </p:txBody>
       </p:sp>
-      <mc:AlternateContent xmlns:mc="http://schemas.openxmlformats.org/markup-compatibility/2006" xmlns:a14="http://schemas.microsoft.com/office/drawing/2010/main">
-        <mc:Choice Requires="a14">
+      <mc:AlternateContent xmlns:mc="http://schemas.openxmlformats.org/markup-compatibility/2006">
+        <mc:Choice xmlns:a14="http://schemas.microsoft.com/office/drawing/2010/main" Requires="a14">
           <p:sp>
             <p:nvSpPr>
               <p:cNvPr id="23" name="TextBox 22">
@@ -11986,8 +12229,8 @@
             </p:nvSpPr>
             <p:spPr>
               <a:xfrm>
-                <a:off x="924051" y="4069387"/>
-                <a:ext cx="2975430" cy="2093778"/>
+                <a:off x="433633" y="4069387"/>
+                <a:ext cx="3465848" cy="2093778"/>
               </a:xfrm>
               <a:prstGeom prst="rect">
                 <a:avLst/>
@@ -12009,112 +12252,104 @@
                   <a:rPr lang="en-US" b="0" dirty="0">
                     <a:latin typeface="Cambria Math" panose="02040503050406030204" pitchFamily="18" charset="0"/>
                   </a:rPr>
-                  <a:t> Analysis says: </a:t>
+                  <a:t> Analysis says, </a:t>
                 </a:r>
-              </a:p>
-              <a:p>
-                <a:pPr/>
                 <a14:m>
-                  <m:oMathPara xmlns:m="http://schemas.openxmlformats.org/officeDocument/2006/math">
-                    <m:oMathParaPr>
-                      <m:jc m:val="centerGroup"/>
-                    </m:oMathParaPr>
-                    <m:oMath xmlns:m="http://schemas.openxmlformats.org/officeDocument/2006/math">
-                      <m:sSub>
-                        <m:sSubPr>
-                          <m:ctrlPr>
-                            <a:rPr lang="en-US" b="0" i="1" smtClean="0">
-                              <a:latin typeface="Cambria Math" panose="02040503050406030204" pitchFamily="18" charset="0"/>
-                            </a:rPr>
-                          </m:ctrlPr>
-                        </m:sSubPr>
-                        <m:e>
-                          <m:r>
-                            <a:rPr lang="en-US" b="0" i="1" smtClean="0">
-                              <a:latin typeface="Cambria Math" panose="02040503050406030204" pitchFamily="18" charset="0"/>
-                            </a:rPr>
-                            <m:t>𝑥</m:t>
-                          </m:r>
-                        </m:e>
-                        <m:sub>
-                          <m:r>
-                            <a:rPr lang="en-US" b="0" i="1" smtClean="0">
-                              <a:latin typeface="Cambria Math" panose="02040503050406030204" pitchFamily="18" charset="0"/>
-                            </a:rPr>
-                            <m:t>1</m:t>
-                          </m:r>
-                        </m:sub>
-                      </m:sSub>
-                      <m:r>
-                        <a:rPr lang="en-US" b="0" i="1" smtClean="0">
-                          <a:latin typeface="Cambria Math" panose="02040503050406030204" pitchFamily="18" charset="0"/>
-                        </a:rPr>
-                        <m:t>&gt;0, </m:t>
-                      </m:r>
-                      <m:sSub>
-                        <m:sSubPr>
-                          <m:ctrlPr>
-                            <a:rPr lang="en-US" b="0" i="1" smtClean="0">
-                              <a:latin typeface="Cambria Math" panose="02040503050406030204" pitchFamily="18" charset="0"/>
-                            </a:rPr>
-                          </m:ctrlPr>
-                        </m:sSubPr>
-                        <m:e>
-                          <m:r>
-                            <a:rPr lang="en-US" b="0" i="1" smtClean="0">
-                              <a:latin typeface="Cambria Math" panose="02040503050406030204" pitchFamily="18" charset="0"/>
-                            </a:rPr>
-                            <m:t>𝑥</m:t>
-                          </m:r>
-                        </m:e>
-                        <m:sub>
-                          <m:r>
-                            <a:rPr lang="en-US" b="0" i="1" smtClean="0">
-                              <a:latin typeface="Cambria Math" panose="02040503050406030204" pitchFamily="18" charset="0"/>
-                            </a:rPr>
-                            <m:t>2</m:t>
-                          </m:r>
-                        </m:sub>
-                      </m:sSub>
-                      <m:r>
-                        <a:rPr lang="en-US" b="0" i="1" smtClean="0">
-                          <a:latin typeface="Cambria Math" panose="02040503050406030204" pitchFamily="18" charset="0"/>
-                        </a:rPr>
-                        <m:t>=</m:t>
-                      </m:r>
-                      <m:sSub>
-                        <m:sSubPr>
-                          <m:ctrlPr>
-                            <a:rPr lang="en-US" b="0" i="1" smtClean="0">
-                              <a:latin typeface="Cambria Math" panose="02040503050406030204" pitchFamily="18" charset="0"/>
-                            </a:rPr>
-                          </m:ctrlPr>
-                        </m:sSubPr>
-                        <m:e>
-                          <m:r>
-                            <a:rPr lang="en-US" b="0" i="1" smtClean="0">
-                              <a:latin typeface="Cambria Math" panose="02040503050406030204" pitchFamily="18" charset="0"/>
-                            </a:rPr>
-                            <m:t>𝑥</m:t>
-                          </m:r>
-                        </m:e>
-                        <m:sub>
-                          <m:r>
-                            <a:rPr lang="en-US" b="0" i="1" smtClean="0">
-                              <a:latin typeface="Cambria Math" panose="02040503050406030204" pitchFamily="18" charset="0"/>
-                            </a:rPr>
-                            <m:t>3</m:t>
-                          </m:r>
-                        </m:sub>
-                      </m:sSub>
-                      <m:r>
-                        <a:rPr lang="en-US" b="0" i="1" smtClean="0">
-                          <a:latin typeface="Cambria Math" panose="02040503050406030204" pitchFamily="18" charset="0"/>
-                        </a:rPr>
-                        <m:t>=0:</m:t>
-                      </m:r>
-                    </m:oMath>
-                  </m:oMathPara>
+                  <m:oMath xmlns:m="http://schemas.openxmlformats.org/officeDocument/2006/math">
+                    <m:sSub>
+                      <m:sSubPr>
+                        <m:ctrlPr>
+                          <a:rPr lang="en-US" b="0" i="1" smtClean="0">
+                            <a:latin typeface="Cambria Math" panose="02040503050406030204" pitchFamily="18" charset="0"/>
+                          </a:rPr>
+                        </m:ctrlPr>
+                      </m:sSubPr>
+                      <m:e>
+                        <m:r>
+                          <a:rPr lang="en-US" b="0" i="1" smtClean="0">
+                            <a:latin typeface="Cambria Math" panose="02040503050406030204" pitchFamily="18" charset="0"/>
+                          </a:rPr>
+                          <m:t>𝑥</m:t>
+                        </m:r>
+                      </m:e>
+                      <m:sub>
+                        <m:r>
+                          <a:rPr lang="en-US" b="0" i="1" smtClean="0">
+                            <a:latin typeface="Cambria Math" panose="02040503050406030204" pitchFamily="18" charset="0"/>
+                          </a:rPr>
+                          <m:t>1</m:t>
+                        </m:r>
+                      </m:sub>
+                    </m:sSub>
+                    <m:r>
+                      <a:rPr lang="en-US" b="0" i="1" smtClean="0">
+                        <a:latin typeface="Cambria Math" panose="02040503050406030204" pitchFamily="18" charset="0"/>
+                      </a:rPr>
+                      <m:t>&gt;0, </m:t>
+                    </m:r>
+                    <m:sSub>
+                      <m:sSubPr>
+                        <m:ctrlPr>
+                          <a:rPr lang="en-US" b="0" i="1" smtClean="0">
+                            <a:latin typeface="Cambria Math" panose="02040503050406030204" pitchFamily="18" charset="0"/>
+                          </a:rPr>
+                        </m:ctrlPr>
+                      </m:sSubPr>
+                      <m:e>
+                        <m:r>
+                          <a:rPr lang="en-US" b="0" i="1" smtClean="0">
+                            <a:latin typeface="Cambria Math" panose="02040503050406030204" pitchFamily="18" charset="0"/>
+                          </a:rPr>
+                          <m:t>𝑥</m:t>
+                        </m:r>
+                      </m:e>
+                      <m:sub>
+                        <m:r>
+                          <a:rPr lang="en-US" b="0" i="1" smtClean="0">
+                            <a:latin typeface="Cambria Math" panose="02040503050406030204" pitchFamily="18" charset="0"/>
+                          </a:rPr>
+                          <m:t>2</m:t>
+                        </m:r>
+                      </m:sub>
+                    </m:sSub>
+                    <m:r>
+                      <a:rPr lang="en-US" b="0" i="1" smtClean="0">
+                        <a:latin typeface="Cambria Math" panose="02040503050406030204" pitchFamily="18" charset="0"/>
+                      </a:rPr>
+                      <m:t>=</m:t>
+                    </m:r>
+                    <m:sSub>
+                      <m:sSubPr>
+                        <m:ctrlPr>
+                          <a:rPr lang="en-US" b="0" i="1" smtClean="0">
+                            <a:latin typeface="Cambria Math" panose="02040503050406030204" pitchFamily="18" charset="0"/>
+                          </a:rPr>
+                        </m:ctrlPr>
+                      </m:sSubPr>
+                      <m:e>
+                        <m:r>
+                          <a:rPr lang="en-US" b="0" i="1" smtClean="0">
+                            <a:latin typeface="Cambria Math" panose="02040503050406030204" pitchFamily="18" charset="0"/>
+                          </a:rPr>
+                          <m:t>𝑥</m:t>
+                        </m:r>
+                      </m:e>
+                      <m:sub>
+                        <m:r>
+                          <a:rPr lang="en-US" b="0" i="1" smtClean="0">
+                            <a:latin typeface="Cambria Math" panose="02040503050406030204" pitchFamily="18" charset="0"/>
+                          </a:rPr>
+                          <m:t>3</m:t>
+                        </m:r>
+                      </m:sub>
+                    </m:sSub>
+                    <m:r>
+                      <a:rPr lang="en-US" b="0" i="1" smtClean="0">
+                        <a:latin typeface="Cambria Math" panose="02040503050406030204" pitchFamily="18" charset="0"/>
+                      </a:rPr>
+                      <m:t>=0:</m:t>
+                    </m:r>
+                  </m:oMath>
                 </a14:m>
                 <a:br>
                   <a:rPr lang="en-US" b="0" dirty="0"/>
@@ -12124,7 +12359,7 @@
                 </a:br>
                 <a:r>
                   <a:rPr lang="en-US" b="0" dirty="0"/>
-                  <a:t> if</a:t>
+                  <a:t> If</a:t>
                 </a:r>
                 <a14:m>
                   <m:oMath xmlns:m="http://schemas.openxmlformats.org/officeDocument/2006/math">
@@ -12236,15 +12471,28 @@
                 </a:br>
                 <a:r>
                   <a:rPr lang="en-US" b="0" dirty="0"/>
-                  <a:t> small, there will be two steady</a:t>
+                  <a:t> small, there will be two stable and  </a:t>
                 </a:r>
-                <a:br>
-                  <a:rPr lang="en-US" b="0" dirty="0"/>
-                </a:br>
+              </a:p>
+              <a:p>
+                <a:r>
+                  <a:rPr lang="en-US" dirty="0"/>
+                  <a:t> </a:t>
+                </a:r>
                 <a:r>
                   <a:rPr lang="en-US" b="0" dirty="0"/>
-                  <a:t> state solutions.   </a:t>
+                  <a:t>one unstable</a:t>
                 </a:r>
+                <a:r>
+                  <a:rPr lang="en-US" dirty="0"/>
+                  <a:t> </a:t>
+                </a:r>
+                <a:r>
+                  <a:rPr lang="en-US" b="0" dirty="0"/>
+                  <a:t>steady state solutions.   </a:t>
+                </a:r>
+              </a:p>
+              <a:p>
                 <a:br>
                   <a:rPr lang="en-US" b="0" dirty="0"/>
                 </a:br>
@@ -12256,7 +12504,7 @@
             </p:txBody>
           </p:sp>
         </mc:Choice>
-        <mc:Fallback xmlns="">
+        <mc:Fallback>
           <p:sp>
             <p:nvSpPr>
               <p:cNvPr id="23" name="TextBox 22">
@@ -12273,8 +12521,8 @@
             </p:nvSpPr>
             <p:spPr>
               <a:xfrm>
-                <a:off x="924051" y="4069387"/>
-                <a:ext cx="2975430" cy="2093778"/>
+                <a:off x="433633" y="4069387"/>
+                <a:ext cx="3465848" cy="2093778"/>
               </a:xfrm>
               <a:prstGeom prst="rect">
                 <a:avLst/>
@@ -12282,7 +12530,7 @@
               <a:blipFill>
                 <a:blip r:embed="rId2"/>
                 <a:stretch>
-                  <a:fillRect l="-3061" t="-3768" r="-1837" b="-5507"/>
+                  <a:fillRect l="-2452" t="-4058" r="-5954" b="-5507"/>
                 </a:stretch>
               </a:blipFill>
               <a:ln>
@@ -14907,8 +15155,8 @@
           </p:sp>
         </mc:Fallback>
       </mc:AlternateContent>
-      <mc:AlternateContent xmlns:mc="http://schemas.openxmlformats.org/markup-compatibility/2006" xmlns:a14="http://schemas.microsoft.com/office/drawing/2010/main">
-        <mc:Choice Requires="a14">
+      <mc:AlternateContent xmlns:mc="http://schemas.openxmlformats.org/markup-compatibility/2006">
+        <mc:Choice xmlns:a14="http://schemas.microsoft.com/office/drawing/2010/main" Requires="a14">
           <p:sp>
             <p:nvSpPr>
               <p:cNvPr id="28" name="TextBox 27">
@@ -14924,7 +15172,7 @@
             <p:spPr>
               <a:xfrm>
                 <a:off x="897911" y="3595561"/>
-                <a:ext cx="2975430" cy="1938992"/>
+                <a:ext cx="3457482" cy="1938992"/>
               </a:xfrm>
               <a:prstGeom prst="rect">
                 <a:avLst/>
@@ -14946,111 +15194,120 @@
                   <a:rPr lang="en-US" b="0" dirty="0">
                     <a:latin typeface="Cambria Math" panose="02040503050406030204" pitchFamily="18" charset="0"/>
                   </a:rPr>
-                  <a:t> Analysis says: </a:t>
+                  <a:t> Analysis says, </a:t>
                 </a:r>
+                <a14:m>
+                  <m:oMath xmlns:m="http://schemas.openxmlformats.org/officeDocument/2006/math">
+                    <m:sSub>
+                      <m:sSubPr>
+                        <m:ctrlPr>
+                          <a:rPr lang="en-US" b="0" i="1" smtClean="0">
+                            <a:latin typeface="Cambria Math" panose="02040503050406030204" pitchFamily="18" charset="0"/>
+                          </a:rPr>
+                        </m:ctrlPr>
+                      </m:sSubPr>
+                      <m:e>
+                        <m:r>
+                          <a:rPr lang="en-US" b="0" i="1" smtClean="0">
+                            <a:latin typeface="Cambria Math" panose="02040503050406030204" pitchFamily="18" charset="0"/>
+                          </a:rPr>
+                          <m:t>𝑥</m:t>
+                        </m:r>
+                      </m:e>
+                      <m:sub>
+                        <m:r>
+                          <a:rPr lang="en-US" b="0" i="1" smtClean="0">
+                            <a:latin typeface="Cambria Math" panose="02040503050406030204" pitchFamily="18" charset="0"/>
+                          </a:rPr>
+                          <m:t>2</m:t>
+                        </m:r>
+                      </m:sub>
+                    </m:sSub>
+                    <m:r>
+                      <a:rPr lang="en-US" b="0" i="1" smtClean="0">
+                        <a:latin typeface="Cambria Math" panose="02040503050406030204" pitchFamily="18" charset="0"/>
+                      </a:rPr>
+                      <m:t>, </m:t>
+                    </m:r>
+                    <m:sSub>
+                      <m:sSubPr>
+                        <m:ctrlPr>
+                          <a:rPr lang="en-US" b="0" i="1" smtClean="0">
+                            <a:latin typeface="Cambria Math" panose="02040503050406030204" pitchFamily="18" charset="0"/>
+                          </a:rPr>
+                        </m:ctrlPr>
+                      </m:sSubPr>
+                      <m:e>
+                        <m:r>
+                          <a:rPr lang="en-US" b="0" i="1" smtClean="0">
+                            <a:latin typeface="Cambria Math" panose="02040503050406030204" pitchFamily="18" charset="0"/>
+                          </a:rPr>
+                          <m:t>𝑥</m:t>
+                        </m:r>
+                      </m:e>
+                      <m:sub>
+                        <m:r>
+                          <a:rPr lang="en-US" b="0" i="1" smtClean="0">
+                            <a:latin typeface="Cambria Math" panose="02040503050406030204" pitchFamily="18" charset="0"/>
+                          </a:rPr>
+                          <m:t>3</m:t>
+                        </m:r>
+                      </m:sub>
+                    </m:sSub>
+                    <m:r>
+                      <a:rPr lang="en-US" b="0" i="1" smtClean="0">
+                        <a:latin typeface="Cambria Math" panose="02040503050406030204" pitchFamily="18" charset="0"/>
+                      </a:rPr>
+                      <m:t>&gt;0, </m:t>
+                    </m:r>
+                    <m:sSub>
+                      <m:sSubPr>
+                        <m:ctrlPr>
+                          <a:rPr lang="en-US" b="0" i="1" smtClean="0">
+                            <a:latin typeface="Cambria Math" panose="02040503050406030204" pitchFamily="18" charset="0"/>
+                          </a:rPr>
+                        </m:ctrlPr>
+                      </m:sSubPr>
+                      <m:e>
+                        <m:r>
+                          <a:rPr lang="en-US" b="0" i="1" smtClean="0">
+                            <a:latin typeface="Cambria Math" panose="02040503050406030204" pitchFamily="18" charset="0"/>
+                          </a:rPr>
+                          <m:t>𝑥</m:t>
+                        </m:r>
+                      </m:e>
+                      <m:sub>
+                        <m:r>
+                          <a:rPr lang="en-US" b="0" i="1" smtClean="0">
+                            <a:latin typeface="Cambria Math" panose="02040503050406030204" pitchFamily="18" charset="0"/>
+                          </a:rPr>
+                          <m:t>1</m:t>
+                        </m:r>
+                      </m:sub>
+                    </m:sSub>
+                    <m:r>
+                      <a:rPr lang="en-US" b="0" i="1" smtClean="0">
+                        <a:latin typeface="Cambria Math" panose="02040503050406030204" pitchFamily="18" charset="0"/>
+                      </a:rPr>
+                      <m:t>=0:</m:t>
+                    </m:r>
+                  </m:oMath>
+                </a14:m>
+                <a:br>
+                  <a:rPr lang="en-US" b="0" i="1" dirty="0">
+                    <a:latin typeface="Cambria Math" panose="02040503050406030204" pitchFamily="18" charset="0"/>
+                  </a:rPr>
+                </a:br>
+                <a:endParaRPr lang="en-US" b="0" i="1" dirty="0">
+                  <a:latin typeface="Cambria Math" panose="02040503050406030204" pitchFamily="18" charset="0"/>
+                </a:endParaRPr>
               </a:p>
               <a:p>
-                <a:pPr/>
                 <a14:m>
                   <m:oMathPara xmlns:m="http://schemas.openxmlformats.org/officeDocument/2006/math">
                     <m:oMathParaPr>
                       <m:jc m:val="centerGroup"/>
                     </m:oMathParaPr>
-                    <m:oMath xmlns:m="http://schemas.openxmlformats.org/officeDocument/2006/math">
-                      <m:sSub>
-                        <m:sSubPr>
-                          <m:ctrlPr>
-                            <a:rPr lang="en-US" b="0" i="1" smtClean="0">
-                              <a:latin typeface="Cambria Math" panose="02040503050406030204" pitchFamily="18" charset="0"/>
-                            </a:rPr>
-                          </m:ctrlPr>
-                        </m:sSubPr>
-                        <m:e>
-                          <m:r>
-                            <a:rPr lang="en-US" b="0" i="1" smtClean="0">
-                              <a:latin typeface="Cambria Math" panose="02040503050406030204" pitchFamily="18" charset="0"/>
-                            </a:rPr>
-                            <m:t>𝑥</m:t>
-                          </m:r>
-                        </m:e>
-                        <m:sub>
-                          <m:r>
-                            <a:rPr lang="en-US" b="0" i="1" smtClean="0">
-                              <a:latin typeface="Cambria Math" panose="02040503050406030204" pitchFamily="18" charset="0"/>
-                            </a:rPr>
-                            <m:t>2</m:t>
-                          </m:r>
-                        </m:sub>
-                      </m:sSub>
-                      <m:r>
-                        <a:rPr lang="en-US" b="0" i="1" smtClean="0">
-                          <a:latin typeface="Cambria Math" panose="02040503050406030204" pitchFamily="18" charset="0"/>
-                        </a:rPr>
-                        <m:t>, </m:t>
-                      </m:r>
-                      <m:sSub>
-                        <m:sSubPr>
-                          <m:ctrlPr>
-                            <a:rPr lang="en-US" b="0" i="1" smtClean="0">
-                              <a:latin typeface="Cambria Math" panose="02040503050406030204" pitchFamily="18" charset="0"/>
-                            </a:rPr>
-                          </m:ctrlPr>
-                        </m:sSubPr>
-                        <m:e>
-                          <m:r>
-                            <a:rPr lang="en-US" b="0" i="1" smtClean="0">
-                              <a:latin typeface="Cambria Math" panose="02040503050406030204" pitchFamily="18" charset="0"/>
-                            </a:rPr>
-                            <m:t>𝑥</m:t>
-                          </m:r>
-                        </m:e>
-                        <m:sub>
-                          <m:r>
-                            <a:rPr lang="en-US" b="0" i="1" smtClean="0">
-                              <a:latin typeface="Cambria Math" panose="02040503050406030204" pitchFamily="18" charset="0"/>
-                            </a:rPr>
-                            <m:t>3</m:t>
-                          </m:r>
-                        </m:sub>
-                      </m:sSub>
-                      <m:r>
-                        <a:rPr lang="en-US" b="0" i="1" smtClean="0">
-                          <a:latin typeface="Cambria Math" panose="02040503050406030204" pitchFamily="18" charset="0"/>
-                        </a:rPr>
-                        <m:t>&gt;0, </m:t>
-                      </m:r>
-                      <m:sSub>
-                        <m:sSubPr>
-                          <m:ctrlPr>
-                            <a:rPr lang="en-US" b="0" i="1" smtClean="0">
-                              <a:latin typeface="Cambria Math" panose="02040503050406030204" pitchFamily="18" charset="0"/>
-                            </a:rPr>
-                          </m:ctrlPr>
-                        </m:sSubPr>
-                        <m:e>
-                          <m:r>
-                            <a:rPr lang="en-US" b="0" i="1" smtClean="0">
-                              <a:latin typeface="Cambria Math" panose="02040503050406030204" pitchFamily="18" charset="0"/>
-                            </a:rPr>
-                            <m:t>𝑥</m:t>
-                          </m:r>
-                        </m:e>
-                        <m:sub>
-                          <m:r>
-                            <a:rPr lang="en-US" b="0" i="1" smtClean="0">
-                              <a:latin typeface="Cambria Math" panose="02040503050406030204" pitchFamily="18" charset="0"/>
-                            </a:rPr>
-                            <m:t>1</m:t>
-                          </m:r>
-                        </m:sub>
-                      </m:sSub>
-                      <m:r>
-                        <a:rPr lang="en-US" b="0" i="1" smtClean="0">
-                          <a:latin typeface="Cambria Math" panose="02040503050406030204" pitchFamily="18" charset="0"/>
-                        </a:rPr>
-                        <m:t>=0:</m:t>
-                      </m:r>
-                    </m:oMath>
                     <m:oMath xmlns:m="http://schemas.openxmlformats.org/officeDocument/2006/math">
                       <m:sSub>
                         <m:sSubPr>
@@ -15195,7 +15452,7 @@
             </p:txBody>
           </p:sp>
         </mc:Choice>
-        <mc:Fallback xmlns="">
+        <mc:Fallback>
           <p:sp>
             <p:nvSpPr>
               <p:cNvPr id="28" name="TextBox 27">
@@ -15213,7 +15470,7 @@
             <p:spPr>
               <a:xfrm>
                 <a:off x="897911" y="3595561"/>
-                <a:ext cx="2975430" cy="1938992"/>
+                <a:ext cx="3457482" cy="1938992"/>
               </a:xfrm>
               <a:prstGeom prst="rect">
                 <a:avLst/>
@@ -15221,7 +15478,7 @@
               <a:blipFill>
                 <a:blip r:embed="rId7"/>
                 <a:stretch>
-                  <a:fillRect l="-2857" t="-4063" b="-5938"/>
+                  <a:fillRect l="-2460" t="-4063" b="-5938"/>
                 </a:stretch>
               </a:blipFill>
               <a:ln>
@@ -15349,8 +15606,8 @@
           </a:p>
         </p:txBody>
       </p:sp>
-      <mc:AlternateContent xmlns:mc="http://schemas.openxmlformats.org/markup-compatibility/2006">
-        <mc:Choice xmlns:a14="http://schemas.microsoft.com/office/drawing/2010/main" Requires="a14">
+      <mc:AlternateContent xmlns:mc="http://schemas.openxmlformats.org/markup-compatibility/2006" xmlns:a14="http://schemas.microsoft.com/office/drawing/2010/main">
+        <mc:Choice Requires="a14">
           <p:sp>
             <p:nvSpPr>
               <p:cNvPr id="13" name="TextBox 12">
@@ -15658,7 +15915,7 @@
             </p:txBody>
           </p:sp>
         </mc:Choice>
-        <mc:Fallback>
+        <mc:Fallback xmlns="">
           <p:sp>
             <p:nvSpPr>
               <p:cNvPr id="13" name="TextBox 12">
@@ -15703,8 +15960,8 @@
           </p:sp>
         </mc:Fallback>
       </mc:AlternateContent>
-      <mc:AlternateContent xmlns:mc="http://schemas.openxmlformats.org/markup-compatibility/2006">
-        <mc:Choice xmlns:a14="http://schemas.microsoft.com/office/drawing/2010/main" Requires="a14">
+      <mc:AlternateContent xmlns:mc="http://schemas.openxmlformats.org/markup-compatibility/2006" xmlns:a14="http://schemas.microsoft.com/office/drawing/2010/main">
+        <mc:Choice Requires="a14">
           <p:sp>
             <p:nvSpPr>
               <p:cNvPr id="15" name="TextBox 14">
@@ -15872,7 +16129,7 @@
             </p:txBody>
           </p:sp>
         </mc:Choice>
-        <mc:Fallback>
+        <mc:Fallback xmlns="">
           <p:sp>
             <p:nvSpPr>
               <p:cNvPr id="15" name="TextBox 14">
@@ -15917,8 +16174,8 @@
           </p:sp>
         </mc:Fallback>
       </mc:AlternateContent>
-      <mc:AlternateContent xmlns:mc="http://schemas.openxmlformats.org/markup-compatibility/2006">
-        <mc:Choice xmlns:a14="http://schemas.microsoft.com/office/drawing/2010/main" Requires="a14">
+      <mc:AlternateContent xmlns:mc="http://schemas.openxmlformats.org/markup-compatibility/2006" xmlns:a14="http://schemas.microsoft.com/office/drawing/2010/main">
+        <mc:Choice Requires="a14">
           <p:sp>
             <p:nvSpPr>
               <p:cNvPr id="16" name="TextBox 15">
@@ -16006,16 +16263,7 @@
                           </a:solidFill>
                           <a:latin typeface="Cambria Math" panose="02040503050406030204" pitchFamily="18" charset="0"/>
                         </a:rPr>
-                        <m:t>→0</m:t>
-                      </m:r>
-                      <m:r>
-                        <a:rPr lang="en-US" b="0" i="1" smtClean="0">
-                          <a:solidFill>
-                            <a:schemeClr val="tx1"/>
-                          </a:solidFill>
-                          <a:latin typeface="Cambria Math" panose="02040503050406030204" pitchFamily="18" charset="0"/>
-                        </a:rPr>
-                        <m:t> </m:t>
+                        <m:t>→0 </m:t>
                       </m:r>
                     </m:oMath>
                   </m:oMathPara>
@@ -16025,7 +16273,7 @@
             </p:txBody>
           </p:sp>
         </mc:Choice>
-        <mc:Fallback>
+        <mc:Fallback xmlns="">
           <p:sp>
             <p:nvSpPr>
               <p:cNvPr id="16" name="TextBox 15">
@@ -16070,8 +16318,8 @@
           </p:sp>
         </mc:Fallback>
       </mc:AlternateContent>
-      <mc:AlternateContent xmlns:mc="http://schemas.openxmlformats.org/markup-compatibility/2006">
-        <mc:Choice xmlns:a14="http://schemas.microsoft.com/office/drawing/2010/main" Requires="a14">
+      <mc:AlternateContent xmlns:mc="http://schemas.openxmlformats.org/markup-compatibility/2006" xmlns:a14="http://schemas.microsoft.com/office/drawing/2010/main">
+        <mc:Choice Requires="a14">
           <p:sp>
             <p:nvSpPr>
               <p:cNvPr id="20" name="TextBox 19">
@@ -16284,7 +16532,7 @@
             </p:txBody>
           </p:sp>
         </mc:Choice>
-        <mc:Fallback>
+        <mc:Fallback xmlns="">
           <p:sp>
             <p:nvSpPr>
               <p:cNvPr id="20" name="TextBox 19">
@@ -16345,8 +16593,8 @@
             </p:nvSpPr>
             <p:spPr>
               <a:xfrm>
-                <a:off x="897911" y="3595561"/>
-                <a:ext cx="2975430" cy="2234586"/>
+                <a:off x="897910" y="3595561"/>
+                <a:ext cx="3517435" cy="2234586"/>
               </a:xfrm>
               <a:prstGeom prst="rect">
                 <a:avLst/>
@@ -16368,18 +16616,17 @@
                   <a:rPr lang="en-US" b="0" dirty="0">
                     <a:latin typeface="Cambria Math" panose="02040503050406030204" pitchFamily="18" charset="0"/>
                   </a:rPr>
-                  <a:t> Analysis says: </a:t>
+                  <a:t> Analysis says</a:t>
                 </a:r>
-              </a:p>
-              <a:p>
-                <a:pPr/>
                 <a:r>
-                  <a:rPr lang="en-US" dirty="0"/>
-                  <a:t>         </a:t>
+                  <a:rPr lang="en-US" dirty="0">
+                    <a:latin typeface="Cambria Math" panose="02040503050406030204" pitchFamily="18" charset="0"/>
+                  </a:rPr>
+                  <a:t>,</a:t>
                 </a:r>
                 <a:r>
                   <a:rPr lang="en-US" b="0" dirty="0"/>
-                  <a:t>If </a:t>
+                  <a:t> </a:t>
                 </a:r>
                 <a14:m>
                   <m:oMath xmlns:m="http://schemas.openxmlformats.org/officeDocument/2006/math">
@@ -16485,6 +16732,14 @@
                 </a:br>
                 <a:r>
                   <a:rPr lang="en-US" b="0" i="1" dirty="0">
+                    <a:latin typeface="Cambria Math" panose="02040503050406030204" pitchFamily="18" charset="0"/>
+                  </a:rPr>
+                  <a:t>	</a:t>
+                </a:r>
+              </a:p>
+              <a:p>
+                <a:r>
+                  <a:rPr lang="en-US" i="1" dirty="0">
                     <a:latin typeface="Cambria Math" panose="02040503050406030204" pitchFamily="18" charset="0"/>
                   </a:rPr>
                   <a:t>	</a:t>
@@ -16691,8 +16946,8 @@
             </p:nvSpPr>
             <p:spPr>
               <a:xfrm>
-                <a:off x="897911" y="3595561"/>
-                <a:ext cx="2975430" cy="2234586"/>
+                <a:off x="897910" y="3595561"/>
+                <a:ext cx="3517435" cy="2234586"/>
               </a:xfrm>
               <a:prstGeom prst="rect">
                 <a:avLst/>
@@ -16700,7 +16955,7 @@
               <a:blipFill>
                 <a:blip r:embed="rId6"/>
                 <a:stretch>
-                  <a:fillRect l="-2857" t="-3533" b="-5163"/>
+                  <a:fillRect l="-2418" t="-3804" b="-5163"/>
                 </a:stretch>
               </a:blipFill>
               <a:ln>
@@ -16724,8 +16979,8 @@
           </p:sp>
         </mc:Fallback>
       </mc:AlternateContent>
-      <mc:AlternateContent xmlns:mc="http://schemas.openxmlformats.org/markup-compatibility/2006">
-        <mc:Choice xmlns:a14="http://schemas.microsoft.com/office/drawing/2010/main" Requires="a14">
+      <mc:AlternateContent xmlns:mc="http://schemas.openxmlformats.org/markup-compatibility/2006" xmlns:a14="http://schemas.microsoft.com/office/drawing/2010/main">
+        <mc:Choice Requires="a14">
           <p:sp>
             <p:nvSpPr>
               <p:cNvPr id="10" name="TextBox 9">
@@ -16995,7 +17250,7 @@
             </p:txBody>
           </p:sp>
         </mc:Choice>
-        <mc:Fallback>
+        <mc:Fallback xmlns="">
           <p:sp>
             <p:nvSpPr>
               <p:cNvPr id="10" name="TextBox 9">
@@ -17132,175 +17387,2044 @@
           <a:bodyPr/>
           <a:lstStyle/>
           <a:p>
-            <a:endParaRPr lang="en-US"/>
+            <a:r>
+              <a:rPr lang="en-US" dirty="0"/>
+              <a:t>Cooperator and Police</a:t>
+            </a:r>
           </a:p>
         </p:txBody>
       </p:sp>
-      <p:sp>
-        <p:nvSpPr>
-          <p:cNvPr id="3" name="Content Placeholder 2">
-            <a:extLst>
-              <a:ext uri="{FF2B5EF4-FFF2-40B4-BE49-F238E27FC236}">
-                <a16:creationId xmlns:a16="http://schemas.microsoft.com/office/drawing/2014/main" id="{8FE6A46B-D922-4E09-AA47-BA00D0F7D75F}"/>
-              </a:ext>
-            </a:extLst>
-          </p:cNvPr>
-          <p:cNvSpPr>
-            <a:spLocks noGrp="1"/>
-          </p:cNvSpPr>
-          <p:nvPr>
-            <p:ph idx="1"/>
-          </p:nvPr>
-        </p:nvSpPr>
-        <p:spPr/>
-        <p:txBody>
-          <a:bodyPr/>
-          <a:lstStyle/>
-          <a:p>
-            <a:endParaRPr lang="en-US"/>
-          </a:p>
-        </p:txBody>
-      </p:sp>
+      <mc:AlternateContent xmlns:mc="http://schemas.openxmlformats.org/markup-compatibility/2006">
+        <mc:Choice xmlns:a14="http://schemas.microsoft.com/office/drawing/2010/main" Requires="a14">
+          <p:sp>
+            <p:nvSpPr>
+              <p:cNvPr id="4" name="TextBox 3">
+                <a:extLst>
+                  <a:ext uri="{FF2B5EF4-FFF2-40B4-BE49-F238E27FC236}">
+                    <a16:creationId xmlns:a16="http://schemas.microsoft.com/office/drawing/2014/main" id="{F389CFBA-8985-4E04-8331-80F3100E5F58}"/>
+                  </a:ext>
+                </a:extLst>
+              </p:cNvPr>
+              <p:cNvSpPr txBox="1"/>
+              <p:nvPr/>
+            </p:nvSpPr>
+            <p:spPr>
+              <a:xfrm>
+                <a:off x="952051" y="1433486"/>
+                <a:ext cx="3300519" cy="276999"/>
+              </a:xfrm>
+              <a:prstGeom prst="rect">
+                <a:avLst/>
+              </a:prstGeom>
+              <a:noFill/>
+            </p:spPr>
+            <p:txBody>
+              <a:bodyPr wrap="none" lIns="0" tIns="0" rIns="0" bIns="0" rtlCol="0" anchor="b">
+                <a:spAutoFit/>
+              </a:bodyPr>
+              <a:lstStyle/>
+              <a:p>
+                <a:pPr/>
+                <a14:m>
+                  <m:oMathPara xmlns:m="http://schemas.openxmlformats.org/officeDocument/2006/math">
+                    <m:oMathParaPr>
+                      <m:jc m:val="centerGroup"/>
+                    </m:oMathParaPr>
+                    <m:oMath xmlns:m="http://schemas.openxmlformats.org/officeDocument/2006/math">
+                      <m:acc>
+                        <m:accPr>
+                          <m:chr m:val="̇"/>
+                          <m:ctrlPr>
+                            <a:rPr lang="en-US" b="0" i="1" smtClean="0">
+                              <a:solidFill>
+                                <a:srgbClr val="7030A0"/>
+                              </a:solidFill>
+                              <a:latin typeface="Cambria Math" panose="02040503050406030204" pitchFamily="18" charset="0"/>
+                            </a:rPr>
+                          </m:ctrlPr>
+                        </m:accPr>
+                        <m:e>
+                          <m:r>
+                            <a:rPr lang="en-US" b="0" i="1" smtClean="0">
+                              <a:solidFill>
+                                <a:srgbClr val="7030A0"/>
+                              </a:solidFill>
+                              <a:latin typeface="Cambria Math" panose="02040503050406030204" pitchFamily="18" charset="0"/>
+                            </a:rPr>
+                            <m:t>𝑠</m:t>
+                          </m:r>
+                        </m:e>
+                      </m:acc>
+                      <m:r>
+                        <a:rPr lang="en-US" b="0" i="1" smtClean="0">
+                          <a:latin typeface="Cambria Math" panose="02040503050406030204" pitchFamily="18" charset="0"/>
+                        </a:rPr>
+                        <m:t>=</m:t>
+                      </m:r>
+                      <m:r>
+                        <a:rPr lang="en-US" b="0" i="1" smtClean="0">
+                          <a:solidFill>
+                            <a:schemeClr val="tx1"/>
+                          </a:solidFill>
+                          <a:latin typeface="Cambria Math" panose="02040503050406030204" pitchFamily="18" charset="0"/>
+                        </a:rPr>
+                        <m:t>𝑑</m:t>
+                      </m:r>
+                      <m:d>
+                        <m:dPr>
+                          <m:ctrlPr>
+                            <a:rPr lang="en-US" b="0" i="1" smtClean="0">
+                              <a:solidFill>
+                                <a:schemeClr val="tx1"/>
+                              </a:solidFill>
+                              <a:latin typeface="Cambria Math" panose="02040503050406030204" pitchFamily="18" charset="0"/>
+                            </a:rPr>
+                          </m:ctrlPr>
+                        </m:dPr>
+                        <m:e>
+                          <m:sSup>
+                            <m:sSupPr>
+                              <m:ctrlPr>
+                                <a:rPr lang="en-US" b="0" i="1" smtClean="0">
+                                  <a:solidFill>
+                                    <a:schemeClr val="tx1"/>
+                                  </a:solidFill>
+                                  <a:latin typeface="Cambria Math" panose="02040503050406030204" pitchFamily="18" charset="0"/>
+                                </a:rPr>
+                              </m:ctrlPr>
+                            </m:sSupPr>
+                            <m:e>
+                              <m:r>
+                                <a:rPr lang="en-US" b="0" i="1" smtClean="0">
+                                  <a:solidFill>
+                                    <a:schemeClr val="tx1"/>
+                                  </a:solidFill>
+                                  <a:latin typeface="Cambria Math" panose="02040503050406030204" pitchFamily="18" charset="0"/>
+                                </a:rPr>
+                                <m:t>𝑠</m:t>
+                              </m:r>
+                            </m:e>
+                            <m:sup>
+                              <m:r>
+                                <a:rPr lang="en-US" b="0" i="1" smtClean="0">
+                                  <a:solidFill>
+                                    <a:schemeClr val="tx1"/>
+                                  </a:solidFill>
+                                  <a:latin typeface="Cambria Math" panose="02040503050406030204" pitchFamily="18" charset="0"/>
+                                </a:rPr>
+                                <m:t>0</m:t>
+                              </m:r>
+                            </m:sup>
+                          </m:sSup>
+                          <m:r>
+                            <a:rPr lang="en-US" b="0" i="1" smtClean="0">
+                              <a:solidFill>
+                                <a:schemeClr val="tx1"/>
+                              </a:solidFill>
+                              <a:latin typeface="Cambria Math" panose="02040503050406030204" pitchFamily="18" charset="0"/>
+                            </a:rPr>
+                            <m:t>−</m:t>
+                          </m:r>
+                          <m:r>
+                            <a:rPr lang="en-US" b="0" i="1" smtClean="0">
+                              <a:solidFill>
+                                <a:schemeClr val="tx1"/>
+                              </a:solidFill>
+                              <a:latin typeface="Cambria Math" panose="02040503050406030204" pitchFamily="18" charset="0"/>
+                            </a:rPr>
+                            <m:t>𝑠</m:t>
+                          </m:r>
+                        </m:e>
+                      </m:d>
+                      <m:r>
+                        <a:rPr lang="en-US" b="0" i="1" smtClean="0">
+                          <a:solidFill>
+                            <a:schemeClr val="tx1"/>
+                          </a:solidFill>
+                          <a:latin typeface="Cambria Math" panose="02040503050406030204" pitchFamily="18" charset="0"/>
+                        </a:rPr>
+                        <m:t>−</m:t>
+                      </m:r>
+                      <m:d>
+                        <m:dPr>
+                          <m:ctrlPr>
+                            <a:rPr lang="en-US" b="0" i="1" smtClean="0">
+                              <a:solidFill>
+                                <a:schemeClr val="tx1"/>
+                              </a:solidFill>
+                              <a:latin typeface="Cambria Math" panose="02040503050406030204" pitchFamily="18" charset="0"/>
+                            </a:rPr>
+                          </m:ctrlPr>
+                        </m:dPr>
+                        <m:e>
+                          <m:sSub>
+                            <m:sSubPr>
+                              <m:ctrlPr>
+                                <a:rPr lang="en-US" b="0" i="1" smtClean="0">
+                                  <a:solidFill>
+                                    <a:schemeClr val="tx1"/>
+                                  </a:solidFill>
+                                  <a:latin typeface="Cambria Math" panose="02040503050406030204" pitchFamily="18" charset="0"/>
+                                </a:rPr>
+                              </m:ctrlPr>
+                            </m:sSubPr>
+                            <m:e>
+                              <m:r>
+                                <a:rPr lang="en-US" b="0" i="1" smtClean="0">
+                                  <a:solidFill>
+                                    <a:schemeClr val="tx1"/>
+                                  </a:solidFill>
+                                  <a:latin typeface="Cambria Math" panose="02040503050406030204" pitchFamily="18" charset="0"/>
+                                </a:rPr>
+                                <m:t>𝑥</m:t>
+                              </m:r>
+                            </m:e>
+                            <m:sub>
+                              <m:r>
+                                <a:rPr lang="en-US" b="0" i="1" smtClean="0">
+                                  <a:solidFill>
+                                    <a:schemeClr val="tx1"/>
+                                  </a:solidFill>
+                                  <a:latin typeface="Cambria Math" panose="02040503050406030204" pitchFamily="18" charset="0"/>
+                                </a:rPr>
+                                <m:t>1</m:t>
+                              </m:r>
+                            </m:sub>
+                          </m:sSub>
+                          <m:r>
+                            <a:rPr lang="en-US" b="0" i="1" smtClean="0">
+                              <a:solidFill>
+                                <a:schemeClr val="tx1"/>
+                              </a:solidFill>
+                              <a:latin typeface="Cambria Math" panose="02040503050406030204" pitchFamily="18" charset="0"/>
+                            </a:rPr>
+                            <m:t>+</m:t>
+                          </m:r>
+                          <m:sSub>
+                            <m:sSubPr>
+                              <m:ctrlPr>
+                                <a:rPr lang="en-US" b="0" i="1" smtClean="0">
+                                  <a:solidFill>
+                                    <a:schemeClr val="tx1"/>
+                                  </a:solidFill>
+                                  <a:latin typeface="Cambria Math" panose="02040503050406030204" pitchFamily="18" charset="0"/>
+                                </a:rPr>
+                              </m:ctrlPr>
+                            </m:sSubPr>
+                            <m:e>
+                              <m:r>
+                                <a:rPr lang="en-US" b="0" i="1" smtClean="0">
+                                  <a:solidFill>
+                                    <a:schemeClr val="tx1"/>
+                                  </a:solidFill>
+                                  <a:latin typeface="Cambria Math" panose="02040503050406030204" pitchFamily="18" charset="0"/>
+                                </a:rPr>
+                                <m:t>𝑥</m:t>
+                              </m:r>
+                            </m:e>
+                            <m:sub>
+                              <m:r>
+                                <a:rPr lang="en-US" b="0" i="1" smtClean="0">
+                                  <a:solidFill>
+                                    <a:schemeClr val="tx1"/>
+                                  </a:solidFill>
+                                  <a:latin typeface="Cambria Math" panose="02040503050406030204" pitchFamily="18" charset="0"/>
+                                </a:rPr>
+                                <m:t>2</m:t>
+                              </m:r>
+                            </m:sub>
+                          </m:sSub>
+                        </m:e>
+                      </m:d>
+                      <m:r>
+                        <a:rPr lang="en-US" b="0" i="1" smtClean="0">
+                          <a:solidFill>
+                            <a:schemeClr val="tx1"/>
+                          </a:solidFill>
+                          <a:latin typeface="Cambria Math" panose="02040503050406030204" pitchFamily="18" charset="0"/>
+                        </a:rPr>
+                        <m:t>𝑓</m:t>
+                      </m:r>
+                      <m:d>
+                        <m:dPr>
+                          <m:ctrlPr>
+                            <a:rPr lang="en-US" b="0" i="1" smtClean="0">
+                              <a:solidFill>
+                                <a:schemeClr val="tx1"/>
+                              </a:solidFill>
+                              <a:latin typeface="Cambria Math" panose="02040503050406030204" pitchFamily="18" charset="0"/>
+                            </a:rPr>
+                          </m:ctrlPr>
+                        </m:dPr>
+                        <m:e>
+                          <m:r>
+                            <a:rPr lang="en-US" b="0" i="1" smtClean="0">
+                              <a:solidFill>
+                                <a:schemeClr val="tx1"/>
+                              </a:solidFill>
+                              <a:latin typeface="Cambria Math" panose="02040503050406030204" pitchFamily="18" charset="0"/>
+                            </a:rPr>
+                            <m:t>𝑠</m:t>
+                          </m:r>
+                          <m:r>
+                            <a:rPr lang="en-US" b="0" i="1" smtClean="0">
+                              <a:solidFill>
+                                <a:schemeClr val="tx1"/>
+                              </a:solidFill>
+                              <a:latin typeface="Cambria Math" panose="02040503050406030204" pitchFamily="18" charset="0"/>
+                            </a:rPr>
+                            <m:t>,</m:t>
+                          </m:r>
+                          <m:r>
+                            <a:rPr lang="en-US" b="0" i="1" smtClean="0">
+                              <a:solidFill>
+                                <a:schemeClr val="tx1"/>
+                              </a:solidFill>
+                              <a:latin typeface="Cambria Math" panose="02040503050406030204" pitchFamily="18" charset="0"/>
+                            </a:rPr>
+                            <m:t>𝑒</m:t>
+                          </m:r>
+                        </m:e>
+                      </m:d>
+                      <m:r>
+                        <a:rPr lang="en-US" b="0" i="1" smtClean="0">
+                          <a:solidFill>
+                            <a:schemeClr val="tx1"/>
+                          </a:solidFill>
+                          <a:latin typeface="Cambria Math" panose="02040503050406030204" pitchFamily="18" charset="0"/>
+                        </a:rPr>
+                        <m:t> </m:t>
+                      </m:r>
+                    </m:oMath>
+                  </m:oMathPara>
+                </a14:m>
+                <a:endParaRPr lang="en-US" dirty="0"/>
+              </a:p>
+            </p:txBody>
+          </p:sp>
+        </mc:Choice>
+        <mc:Fallback>
+          <p:sp>
+            <p:nvSpPr>
+              <p:cNvPr id="4" name="TextBox 3">
+                <a:extLst>
+                  <a:ext uri="{FF2B5EF4-FFF2-40B4-BE49-F238E27FC236}">
+                    <a16:creationId xmlns:a16="http://schemas.microsoft.com/office/drawing/2014/main" id="{F389CFBA-8985-4E04-8331-80F3100E5F58}"/>
+                  </a:ext>
+                </a:extLst>
+              </p:cNvPr>
+              <p:cNvSpPr txBox="1">
+                <a:spLocks noRot="1" noChangeAspect="1" noMove="1" noResize="1" noEditPoints="1" noAdjustHandles="1" noChangeArrowheads="1" noChangeShapeType="1" noTextEdit="1"/>
+              </p:cNvSpPr>
+              <p:nvPr/>
+            </p:nvSpPr>
+            <p:spPr>
+              <a:xfrm>
+                <a:off x="952051" y="1433486"/>
+                <a:ext cx="3300519" cy="276999"/>
+              </a:xfrm>
+              <a:prstGeom prst="rect">
+                <a:avLst/>
+              </a:prstGeom>
+              <a:blipFill>
+                <a:blip r:embed="rId2"/>
+                <a:stretch>
+                  <a:fillRect l="-554" t="-2174" b="-34783"/>
+                </a:stretch>
+              </a:blipFill>
+            </p:spPr>
+            <p:txBody>
+              <a:bodyPr/>
+              <a:lstStyle/>
+              <a:p>
+                <a:r>
+                  <a:rPr lang="en-US">
+                    <a:noFill/>
+                  </a:rPr>
+                  <a:t> </a:t>
+                </a:r>
+              </a:p>
+            </p:txBody>
+          </p:sp>
+        </mc:Fallback>
+      </mc:AlternateContent>
+      <mc:AlternateContent xmlns:mc="http://schemas.openxmlformats.org/markup-compatibility/2006">
+        <mc:Choice xmlns:a14="http://schemas.microsoft.com/office/drawing/2010/main" Requires="a14">
+          <p:sp>
+            <p:nvSpPr>
+              <p:cNvPr id="5" name="TextBox 4">
+                <a:extLst>
+                  <a:ext uri="{FF2B5EF4-FFF2-40B4-BE49-F238E27FC236}">
+                    <a16:creationId xmlns:a16="http://schemas.microsoft.com/office/drawing/2014/main" id="{E8F16D05-93F7-4165-B02E-9D58EEE26458}"/>
+                  </a:ext>
+                </a:extLst>
+              </p:cNvPr>
+              <p:cNvSpPr txBox="1"/>
+              <p:nvPr/>
+            </p:nvSpPr>
+            <p:spPr>
+              <a:xfrm>
+                <a:off x="978192" y="1790429"/>
+                <a:ext cx="2089098" cy="276999"/>
+              </a:xfrm>
+              <a:prstGeom prst="rect">
+                <a:avLst/>
+              </a:prstGeom>
+              <a:noFill/>
+            </p:spPr>
+            <p:txBody>
+              <a:bodyPr wrap="none" lIns="0" tIns="0" rIns="0" bIns="0" rtlCol="0" anchor="b">
+                <a:spAutoFit/>
+              </a:bodyPr>
+              <a:lstStyle/>
+              <a:p>
+                <a14:m>
+                  <m:oMath xmlns:m="http://schemas.openxmlformats.org/officeDocument/2006/math">
+                    <m:acc>
+                      <m:accPr>
+                        <m:chr m:val="̇"/>
+                        <m:ctrlPr>
+                          <a:rPr lang="en-US" b="0" i="1" smtClean="0">
+                            <a:latin typeface="Cambria Math" panose="02040503050406030204" pitchFamily="18" charset="0"/>
+                          </a:rPr>
+                        </m:ctrlPr>
+                      </m:accPr>
+                      <m:e>
+                        <m:r>
+                          <a:rPr lang="en-US" b="0" i="1" smtClean="0">
+                            <a:solidFill>
+                              <a:srgbClr val="00B050"/>
+                            </a:solidFill>
+                            <a:latin typeface="Cambria Math" panose="02040503050406030204" pitchFamily="18" charset="0"/>
+                          </a:rPr>
+                          <m:t>𝑒</m:t>
+                        </m:r>
+                      </m:e>
+                    </m:acc>
+                    <m:r>
+                      <a:rPr lang="en-US" b="0" i="1" smtClean="0">
+                        <a:latin typeface="Cambria Math" panose="02040503050406030204" pitchFamily="18" charset="0"/>
+                      </a:rPr>
+                      <m:t>=</m:t>
+                    </m:r>
+                    <m:sSub>
+                      <m:sSubPr>
+                        <m:ctrlPr>
+                          <a:rPr lang="en-US" b="0" i="1" smtClean="0">
+                            <a:solidFill>
+                              <a:schemeClr val="tx1"/>
+                            </a:solidFill>
+                            <a:latin typeface="Cambria Math" panose="02040503050406030204" pitchFamily="18" charset="0"/>
+                          </a:rPr>
+                        </m:ctrlPr>
+                      </m:sSubPr>
+                      <m:e>
+                        <m:r>
+                          <a:rPr lang="en-US" b="0" i="1" smtClean="0">
+                            <a:solidFill>
+                              <a:schemeClr val="tx1"/>
+                            </a:solidFill>
+                            <a:latin typeface="Cambria Math" panose="02040503050406030204" pitchFamily="18" charset="0"/>
+                          </a:rPr>
+                          <m:t>𝑞</m:t>
+                        </m:r>
+                      </m:e>
+                      <m:sub>
+                        <m:r>
+                          <a:rPr lang="en-US" b="0" i="1" smtClean="0">
+                            <a:solidFill>
+                              <a:schemeClr val="tx1"/>
+                            </a:solidFill>
+                            <a:latin typeface="Cambria Math" panose="02040503050406030204" pitchFamily="18" charset="0"/>
+                          </a:rPr>
+                          <m:t>1</m:t>
+                        </m:r>
+                      </m:sub>
+                    </m:sSub>
+                    <m:sSub>
+                      <m:sSubPr>
+                        <m:ctrlPr>
+                          <a:rPr lang="en-US" b="0" i="1" smtClean="0">
+                            <a:solidFill>
+                              <a:schemeClr val="tx1"/>
+                            </a:solidFill>
+                            <a:latin typeface="Cambria Math" panose="02040503050406030204" pitchFamily="18" charset="0"/>
+                          </a:rPr>
+                        </m:ctrlPr>
+                      </m:sSubPr>
+                      <m:e>
+                        <m:r>
+                          <a:rPr lang="en-US" b="0" i="1" smtClean="0">
+                            <a:solidFill>
+                              <a:schemeClr val="tx1"/>
+                            </a:solidFill>
+                            <a:latin typeface="Cambria Math" panose="02040503050406030204" pitchFamily="18" charset="0"/>
+                          </a:rPr>
+                          <m:t>𝑥</m:t>
+                        </m:r>
+                      </m:e>
+                      <m:sub>
+                        <m:r>
+                          <a:rPr lang="en-US" b="0" i="1" smtClean="0">
+                            <a:solidFill>
+                              <a:schemeClr val="tx1"/>
+                            </a:solidFill>
+                            <a:latin typeface="Cambria Math" panose="02040503050406030204" pitchFamily="18" charset="0"/>
+                          </a:rPr>
+                          <m:t>1</m:t>
+                        </m:r>
+                      </m:sub>
+                    </m:sSub>
+                    <m:r>
+                      <a:rPr lang="en-US" b="0" i="1" smtClean="0">
+                        <a:solidFill>
+                          <a:schemeClr val="tx1"/>
+                        </a:solidFill>
+                        <a:latin typeface="Cambria Math" panose="02040503050406030204" pitchFamily="18" charset="0"/>
+                      </a:rPr>
+                      <m:t>𝑓</m:t>
+                    </m:r>
+                    <m:d>
+                      <m:dPr>
+                        <m:ctrlPr>
+                          <a:rPr lang="en-US" b="0" i="1" smtClean="0">
+                            <a:solidFill>
+                              <a:schemeClr val="tx1"/>
+                            </a:solidFill>
+                            <a:latin typeface="Cambria Math" panose="02040503050406030204" pitchFamily="18" charset="0"/>
+                          </a:rPr>
+                        </m:ctrlPr>
+                      </m:dPr>
+                      <m:e>
+                        <m:r>
+                          <a:rPr lang="en-US" b="0" i="1" smtClean="0">
+                            <a:solidFill>
+                              <a:schemeClr val="tx1"/>
+                            </a:solidFill>
+                            <a:latin typeface="Cambria Math" panose="02040503050406030204" pitchFamily="18" charset="0"/>
+                          </a:rPr>
+                          <m:t>𝑠</m:t>
+                        </m:r>
+                        <m:r>
+                          <a:rPr lang="en-US" b="0" i="1" smtClean="0">
+                            <a:solidFill>
+                              <a:schemeClr val="tx1"/>
+                            </a:solidFill>
+                            <a:latin typeface="Cambria Math" panose="02040503050406030204" pitchFamily="18" charset="0"/>
+                          </a:rPr>
+                          <m:t>,</m:t>
+                        </m:r>
+                        <m:r>
+                          <a:rPr lang="en-US" b="0" i="1" smtClean="0">
+                            <a:solidFill>
+                              <a:schemeClr val="tx1"/>
+                            </a:solidFill>
+                            <a:latin typeface="Cambria Math" panose="02040503050406030204" pitchFamily="18" charset="0"/>
+                          </a:rPr>
+                          <m:t>𝑒</m:t>
+                        </m:r>
+                      </m:e>
+                    </m:d>
+                    <m:r>
+                      <a:rPr lang="en-US" b="0" i="1" smtClean="0">
+                        <a:solidFill>
+                          <a:schemeClr val="tx1"/>
+                        </a:solidFill>
+                        <a:latin typeface="Cambria Math" panose="02040503050406030204" pitchFamily="18" charset="0"/>
+                      </a:rPr>
+                      <m:t>−</m:t>
+                    </m:r>
+                    <m:r>
+                      <a:rPr lang="en-US" b="0" i="1" smtClean="0">
+                        <a:solidFill>
+                          <a:schemeClr val="tx1"/>
+                        </a:solidFill>
+                        <a:latin typeface="Cambria Math" panose="02040503050406030204" pitchFamily="18" charset="0"/>
+                      </a:rPr>
+                      <m:t>𝑑𝑒</m:t>
+                    </m:r>
+                  </m:oMath>
+                </a14:m>
+                <a:r>
+                  <a:rPr lang="en-US" dirty="0">
+                    <a:solidFill>
+                      <a:schemeClr val="tx1"/>
+                    </a:solidFill>
+                  </a:rPr>
+                  <a:t> </a:t>
+                </a:r>
+                <a:endParaRPr lang="en-US" dirty="0"/>
+              </a:p>
+            </p:txBody>
+          </p:sp>
+        </mc:Choice>
+        <mc:Fallback>
+          <p:sp>
+            <p:nvSpPr>
+              <p:cNvPr id="5" name="TextBox 4">
+                <a:extLst>
+                  <a:ext uri="{FF2B5EF4-FFF2-40B4-BE49-F238E27FC236}">
+                    <a16:creationId xmlns:a16="http://schemas.microsoft.com/office/drawing/2014/main" id="{E8F16D05-93F7-4165-B02E-9D58EEE26458}"/>
+                  </a:ext>
+                </a:extLst>
+              </p:cNvPr>
+              <p:cNvSpPr txBox="1">
+                <a:spLocks noRot="1" noChangeAspect="1" noMove="1" noResize="1" noEditPoints="1" noAdjustHandles="1" noChangeArrowheads="1" noChangeShapeType="1" noTextEdit="1"/>
+              </p:cNvSpPr>
+              <p:nvPr/>
+            </p:nvSpPr>
+            <p:spPr>
+              <a:xfrm>
+                <a:off x="978192" y="1790429"/>
+                <a:ext cx="2089098" cy="276999"/>
+              </a:xfrm>
+              <a:prstGeom prst="rect">
+                <a:avLst/>
+              </a:prstGeom>
+              <a:blipFill>
+                <a:blip r:embed="rId3"/>
+                <a:stretch>
+                  <a:fillRect l="-2915" t="-2222" r="-583" b="-35556"/>
+                </a:stretch>
+              </a:blipFill>
+            </p:spPr>
+            <p:txBody>
+              <a:bodyPr/>
+              <a:lstStyle/>
+              <a:p>
+                <a:r>
+                  <a:rPr lang="en-US">
+                    <a:noFill/>
+                  </a:rPr>
+                  <a:t> </a:t>
+                </a:r>
+              </a:p>
+            </p:txBody>
+          </p:sp>
+        </mc:Fallback>
+      </mc:AlternateContent>
+      <mc:AlternateContent xmlns:mc="http://schemas.openxmlformats.org/markup-compatibility/2006">
+        <mc:Choice xmlns:a14="http://schemas.microsoft.com/office/drawing/2010/main" Requires="a14">
+          <p:sp>
+            <p:nvSpPr>
+              <p:cNvPr id="6" name="TextBox 5">
+                <a:extLst>
+                  <a:ext uri="{FF2B5EF4-FFF2-40B4-BE49-F238E27FC236}">
+                    <a16:creationId xmlns:a16="http://schemas.microsoft.com/office/drawing/2014/main" id="{69037953-E05C-48B4-98F0-946922D2EB12}"/>
+                  </a:ext>
+                </a:extLst>
+              </p:cNvPr>
+              <p:cNvSpPr txBox="1"/>
+              <p:nvPr/>
+            </p:nvSpPr>
+            <p:spPr>
+              <a:xfrm>
+                <a:off x="978192" y="2149916"/>
+                <a:ext cx="2107308" cy="276999"/>
+              </a:xfrm>
+              <a:prstGeom prst="rect">
+                <a:avLst/>
+              </a:prstGeom>
+              <a:noFill/>
+            </p:spPr>
+            <p:txBody>
+              <a:bodyPr wrap="none" lIns="0" tIns="0" rIns="0" bIns="0" rtlCol="0" anchor="b">
+                <a:spAutoFit/>
+              </a:bodyPr>
+              <a:lstStyle/>
+              <a:p>
+                <a:pPr/>
+                <a14:m>
+                  <m:oMathPara xmlns:m="http://schemas.openxmlformats.org/officeDocument/2006/math">
+                    <m:oMathParaPr>
+                      <m:jc m:val="centerGroup"/>
+                    </m:oMathParaPr>
+                    <m:oMath xmlns:m="http://schemas.openxmlformats.org/officeDocument/2006/math">
+                      <m:acc>
+                        <m:accPr>
+                          <m:chr m:val="̇"/>
+                          <m:ctrlPr>
+                            <a:rPr lang="en-US" b="0" i="1" smtClean="0">
+                              <a:latin typeface="Cambria Math" panose="02040503050406030204" pitchFamily="18" charset="0"/>
+                            </a:rPr>
+                          </m:ctrlPr>
+                        </m:accPr>
+                        <m:e>
+                          <m:r>
+                            <a:rPr lang="en-US" b="0" i="1" smtClean="0">
+                              <a:solidFill>
+                                <a:schemeClr val="accent2"/>
+                              </a:solidFill>
+                              <a:latin typeface="Cambria Math" panose="02040503050406030204" pitchFamily="18" charset="0"/>
+                            </a:rPr>
+                            <m:t>𝑡</m:t>
+                          </m:r>
+                        </m:e>
+                      </m:acc>
+                      <m:r>
+                        <a:rPr lang="en-US" b="0" i="1" smtClean="0">
+                          <a:latin typeface="Cambria Math" panose="02040503050406030204" pitchFamily="18" charset="0"/>
+                        </a:rPr>
+                        <m:t>=</m:t>
+                      </m:r>
+                      <m:sSub>
+                        <m:sSubPr>
+                          <m:ctrlPr>
+                            <a:rPr lang="en-US" b="0" i="1" smtClean="0">
+                              <a:solidFill>
+                                <a:schemeClr val="tx1"/>
+                              </a:solidFill>
+                              <a:latin typeface="Cambria Math" panose="02040503050406030204" pitchFamily="18" charset="0"/>
+                            </a:rPr>
+                          </m:ctrlPr>
+                        </m:sSubPr>
+                        <m:e>
+                          <m:r>
+                            <a:rPr lang="en-US" b="0" i="1" smtClean="0">
+                              <a:solidFill>
+                                <a:schemeClr val="tx1"/>
+                              </a:solidFill>
+                              <a:latin typeface="Cambria Math" panose="02040503050406030204" pitchFamily="18" charset="0"/>
+                            </a:rPr>
+                            <m:t>𝑞</m:t>
+                          </m:r>
+                        </m:e>
+                        <m:sub>
+                          <m:r>
+                            <a:rPr lang="en-US" b="0" i="1" smtClean="0">
+                              <a:solidFill>
+                                <a:schemeClr val="tx1"/>
+                              </a:solidFill>
+                              <a:latin typeface="Cambria Math" panose="02040503050406030204" pitchFamily="18" charset="0"/>
+                            </a:rPr>
+                            <m:t>2</m:t>
+                          </m:r>
+                        </m:sub>
+                      </m:sSub>
+                      <m:sSub>
+                        <m:sSubPr>
+                          <m:ctrlPr>
+                            <a:rPr lang="en-US" b="0" i="1" smtClean="0">
+                              <a:solidFill>
+                                <a:schemeClr val="tx1"/>
+                              </a:solidFill>
+                              <a:latin typeface="Cambria Math" panose="02040503050406030204" pitchFamily="18" charset="0"/>
+                            </a:rPr>
+                          </m:ctrlPr>
+                        </m:sSubPr>
+                        <m:e>
+                          <m:r>
+                            <a:rPr lang="en-US" b="0" i="1" smtClean="0">
+                              <a:solidFill>
+                                <a:schemeClr val="tx1"/>
+                              </a:solidFill>
+                              <a:latin typeface="Cambria Math" panose="02040503050406030204" pitchFamily="18" charset="0"/>
+                            </a:rPr>
+                            <m:t>𝑥</m:t>
+                          </m:r>
+                        </m:e>
+                        <m:sub>
+                          <m:r>
+                            <a:rPr lang="en-US" b="0" i="1" smtClean="0">
+                              <a:solidFill>
+                                <a:schemeClr val="tx1"/>
+                              </a:solidFill>
+                              <a:latin typeface="Cambria Math" panose="02040503050406030204" pitchFamily="18" charset="0"/>
+                            </a:rPr>
+                            <m:t>2</m:t>
+                          </m:r>
+                        </m:sub>
+                      </m:sSub>
+                      <m:r>
+                        <a:rPr lang="en-US" b="0" i="1" smtClean="0">
+                          <a:solidFill>
+                            <a:schemeClr val="tx1"/>
+                          </a:solidFill>
+                          <a:latin typeface="Cambria Math" panose="02040503050406030204" pitchFamily="18" charset="0"/>
+                        </a:rPr>
+                        <m:t>𝑓</m:t>
+                      </m:r>
+                      <m:d>
+                        <m:dPr>
+                          <m:ctrlPr>
+                            <a:rPr lang="en-US" b="0" i="1" smtClean="0">
+                              <a:solidFill>
+                                <a:schemeClr val="tx1"/>
+                              </a:solidFill>
+                              <a:latin typeface="Cambria Math" panose="02040503050406030204" pitchFamily="18" charset="0"/>
+                            </a:rPr>
+                          </m:ctrlPr>
+                        </m:dPr>
+                        <m:e>
+                          <m:r>
+                            <a:rPr lang="en-US" b="0" i="1" smtClean="0">
+                              <a:solidFill>
+                                <a:schemeClr val="tx1"/>
+                              </a:solidFill>
+                              <a:latin typeface="Cambria Math" panose="02040503050406030204" pitchFamily="18" charset="0"/>
+                            </a:rPr>
+                            <m:t>𝑠</m:t>
+                          </m:r>
+                          <m:r>
+                            <a:rPr lang="en-US" b="0" i="1" smtClean="0">
+                              <a:solidFill>
+                                <a:schemeClr val="tx1"/>
+                              </a:solidFill>
+                              <a:latin typeface="Cambria Math" panose="02040503050406030204" pitchFamily="18" charset="0"/>
+                            </a:rPr>
+                            <m:t>,</m:t>
+                          </m:r>
+                          <m:r>
+                            <a:rPr lang="en-US" b="0" i="1" smtClean="0">
+                              <a:solidFill>
+                                <a:schemeClr val="tx1"/>
+                              </a:solidFill>
+                              <a:latin typeface="Cambria Math" panose="02040503050406030204" pitchFamily="18" charset="0"/>
+                            </a:rPr>
+                            <m:t>𝑒</m:t>
+                          </m:r>
+                        </m:e>
+                      </m:d>
+                      <m:r>
+                        <a:rPr lang="en-US" b="0" i="1" smtClean="0">
+                          <a:solidFill>
+                            <a:schemeClr val="tx1"/>
+                          </a:solidFill>
+                          <a:latin typeface="Cambria Math" panose="02040503050406030204" pitchFamily="18" charset="0"/>
+                        </a:rPr>
+                        <m:t>−</m:t>
+                      </m:r>
+                      <m:r>
+                        <a:rPr lang="en-US" b="0" i="1" smtClean="0">
+                          <a:solidFill>
+                            <a:schemeClr val="tx1"/>
+                          </a:solidFill>
+                          <a:latin typeface="Cambria Math" panose="02040503050406030204" pitchFamily="18" charset="0"/>
+                        </a:rPr>
+                        <m:t>𝑑𝑡</m:t>
+                      </m:r>
+                      <m:r>
+                        <a:rPr lang="en-US" b="0" i="1" smtClean="0">
+                          <a:solidFill>
+                            <a:schemeClr val="tx1"/>
+                          </a:solidFill>
+                          <a:latin typeface="Cambria Math" panose="02040503050406030204" pitchFamily="18" charset="0"/>
+                        </a:rPr>
+                        <m:t> </m:t>
+                      </m:r>
+                    </m:oMath>
+                  </m:oMathPara>
+                </a14:m>
+                <a:endParaRPr lang="en-US" dirty="0"/>
+              </a:p>
+            </p:txBody>
+          </p:sp>
+        </mc:Choice>
+        <mc:Fallback>
+          <p:sp>
+            <p:nvSpPr>
+              <p:cNvPr id="6" name="TextBox 5">
+                <a:extLst>
+                  <a:ext uri="{FF2B5EF4-FFF2-40B4-BE49-F238E27FC236}">
+                    <a16:creationId xmlns:a16="http://schemas.microsoft.com/office/drawing/2014/main" id="{69037953-E05C-48B4-98F0-946922D2EB12}"/>
+                  </a:ext>
+                </a:extLst>
+              </p:cNvPr>
+              <p:cNvSpPr txBox="1">
+                <a:spLocks noRot="1" noChangeAspect="1" noMove="1" noResize="1" noEditPoints="1" noAdjustHandles="1" noChangeArrowheads="1" noChangeShapeType="1" noTextEdit="1"/>
+              </p:cNvSpPr>
+              <p:nvPr/>
+            </p:nvSpPr>
+            <p:spPr>
+              <a:xfrm>
+                <a:off x="978192" y="2149916"/>
+                <a:ext cx="2107308" cy="276999"/>
+              </a:xfrm>
+              <a:prstGeom prst="rect">
+                <a:avLst/>
+              </a:prstGeom>
+              <a:blipFill>
+                <a:blip r:embed="rId4"/>
+                <a:stretch>
+                  <a:fillRect l="-1734" t="-11111" b="-35556"/>
+                </a:stretch>
+              </a:blipFill>
+            </p:spPr>
+            <p:txBody>
+              <a:bodyPr/>
+              <a:lstStyle/>
+              <a:p>
+                <a:r>
+                  <a:rPr lang="en-US">
+                    <a:noFill/>
+                  </a:rPr>
+                  <a:t> </a:t>
+                </a:r>
+              </a:p>
+            </p:txBody>
+          </p:sp>
+        </mc:Fallback>
+      </mc:AlternateContent>
+      <mc:AlternateContent xmlns:mc="http://schemas.openxmlformats.org/markup-compatibility/2006">
+        <mc:Choice xmlns:a14="http://schemas.microsoft.com/office/drawing/2010/main" Requires="a14">
+          <p:sp>
+            <p:nvSpPr>
+              <p:cNvPr id="7" name="TextBox 6">
+                <a:extLst>
+                  <a:ext uri="{FF2B5EF4-FFF2-40B4-BE49-F238E27FC236}">
+                    <a16:creationId xmlns:a16="http://schemas.microsoft.com/office/drawing/2014/main" id="{DB2530DC-B261-4975-A828-C5740AD1BB9C}"/>
+                  </a:ext>
+                </a:extLst>
+              </p:cNvPr>
+              <p:cNvSpPr txBox="1"/>
+              <p:nvPr/>
+            </p:nvSpPr>
+            <p:spPr>
+              <a:xfrm>
+                <a:off x="978192" y="2506859"/>
+                <a:ext cx="3471143" cy="276999"/>
+              </a:xfrm>
+              <a:prstGeom prst="rect">
+                <a:avLst/>
+              </a:prstGeom>
+              <a:noFill/>
+            </p:spPr>
+            <p:txBody>
+              <a:bodyPr wrap="none" lIns="0" tIns="0" rIns="0" bIns="0" rtlCol="0" anchor="b">
+                <a:spAutoFit/>
+              </a:bodyPr>
+              <a:lstStyle/>
+              <a:p>
+                <a:pPr/>
+                <a14:m>
+                  <m:oMathPara xmlns:m="http://schemas.openxmlformats.org/officeDocument/2006/math">
+                    <m:oMathParaPr>
+                      <m:jc m:val="centerGroup"/>
+                    </m:oMathParaPr>
+                    <m:oMath xmlns:m="http://schemas.openxmlformats.org/officeDocument/2006/math">
+                      <m:acc>
+                        <m:accPr>
+                          <m:chr m:val="̇"/>
+                          <m:ctrlPr>
+                            <a:rPr lang="en-US" b="0" i="1" smtClean="0">
+                              <a:latin typeface="Cambria Math" panose="02040503050406030204" pitchFamily="18" charset="0"/>
+                            </a:rPr>
+                          </m:ctrlPr>
+                        </m:accPr>
+                        <m:e>
+                          <m:sSub>
+                            <m:sSubPr>
+                              <m:ctrlPr>
+                                <a:rPr lang="en-US" b="0" i="1" smtClean="0">
+                                  <a:solidFill>
+                                    <a:srgbClr val="FF0000"/>
+                                  </a:solidFill>
+                                  <a:latin typeface="Cambria Math" panose="02040503050406030204" pitchFamily="18" charset="0"/>
+                                </a:rPr>
+                              </m:ctrlPr>
+                            </m:sSubPr>
+                            <m:e>
+                              <m:r>
+                                <a:rPr lang="en-US" b="0" i="1" smtClean="0">
+                                  <a:solidFill>
+                                    <a:srgbClr val="FF0000"/>
+                                  </a:solidFill>
+                                  <a:latin typeface="Cambria Math" panose="02040503050406030204" pitchFamily="18" charset="0"/>
+                                </a:rPr>
+                                <m:t>𝑥</m:t>
+                              </m:r>
+                            </m:e>
+                            <m:sub>
+                              <m:r>
+                                <a:rPr lang="en-US" b="0" i="1" smtClean="0">
+                                  <a:solidFill>
+                                    <a:srgbClr val="FF0000"/>
+                                  </a:solidFill>
+                                  <a:latin typeface="Cambria Math" panose="02040503050406030204" pitchFamily="18" charset="0"/>
+                                </a:rPr>
+                                <m:t>1</m:t>
+                              </m:r>
+                            </m:sub>
+                          </m:sSub>
+                        </m:e>
+                      </m:acc>
+                      <m:r>
+                        <a:rPr lang="en-US" b="0" i="1" smtClean="0">
+                          <a:latin typeface="Cambria Math" panose="02040503050406030204" pitchFamily="18" charset="0"/>
+                        </a:rPr>
+                        <m:t>=</m:t>
+                      </m:r>
+                      <m:sSub>
+                        <m:sSubPr>
+                          <m:ctrlPr>
+                            <a:rPr lang="en-US" b="0" i="1" smtClean="0">
+                              <a:solidFill>
+                                <a:schemeClr val="tx1"/>
+                              </a:solidFill>
+                              <a:latin typeface="Cambria Math" panose="02040503050406030204" pitchFamily="18" charset="0"/>
+                            </a:rPr>
+                          </m:ctrlPr>
+                        </m:sSubPr>
+                        <m:e>
+                          <m:r>
+                            <a:rPr lang="en-US" b="0" i="1" smtClean="0">
+                              <a:solidFill>
+                                <a:schemeClr val="tx1"/>
+                              </a:solidFill>
+                              <a:latin typeface="Cambria Math" panose="02040503050406030204" pitchFamily="18" charset="0"/>
+                            </a:rPr>
+                            <m:t>𝑥</m:t>
+                          </m:r>
+                        </m:e>
+                        <m:sub>
+                          <m:r>
+                            <a:rPr lang="en-US" b="0" i="1" smtClean="0">
+                              <a:solidFill>
+                                <a:schemeClr val="tx1"/>
+                              </a:solidFill>
+                              <a:latin typeface="Cambria Math" panose="02040503050406030204" pitchFamily="18" charset="0"/>
+                            </a:rPr>
+                            <m:t>1</m:t>
+                          </m:r>
+                        </m:sub>
+                      </m:sSub>
+                      <m:r>
+                        <a:rPr lang="en-US" b="0" i="1" smtClean="0">
+                          <a:solidFill>
+                            <a:schemeClr val="tx1"/>
+                          </a:solidFill>
+                          <a:latin typeface="Cambria Math" panose="02040503050406030204" pitchFamily="18" charset="0"/>
+                        </a:rPr>
+                        <m:t>(</m:t>
+                      </m:r>
+                      <m:d>
+                        <m:dPr>
+                          <m:ctrlPr>
+                            <a:rPr lang="en-US" b="0" i="1" smtClean="0">
+                              <a:solidFill>
+                                <a:schemeClr val="tx1"/>
+                              </a:solidFill>
+                              <a:latin typeface="Cambria Math" panose="02040503050406030204" pitchFamily="18" charset="0"/>
+                            </a:rPr>
+                          </m:ctrlPr>
+                        </m:dPr>
+                        <m:e>
+                          <m:r>
+                            <a:rPr lang="en-US" b="0" i="1" smtClean="0">
+                              <a:solidFill>
+                                <a:schemeClr val="tx1"/>
+                              </a:solidFill>
+                              <a:latin typeface="Cambria Math" panose="02040503050406030204" pitchFamily="18" charset="0"/>
+                            </a:rPr>
+                            <m:t>1−</m:t>
+                          </m:r>
+                          <m:sSub>
+                            <m:sSubPr>
+                              <m:ctrlPr>
+                                <a:rPr lang="en-US" b="0" i="1" smtClean="0">
+                                  <a:solidFill>
+                                    <a:schemeClr val="tx1"/>
+                                  </a:solidFill>
+                                  <a:latin typeface="Cambria Math" panose="02040503050406030204" pitchFamily="18" charset="0"/>
+                                </a:rPr>
+                              </m:ctrlPr>
+                            </m:sSubPr>
+                            <m:e>
+                              <m:r>
+                                <a:rPr lang="en-US" b="0" i="1" smtClean="0">
+                                  <a:solidFill>
+                                    <a:schemeClr val="tx1"/>
+                                  </a:solidFill>
+                                  <a:latin typeface="Cambria Math" panose="02040503050406030204" pitchFamily="18" charset="0"/>
+                                </a:rPr>
+                                <m:t>𝑞</m:t>
+                              </m:r>
+                            </m:e>
+                            <m:sub>
+                              <m:r>
+                                <a:rPr lang="en-US" b="0" i="1" smtClean="0">
+                                  <a:solidFill>
+                                    <a:schemeClr val="tx1"/>
+                                  </a:solidFill>
+                                  <a:latin typeface="Cambria Math" panose="02040503050406030204" pitchFamily="18" charset="0"/>
+                                </a:rPr>
+                                <m:t>1</m:t>
+                              </m:r>
+                            </m:sub>
+                          </m:sSub>
+                        </m:e>
+                      </m:d>
+                      <m:r>
+                        <a:rPr lang="en-US" b="0" i="1" smtClean="0">
+                          <a:solidFill>
+                            <a:schemeClr val="tx1"/>
+                          </a:solidFill>
+                          <a:latin typeface="Cambria Math" panose="02040503050406030204" pitchFamily="18" charset="0"/>
+                        </a:rPr>
+                        <m:t>𝑓</m:t>
+                      </m:r>
+                      <m:d>
+                        <m:dPr>
+                          <m:ctrlPr>
+                            <a:rPr lang="en-US" b="0" i="1" smtClean="0">
+                              <a:solidFill>
+                                <a:schemeClr val="tx1"/>
+                              </a:solidFill>
+                              <a:latin typeface="Cambria Math" panose="02040503050406030204" pitchFamily="18" charset="0"/>
+                            </a:rPr>
+                          </m:ctrlPr>
+                        </m:dPr>
+                        <m:e>
+                          <m:r>
+                            <a:rPr lang="en-US" b="0" i="1" smtClean="0">
+                              <a:solidFill>
+                                <a:schemeClr val="tx1"/>
+                              </a:solidFill>
+                              <a:latin typeface="Cambria Math" panose="02040503050406030204" pitchFamily="18" charset="0"/>
+                            </a:rPr>
+                            <m:t>𝑠</m:t>
+                          </m:r>
+                          <m:r>
+                            <a:rPr lang="en-US" b="0" i="1" smtClean="0">
+                              <a:solidFill>
+                                <a:schemeClr val="tx1"/>
+                              </a:solidFill>
+                              <a:latin typeface="Cambria Math" panose="02040503050406030204" pitchFamily="18" charset="0"/>
+                            </a:rPr>
+                            <m:t>,</m:t>
+                          </m:r>
+                          <m:r>
+                            <a:rPr lang="en-US" b="0" i="1" smtClean="0">
+                              <a:solidFill>
+                                <a:schemeClr val="tx1"/>
+                              </a:solidFill>
+                              <a:latin typeface="Cambria Math" panose="02040503050406030204" pitchFamily="18" charset="0"/>
+                            </a:rPr>
+                            <m:t>𝑒</m:t>
+                          </m:r>
+                        </m:e>
+                      </m:d>
+                      <m:r>
+                        <a:rPr lang="en-US" b="0" i="1" smtClean="0">
+                          <a:solidFill>
+                            <a:schemeClr val="tx1"/>
+                          </a:solidFill>
+                          <a:latin typeface="Cambria Math" panose="02040503050406030204" pitchFamily="18" charset="0"/>
+                        </a:rPr>
+                        <m:t>−</m:t>
+                      </m:r>
+                      <m:r>
+                        <a:rPr lang="en-US" b="0" i="1" smtClean="0">
+                          <a:solidFill>
+                            <a:schemeClr val="tx1"/>
+                          </a:solidFill>
+                          <a:latin typeface="Cambria Math" panose="02040503050406030204" pitchFamily="18" charset="0"/>
+                        </a:rPr>
+                        <m:t>𝑑</m:t>
+                      </m:r>
+                      <m:r>
+                        <a:rPr lang="en-US" b="0" i="1" smtClean="0">
+                          <a:solidFill>
+                            <a:schemeClr val="tx1"/>
+                          </a:solidFill>
+                          <a:latin typeface="Cambria Math" panose="02040503050406030204" pitchFamily="18" charset="0"/>
+                        </a:rPr>
+                        <m:t>−</m:t>
+                      </m:r>
+                      <m:sSub>
+                        <m:sSubPr>
+                          <m:ctrlPr>
+                            <a:rPr lang="en-US" b="0" i="1" smtClean="0">
+                              <a:solidFill>
+                                <a:schemeClr val="tx1"/>
+                              </a:solidFill>
+                              <a:latin typeface="Cambria Math" panose="02040503050406030204" pitchFamily="18" charset="0"/>
+                            </a:rPr>
+                          </m:ctrlPr>
+                        </m:sSubPr>
+                        <m:e>
+                          <m:r>
+                            <a:rPr lang="en-US" b="0" i="1" smtClean="0">
+                              <a:solidFill>
+                                <a:schemeClr val="tx1"/>
+                              </a:solidFill>
+                              <a:latin typeface="Cambria Math" panose="02040503050406030204" pitchFamily="18" charset="0"/>
+                            </a:rPr>
+                            <m:t>𝑘</m:t>
+                          </m:r>
+                        </m:e>
+                        <m:sub>
+                          <m:r>
+                            <a:rPr lang="en-US" b="0" i="1" smtClean="0">
+                              <a:solidFill>
+                                <a:schemeClr val="tx1"/>
+                              </a:solidFill>
+                              <a:latin typeface="Cambria Math" panose="02040503050406030204" pitchFamily="18" charset="0"/>
+                            </a:rPr>
+                            <m:t>1</m:t>
+                          </m:r>
+                        </m:sub>
+                      </m:sSub>
+                      <m:r>
+                        <a:rPr lang="en-US" b="0" i="1" smtClean="0">
+                          <a:solidFill>
+                            <a:schemeClr val="tx1"/>
+                          </a:solidFill>
+                          <a:latin typeface="Cambria Math" panose="02040503050406030204" pitchFamily="18" charset="0"/>
+                        </a:rPr>
+                        <m:t>𝑡</m:t>
+                      </m:r>
+                      <m:r>
+                        <a:rPr lang="en-US" b="0" i="1" smtClean="0">
+                          <a:latin typeface="Cambria Math" panose="02040503050406030204" pitchFamily="18" charset="0"/>
+                        </a:rPr>
+                        <m:t>)</m:t>
+                      </m:r>
+                    </m:oMath>
+                  </m:oMathPara>
+                </a14:m>
+                <a:endParaRPr lang="en-US" dirty="0"/>
+              </a:p>
+            </p:txBody>
+          </p:sp>
+        </mc:Choice>
+        <mc:Fallback>
+          <p:sp>
+            <p:nvSpPr>
+              <p:cNvPr id="7" name="TextBox 6">
+                <a:extLst>
+                  <a:ext uri="{FF2B5EF4-FFF2-40B4-BE49-F238E27FC236}">
+                    <a16:creationId xmlns:a16="http://schemas.microsoft.com/office/drawing/2014/main" id="{DB2530DC-B261-4975-A828-C5740AD1BB9C}"/>
+                  </a:ext>
+                </a:extLst>
+              </p:cNvPr>
+              <p:cNvSpPr txBox="1">
+                <a:spLocks noRot="1" noChangeAspect="1" noMove="1" noResize="1" noEditPoints="1" noAdjustHandles="1" noChangeArrowheads="1" noChangeShapeType="1" noTextEdit="1"/>
+              </p:cNvSpPr>
+              <p:nvPr/>
+            </p:nvSpPr>
+            <p:spPr>
+              <a:xfrm>
+                <a:off x="978192" y="2506859"/>
+                <a:ext cx="3471143" cy="276999"/>
+              </a:xfrm>
+              <a:prstGeom prst="rect">
+                <a:avLst/>
+              </a:prstGeom>
+              <a:blipFill>
+                <a:blip r:embed="rId5"/>
+                <a:stretch>
+                  <a:fillRect l="-526" t="-2174" r="-1930" b="-34783"/>
+                </a:stretch>
+              </a:blipFill>
+            </p:spPr>
+            <p:txBody>
+              <a:bodyPr/>
+              <a:lstStyle/>
+              <a:p>
+                <a:r>
+                  <a:rPr lang="en-US">
+                    <a:noFill/>
+                  </a:rPr>
+                  <a:t> </a:t>
+                </a:r>
+              </a:p>
+            </p:txBody>
+          </p:sp>
+        </mc:Fallback>
+      </mc:AlternateContent>
+      <mc:AlternateContent xmlns:mc="http://schemas.openxmlformats.org/markup-compatibility/2006">
+        <mc:Choice xmlns:a14="http://schemas.microsoft.com/office/drawing/2010/main" Requires="a14">
+          <p:sp>
+            <p:nvSpPr>
+              <p:cNvPr id="8" name="TextBox 7">
+                <a:extLst>
+                  <a:ext uri="{FF2B5EF4-FFF2-40B4-BE49-F238E27FC236}">
+                    <a16:creationId xmlns:a16="http://schemas.microsoft.com/office/drawing/2014/main" id="{F6CE858C-18E9-4292-80F7-6A8A0ADAE59A}"/>
+                  </a:ext>
+                </a:extLst>
+              </p:cNvPr>
+              <p:cNvSpPr txBox="1"/>
+              <p:nvPr/>
+            </p:nvSpPr>
+            <p:spPr>
+              <a:xfrm>
+                <a:off x="952051" y="2850670"/>
+                <a:ext cx="2975430" cy="276999"/>
+              </a:xfrm>
+              <a:prstGeom prst="rect">
+                <a:avLst/>
+              </a:prstGeom>
+              <a:noFill/>
+            </p:spPr>
+            <p:txBody>
+              <a:bodyPr wrap="none" lIns="0" tIns="0" rIns="0" bIns="0" rtlCol="0" anchor="b">
+                <a:spAutoFit/>
+              </a:bodyPr>
+              <a:lstStyle/>
+              <a:p>
+                <a:pPr/>
+                <a14:m>
+                  <m:oMathPara xmlns:m="http://schemas.openxmlformats.org/officeDocument/2006/math">
+                    <m:oMathParaPr>
+                      <m:jc m:val="centerGroup"/>
+                    </m:oMathParaPr>
+                    <m:oMath xmlns:m="http://schemas.openxmlformats.org/officeDocument/2006/math">
+                      <m:acc>
+                        <m:accPr>
+                          <m:chr m:val="̇"/>
+                          <m:ctrlPr>
+                            <a:rPr lang="en-US" b="0" i="1" smtClean="0">
+                              <a:latin typeface="Cambria Math" panose="02040503050406030204" pitchFamily="18" charset="0"/>
+                            </a:rPr>
+                          </m:ctrlPr>
+                        </m:accPr>
+                        <m:e>
+                          <m:sSub>
+                            <m:sSubPr>
+                              <m:ctrlPr>
+                                <a:rPr lang="en-US" b="0" i="1" smtClean="0">
+                                  <a:solidFill>
+                                    <a:schemeClr val="accent1"/>
+                                  </a:solidFill>
+                                  <a:latin typeface="Cambria Math" panose="02040503050406030204" pitchFamily="18" charset="0"/>
+                                </a:rPr>
+                              </m:ctrlPr>
+                            </m:sSubPr>
+                            <m:e>
+                              <m:r>
+                                <a:rPr lang="en-US" b="0" i="1" smtClean="0">
+                                  <a:solidFill>
+                                    <a:schemeClr val="accent1"/>
+                                  </a:solidFill>
+                                  <a:latin typeface="Cambria Math" panose="02040503050406030204" pitchFamily="18" charset="0"/>
+                                </a:rPr>
+                                <m:t>𝑥</m:t>
+                              </m:r>
+                            </m:e>
+                            <m:sub>
+                              <m:r>
+                                <a:rPr lang="en-US" b="0" i="1" smtClean="0">
+                                  <a:solidFill>
+                                    <a:schemeClr val="accent1"/>
+                                  </a:solidFill>
+                                  <a:latin typeface="Cambria Math" panose="02040503050406030204" pitchFamily="18" charset="0"/>
+                                </a:rPr>
+                                <m:t>2</m:t>
+                              </m:r>
+                            </m:sub>
+                          </m:sSub>
+                        </m:e>
+                      </m:acc>
+                      <m:r>
+                        <a:rPr lang="en-US" b="0" i="1" smtClean="0">
+                          <a:latin typeface="Cambria Math" panose="02040503050406030204" pitchFamily="18" charset="0"/>
+                        </a:rPr>
+                        <m:t>=</m:t>
+                      </m:r>
+                      <m:sSub>
+                        <m:sSubPr>
+                          <m:ctrlPr>
+                            <a:rPr lang="en-US" b="0" i="1" smtClean="0">
+                              <a:solidFill>
+                                <a:schemeClr val="tx1"/>
+                              </a:solidFill>
+                              <a:latin typeface="Cambria Math" panose="02040503050406030204" pitchFamily="18" charset="0"/>
+                            </a:rPr>
+                          </m:ctrlPr>
+                        </m:sSubPr>
+                        <m:e>
+                          <m:r>
+                            <a:rPr lang="en-US" b="0" i="1" smtClean="0">
+                              <a:solidFill>
+                                <a:schemeClr val="tx1"/>
+                              </a:solidFill>
+                              <a:latin typeface="Cambria Math" panose="02040503050406030204" pitchFamily="18" charset="0"/>
+                            </a:rPr>
+                            <m:t>𝑥</m:t>
+                          </m:r>
+                        </m:e>
+                        <m:sub>
+                          <m:r>
+                            <a:rPr lang="en-US" b="0" i="1" smtClean="0">
+                              <a:solidFill>
+                                <a:schemeClr val="tx1"/>
+                              </a:solidFill>
+                              <a:latin typeface="Cambria Math" panose="02040503050406030204" pitchFamily="18" charset="0"/>
+                            </a:rPr>
+                            <m:t>2</m:t>
+                          </m:r>
+                        </m:sub>
+                      </m:sSub>
+                      <m:r>
+                        <a:rPr lang="en-US" b="0" i="1" smtClean="0">
+                          <a:solidFill>
+                            <a:schemeClr val="tx1"/>
+                          </a:solidFill>
+                          <a:latin typeface="Cambria Math" panose="02040503050406030204" pitchFamily="18" charset="0"/>
+                        </a:rPr>
+                        <m:t>(</m:t>
+                      </m:r>
+                      <m:d>
+                        <m:dPr>
+                          <m:ctrlPr>
+                            <a:rPr lang="en-US" b="0" i="1" smtClean="0">
+                              <a:solidFill>
+                                <a:schemeClr val="tx1"/>
+                              </a:solidFill>
+                              <a:latin typeface="Cambria Math" panose="02040503050406030204" pitchFamily="18" charset="0"/>
+                            </a:rPr>
+                          </m:ctrlPr>
+                        </m:dPr>
+                        <m:e>
+                          <m:r>
+                            <a:rPr lang="en-US" b="0" i="1" smtClean="0">
+                              <a:solidFill>
+                                <a:schemeClr val="tx1"/>
+                              </a:solidFill>
+                              <a:latin typeface="Cambria Math" panose="02040503050406030204" pitchFamily="18" charset="0"/>
+                            </a:rPr>
+                            <m:t>1−</m:t>
+                          </m:r>
+                          <m:sSub>
+                            <m:sSubPr>
+                              <m:ctrlPr>
+                                <a:rPr lang="en-US" b="0" i="1" smtClean="0">
+                                  <a:solidFill>
+                                    <a:schemeClr val="tx1"/>
+                                  </a:solidFill>
+                                  <a:latin typeface="Cambria Math" panose="02040503050406030204" pitchFamily="18" charset="0"/>
+                                </a:rPr>
+                              </m:ctrlPr>
+                            </m:sSubPr>
+                            <m:e>
+                              <m:r>
+                                <a:rPr lang="en-US" b="0" i="1" smtClean="0">
+                                  <a:solidFill>
+                                    <a:schemeClr val="tx1"/>
+                                  </a:solidFill>
+                                  <a:latin typeface="Cambria Math" panose="02040503050406030204" pitchFamily="18" charset="0"/>
+                                </a:rPr>
+                                <m:t>𝑞</m:t>
+                              </m:r>
+                            </m:e>
+                            <m:sub>
+                              <m:r>
+                                <a:rPr lang="en-US" b="0" i="1" smtClean="0">
+                                  <a:solidFill>
+                                    <a:schemeClr val="tx1"/>
+                                  </a:solidFill>
+                                  <a:latin typeface="Cambria Math" panose="02040503050406030204" pitchFamily="18" charset="0"/>
+                                </a:rPr>
+                                <m:t>2</m:t>
+                              </m:r>
+                            </m:sub>
+                          </m:sSub>
+                        </m:e>
+                      </m:d>
+                      <m:r>
+                        <a:rPr lang="en-US" b="0" i="1" smtClean="0">
+                          <a:solidFill>
+                            <a:schemeClr val="tx1"/>
+                          </a:solidFill>
+                          <a:latin typeface="Cambria Math" panose="02040503050406030204" pitchFamily="18" charset="0"/>
+                        </a:rPr>
+                        <m:t>𝑓</m:t>
+                      </m:r>
+                      <m:d>
+                        <m:dPr>
+                          <m:ctrlPr>
+                            <a:rPr lang="en-US" b="0" i="1" smtClean="0">
+                              <a:solidFill>
+                                <a:schemeClr val="tx1"/>
+                              </a:solidFill>
+                              <a:latin typeface="Cambria Math" panose="02040503050406030204" pitchFamily="18" charset="0"/>
+                            </a:rPr>
+                          </m:ctrlPr>
+                        </m:dPr>
+                        <m:e>
+                          <m:r>
+                            <a:rPr lang="en-US" b="0" i="1" smtClean="0">
+                              <a:solidFill>
+                                <a:schemeClr val="tx1"/>
+                              </a:solidFill>
+                              <a:latin typeface="Cambria Math" panose="02040503050406030204" pitchFamily="18" charset="0"/>
+                            </a:rPr>
+                            <m:t>𝑠</m:t>
+                          </m:r>
+                          <m:r>
+                            <a:rPr lang="en-US" b="0" i="1" smtClean="0">
+                              <a:solidFill>
+                                <a:schemeClr val="tx1"/>
+                              </a:solidFill>
+                              <a:latin typeface="Cambria Math" panose="02040503050406030204" pitchFamily="18" charset="0"/>
+                            </a:rPr>
+                            <m:t>,</m:t>
+                          </m:r>
+                          <m:r>
+                            <a:rPr lang="en-US" b="0" i="1" smtClean="0">
+                              <a:solidFill>
+                                <a:schemeClr val="tx1"/>
+                              </a:solidFill>
+                              <a:latin typeface="Cambria Math" panose="02040503050406030204" pitchFamily="18" charset="0"/>
+                            </a:rPr>
+                            <m:t>𝑒</m:t>
+                          </m:r>
+                        </m:e>
+                      </m:d>
+                      <m:r>
+                        <a:rPr lang="en-US" b="0" i="1" smtClean="0">
+                          <a:solidFill>
+                            <a:schemeClr val="tx1"/>
+                          </a:solidFill>
+                          <a:latin typeface="Cambria Math" panose="02040503050406030204" pitchFamily="18" charset="0"/>
+                        </a:rPr>
+                        <m:t>−</m:t>
+                      </m:r>
+                      <m:r>
+                        <a:rPr lang="en-US" b="0" i="1" smtClean="0">
+                          <a:solidFill>
+                            <a:schemeClr val="tx1"/>
+                          </a:solidFill>
+                          <a:latin typeface="Cambria Math" panose="02040503050406030204" pitchFamily="18" charset="0"/>
+                        </a:rPr>
+                        <m:t>𝑑</m:t>
+                      </m:r>
+                      <m:r>
+                        <a:rPr lang="en-US" b="0" i="1" smtClean="0">
+                          <a:latin typeface="Cambria Math" panose="02040503050406030204" pitchFamily="18" charset="0"/>
+                        </a:rPr>
+                        <m:t>)</m:t>
+                      </m:r>
+                    </m:oMath>
+                  </m:oMathPara>
+                </a14:m>
+                <a:endParaRPr lang="en-US" dirty="0"/>
+              </a:p>
+            </p:txBody>
+          </p:sp>
+        </mc:Choice>
+        <mc:Fallback>
+          <p:sp>
+            <p:nvSpPr>
+              <p:cNvPr id="8" name="TextBox 7">
+                <a:extLst>
+                  <a:ext uri="{FF2B5EF4-FFF2-40B4-BE49-F238E27FC236}">
+                    <a16:creationId xmlns:a16="http://schemas.microsoft.com/office/drawing/2014/main" id="{F6CE858C-18E9-4292-80F7-6A8A0ADAE59A}"/>
+                  </a:ext>
+                </a:extLst>
+              </p:cNvPr>
+              <p:cNvSpPr txBox="1">
+                <a:spLocks noRot="1" noChangeAspect="1" noMove="1" noResize="1" noEditPoints="1" noAdjustHandles="1" noChangeArrowheads="1" noChangeShapeType="1" noTextEdit="1"/>
+              </p:cNvSpPr>
+              <p:nvPr/>
+            </p:nvSpPr>
+            <p:spPr>
+              <a:xfrm>
+                <a:off x="952051" y="2850670"/>
+                <a:ext cx="2975430" cy="276999"/>
+              </a:xfrm>
+              <a:prstGeom prst="rect">
+                <a:avLst/>
+              </a:prstGeom>
+              <a:blipFill>
+                <a:blip r:embed="rId6"/>
+                <a:stretch>
+                  <a:fillRect t="-2222" r="-820" b="-35556"/>
+                </a:stretch>
+              </a:blipFill>
+            </p:spPr>
+            <p:txBody>
+              <a:bodyPr/>
+              <a:lstStyle/>
+              <a:p>
+                <a:r>
+                  <a:rPr lang="en-US">
+                    <a:noFill/>
+                  </a:rPr>
+                  <a:t> </a:t>
+                </a:r>
+              </a:p>
+            </p:txBody>
+          </p:sp>
+        </mc:Fallback>
+      </mc:AlternateContent>
+      <mc:AlternateContent xmlns:mc="http://schemas.openxmlformats.org/markup-compatibility/2006">
+        <mc:Choice xmlns:a14="http://schemas.microsoft.com/office/drawing/2010/main" Requires="a14">
+          <p:sp>
+            <p:nvSpPr>
+              <p:cNvPr id="28" name="Rectangle 27">
+                <a:extLst>
+                  <a:ext uri="{FF2B5EF4-FFF2-40B4-BE49-F238E27FC236}">
+                    <a16:creationId xmlns:a16="http://schemas.microsoft.com/office/drawing/2014/main" id="{9D9C9A13-9B9C-46EA-90A9-9A94B74122EF}"/>
+                  </a:ext>
+                </a:extLst>
+              </p:cNvPr>
+              <p:cNvSpPr/>
+              <p:nvPr/>
+            </p:nvSpPr>
+            <p:spPr>
+              <a:xfrm>
+                <a:off x="952051" y="3551424"/>
+                <a:ext cx="3658049" cy="1909112"/>
+              </a:xfrm>
+              <a:prstGeom prst="rect">
+                <a:avLst/>
+              </a:prstGeom>
+              <a:ln>
+                <a:solidFill>
+                  <a:schemeClr val="tx1"/>
+                </a:solidFill>
+              </a:ln>
+            </p:spPr>
+            <p:txBody>
+              <a:bodyPr wrap="square">
+                <a:spAutoFit/>
+              </a:bodyPr>
+              <a:lstStyle/>
+              <a:p>
+                <a:r>
+                  <a:rPr lang="en-US" dirty="0">
+                    <a:latin typeface="Cambria Math" panose="02040503050406030204" pitchFamily="18" charset="0"/>
+                  </a:rPr>
+                  <a:t> Analysis says,</a:t>
+                </a:r>
+                <a:r>
+                  <a:rPr lang="en-US" dirty="0"/>
+                  <a:t> </a:t>
+                </a:r>
+                <a14:m>
+                  <m:oMath xmlns:m="http://schemas.openxmlformats.org/officeDocument/2006/math">
+                    <m:sSub>
+                      <m:sSubPr>
+                        <m:ctrlPr>
+                          <a:rPr lang="en-US" i="1">
+                            <a:latin typeface="Cambria Math" panose="02040503050406030204" pitchFamily="18" charset="0"/>
+                          </a:rPr>
+                        </m:ctrlPr>
+                      </m:sSubPr>
+                      <m:e>
+                        <m:r>
+                          <a:rPr lang="en-US" i="1">
+                            <a:latin typeface="Cambria Math" panose="02040503050406030204" pitchFamily="18" charset="0"/>
+                          </a:rPr>
+                          <m:t>𝑥</m:t>
+                        </m:r>
+                      </m:e>
+                      <m:sub>
+                        <m:r>
+                          <a:rPr lang="en-US" i="1">
+                            <a:latin typeface="Cambria Math" panose="02040503050406030204" pitchFamily="18" charset="0"/>
+                          </a:rPr>
+                          <m:t>1</m:t>
+                        </m:r>
+                      </m:sub>
+                    </m:sSub>
+                    <m:r>
+                      <a:rPr lang="en-US" i="1">
+                        <a:latin typeface="Cambria Math" panose="02040503050406030204" pitchFamily="18" charset="0"/>
+                      </a:rPr>
+                      <m:t>, </m:t>
+                    </m:r>
+                    <m:sSub>
+                      <m:sSubPr>
+                        <m:ctrlPr>
+                          <a:rPr lang="en-US" i="1">
+                            <a:latin typeface="Cambria Math" panose="02040503050406030204" pitchFamily="18" charset="0"/>
+                          </a:rPr>
+                        </m:ctrlPr>
+                      </m:sSubPr>
+                      <m:e>
+                        <m:r>
+                          <a:rPr lang="en-US" i="1">
+                            <a:latin typeface="Cambria Math" panose="02040503050406030204" pitchFamily="18" charset="0"/>
+                          </a:rPr>
+                          <m:t>𝑥</m:t>
+                        </m:r>
+                      </m:e>
+                      <m:sub>
+                        <m:r>
+                          <a:rPr lang="en-US" b="0" i="1" smtClean="0">
+                            <a:latin typeface="Cambria Math" panose="02040503050406030204" pitchFamily="18" charset="0"/>
+                          </a:rPr>
+                          <m:t>2</m:t>
+                        </m:r>
+                      </m:sub>
+                    </m:sSub>
+                    <m:r>
+                      <a:rPr lang="en-US" i="1">
+                        <a:latin typeface="Cambria Math" panose="02040503050406030204" pitchFamily="18" charset="0"/>
+                      </a:rPr>
+                      <m:t>&gt;0, </m:t>
+                    </m:r>
+                    <m:sSub>
+                      <m:sSubPr>
+                        <m:ctrlPr>
+                          <a:rPr lang="en-US" i="1">
+                            <a:latin typeface="Cambria Math" panose="02040503050406030204" pitchFamily="18" charset="0"/>
+                          </a:rPr>
+                        </m:ctrlPr>
+                      </m:sSubPr>
+                      <m:e>
+                        <m:r>
+                          <a:rPr lang="en-US" i="1">
+                            <a:latin typeface="Cambria Math" panose="02040503050406030204" pitchFamily="18" charset="0"/>
+                          </a:rPr>
+                          <m:t>𝑥</m:t>
+                        </m:r>
+                      </m:e>
+                      <m:sub>
+                        <m:r>
+                          <a:rPr lang="en-US" b="0" i="1" smtClean="0">
+                            <a:latin typeface="Cambria Math" panose="02040503050406030204" pitchFamily="18" charset="0"/>
+                          </a:rPr>
+                          <m:t>3</m:t>
+                        </m:r>
+                      </m:sub>
+                    </m:sSub>
+                    <m:r>
+                      <a:rPr lang="en-US" i="1">
+                        <a:latin typeface="Cambria Math" panose="02040503050406030204" pitchFamily="18" charset="0"/>
+                      </a:rPr>
+                      <m:t>=0:</m:t>
+                    </m:r>
+                  </m:oMath>
+                </a14:m>
+                <a:br>
+                  <a:rPr lang="en-US" i="1" dirty="0">
+                    <a:latin typeface="Cambria Math" panose="02040503050406030204" pitchFamily="18" charset="0"/>
+                  </a:rPr>
+                </a:br>
+                <a:r>
+                  <a:rPr lang="en-US" i="1" dirty="0">
+                    <a:latin typeface="Cambria Math" panose="02040503050406030204" pitchFamily="18" charset="0"/>
+                  </a:rPr>
+                  <a:t>	</a:t>
+                </a:r>
+              </a:p>
+              <a:p>
+                <a:pPr/>
+                <a:r>
+                  <a:rPr lang="en-US" i="1" dirty="0">
+                    <a:latin typeface="Cambria Math" panose="02040503050406030204" pitchFamily="18" charset="0"/>
+                  </a:rPr>
+                  <a:t>	      </a:t>
+                </a:r>
+                <a:r>
+                  <a:rPr lang="en-US" dirty="0">
+                    <a:latin typeface="Cambria Math" panose="02040503050406030204" pitchFamily="18" charset="0"/>
+                  </a:rPr>
+                  <a:t>Requires: </a:t>
+                </a:r>
+                <a:br>
+                  <a:rPr lang="en-US" dirty="0">
+                    <a:latin typeface="Cambria Math" panose="02040503050406030204" pitchFamily="18" charset="0"/>
+                  </a:rPr>
+                </a:br>
+                <a14:m>
+                  <m:oMath xmlns:m="http://schemas.openxmlformats.org/officeDocument/2006/math">
+                    <m:r>
+                      <a:rPr lang="en-US" b="0" i="0" smtClean="0">
+                        <a:latin typeface="Cambria Math" panose="02040503050406030204" pitchFamily="18" charset="0"/>
+                      </a:rPr>
+                      <m:t>  </m:t>
+                    </m:r>
+                    <m:r>
+                      <a:rPr lang="en-US" i="1">
+                        <a:latin typeface="Cambria Math" panose="02040503050406030204" pitchFamily="18" charset="0"/>
+                      </a:rPr>
+                      <m:t>𝑓</m:t>
+                    </m:r>
+                    <m:d>
+                      <m:dPr>
+                        <m:ctrlPr>
+                          <a:rPr lang="en-US" i="1">
+                            <a:latin typeface="Cambria Math" panose="02040503050406030204" pitchFamily="18" charset="0"/>
+                          </a:rPr>
+                        </m:ctrlPr>
+                      </m:dPr>
+                      <m:e>
+                        <m:r>
+                          <a:rPr lang="en-US" i="1">
+                            <a:latin typeface="Cambria Math" panose="02040503050406030204" pitchFamily="18" charset="0"/>
+                          </a:rPr>
+                          <m:t>𝑠</m:t>
+                        </m:r>
+                        <m:r>
+                          <a:rPr lang="en-US" i="1">
+                            <a:latin typeface="Cambria Math" panose="02040503050406030204" pitchFamily="18" charset="0"/>
+                          </a:rPr>
+                          <m:t>,</m:t>
+                        </m:r>
+                        <m:r>
+                          <a:rPr lang="en-US" i="1">
+                            <a:latin typeface="Cambria Math" panose="02040503050406030204" pitchFamily="18" charset="0"/>
+                          </a:rPr>
+                          <m:t>𝑒</m:t>
+                        </m:r>
+                      </m:e>
+                    </m:d>
+                    <m:r>
+                      <a:rPr lang="en-US" i="1">
+                        <a:latin typeface="Cambria Math" panose="02040503050406030204" pitchFamily="18" charset="0"/>
+                      </a:rPr>
+                      <m:t>=</m:t>
+                    </m:r>
+                    <m:f>
+                      <m:fPr>
+                        <m:ctrlPr>
+                          <a:rPr lang="en-US" i="1">
+                            <a:latin typeface="Cambria Math" panose="02040503050406030204" pitchFamily="18" charset="0"/>
+                          </a:rPr>
+                        </m:ctrlPr>
+                      </m:fPr>
+                      <m:num>
+                        <m:r>
+                          <a:rPr lang="en-US" i="1">
+                            <a:latin typeface="Cambria Math" panose="02040503050406030204" pitchFamily="18" charset="0"/>
+                          </a:rPr>
+                          <m:t>𝑑</m:t>
+                        </m:r>
+                      </m:num>
+                      <m:den>
+                        <m:r>
+                          <a:rPr lang="en-US" i="1">
+                            <a:latin typeface="Cambria Math" panose="02040503050406030204" pitchFamily="18" charset="0"/>
+                          </a:rPr>
+                          <m:t>1−</m:t>
+                        </m:r>
+                        <m:sSub>
+                          <m:sSubPr>
+                            <m:ctrlPr>
+                              <a:rPr lang="en-US" i="1">
+                                <a:latin typeface="Cambria Math" panose="02040503050406030204" pitchFamily="18" charset="0"/>
+                              </a:rPr>
+                            </m:ctrlPr>
+                          </m:sSubPr>
+                          <m:e>
+                            <m:r>
+                              <a:rPr lang="en-US" i="1">
+                                <a:latin typeface="Cambria Math" panose="02040503050406030204" pitchFamily="18" charset="0"/>
+                              </a:rPr>
+                              <m:t>𝑞</m:t>
+                            </m:r>
+                          </m:e>
+                          <m:sub>
+                            <m:r>
+                              <a:rPr lang="en-US" b="0" i="1" smtClean="0">
+                                <a:latin typeface="Cambria Math" panose="02040503050406030204" pitchFamily="18" charset="0"/>
+                              </a:rPr>
+                              <m:t>2</m:t>
+                            </m:r>
+                          </m:sub>
+                        </m:sSub>
+                      </m:den>
+                    </m:f>
+                  </m:oMath>
+                </a14:m>
+                <a:r>
+                  <a:rPr lang="en-US" dirty="0">
+                    <a:latin typeface="Cambria Math" panose="02040503050406030204" pitchFamily="18" charset="0"/>
+                  </a:rPr>
+                  <a:t> is sufficiently small</a:t>
+                </a:r>
+              </a:p>
+              <a:p>
+                <a14:m>
+                  <m:oMathPara xmlns:m="http://schemas.openxmlformats.org/officeDocument/2006/math">
+                    <m:oMathParaPr>
+                      <m:jc m:val="centerGroup"/>
+                    </m:oMathParaPr>
+                    <m:oMath xmlns:m="http://schemas.openxmlformats.org/officeDocument/2006/math">
+                      <m:sSub>
+                        <m:sSubPr>
+                          <m:ctrlPr>
+                            <a:rPr lang="en-US" b="0" i="1" smtClean="0">
+                              <a:latin typeface="Cambria Math" panose="02040503050406030204" pitchFamily="18" charset="0"/>
+                            </a:rPr>
+                          </m:ctrlPr>
+                        </m:sSubPr>
+                        <m:e>
+                          <m:r>
+                            <a:rPr lang="en-US" b="0" i="1" smtClean="0">
+                              <a:latin typeface="Cambria Math" panose="02040503050406030204" pitchFamily="18" charset="0"/>
+                            </a:rPr>
+                            <m:t>𝑘</m:t>
+                          </m:r>
+                        </m:e>
+                        <m:sub>
+                          <m:r>
+                            <a:rPr lang="en-US" b="0" i="1" smtClean="0">
+                              <a:latin typeface="Cambria Math" panose="02040503050406030204" pitchFamily="18" charset="0"/>
+                            </a:rPr>
+                            <m:t>1</m:t>
+                          </m:r>
+                        </m:sub>
+                      </m:sSub>
+                      <m:r>
+                        <a:rPr lang="en-US" b="0" i="1" smtClean="0">
+                          <a:latin typeface="Cambria Math" panose="02040503050406030204" pitchFamily="18" charset="0"/>
+                        </a:rPr>
+                        <m:t>&lt;</m:t>
+                      </m:r>
+                      <m:sSub>
+                        <m:sSubPr>
+                          <m:ctrlPr>
+                            <a:rPr lang="en-US" b="0" i="1" smtClean="0">
+                              <a:latin typeface="Cambria Math" panose="02040503050406030204" pitchFamily="18" charset="0"/>
+                            </a:rPr>
+                          </m:ctrlPr>
+                        </m:sSubPr>
+                        <m:e>
+                          <m:r>
+                            <a:rPr lang="en-US" b="0" i="1" smtClean="0">
+                              <a:latin typeface="Cambria Math" panose="02040503050406030204" pitchFamily="18" charset="0"/>
+                            </a:rPr>
+                            <m:t>𝑘</m:t>
+                          </m:r>
+                        </m:e>
+                        <m:sub>
+                          <m:r>
+                            <a:rPr lang="en-US" b="0" i="1" smtClean="0">
+                              <a:latin typeface="Cambria Math" panose="02040503050406030204" pitchFamily="18" charset="0"/>
+                            </a:rPr>
+                            <m:t>3</m:t>
+                          </m:r>
+                        </m:sub>
+                      </m:sSub>
+                      <m:r>
+                        <a:rPr lang="en-US" b="0" i="1" smtClean="0">
+                          <a:latin typeface="Cambria Math" panose="02040503050406030204" pitchFamily="18" charset="0"/>
+                        </a:rPr>
+                        <m:t>, </m:t>
+                      </m:r>
+                      <m:sSub>
+                        <m:sSubPr>
+                          <m:ctrlPr>
+                            <a:rPr lang="en-US" b="0" i="1" smtClean="0">
+                              <a:latin typeface="Cambria Math" panose="02040503050406030204" pitchFamily="18" charset="0"/>
+                            </a:rPr>
+                          </m:ctrlPr>
+                        </m:sSubPr>
+                        <m:e>
+                          <m:r>
+                            <a:rPr lang="en-US" b="0" i="1" smtClean="0">
+                              <a:latin typeface="Cambria Math" panose="02040503050406030204" pitchFamily="18" charset="0"/>
+                            </a:rPr>
+                            <m:t> </m:t>
+                          </m:r>
+                          <m:r>
+                            <a:rPr lang="en-US" b="0" i="1" smtClean="0">
+                              <a:latin typeface="Cambria Math" panose="02040503050406030204" pitchFamily="18" charset="0"/>
+                            </a:rPr>
+                            <m:t>𝑞</m:t>
+                          </m:r>
+                        </m:e>
+                        <m:sub>
+                          <m:r>
+                            <a:rPr lang="en-US" b="0" i="1" smtClean="0">
+                              <a:latin typeface="Cambria Math" panose="02040503050406030204" pitchFamily="18" charset="0"/>
+                            </a:rPr>
+                            <m:t>2</m:t>
+                          </m:r>
+                        </m:sub>
+                      </m:sSub>
+                      <m:r>
+                        <a:rPr lang="en-US" b="0" i="1" smtClean="0">
+                          <a:latin typeface="Cambria Math" panose="02040503050406030204" pitchFamily="18" charset="0"/>
+                        </a:rPr>
+                        <m:t>&gt;</m:t>
+                      </m:r>
+                      <m:sSub>
+                        <m:sSubPr>
+                          <m:ctrlPr>
+                            <a:rPr lang="en-US" b="0" i="1" smtClean="0">
+                              <a:latin typeface="Cambria Math" panose="02040503050406030204" pitchFamily="18" charset="0"/>
+                            </a:rPr>
+                          </m:ctrlPr>
+                        </m:sSubPr>
+                        <m:e>
+                          <m:r>
+                            <a:rPr lang="en-US" b="0" i="1" smtClean="0">
+                              <a:latin typeface="Cambria Math" panose="02040503050406030204" pitchFamily="18" charset="0"/>
+                            </a:rPr>
+                            <m:t>𝑞</m:t>
+                          </m:r>
+                        </m:e>
+                        <m:sub>
+                          <m:r>
+                            <a:rPr lang="en-US" b="0" i="1" smtClean="0">
+                              <a:latin typeface="Cambria Math" panose="02040503050406030204" pitchFamily="18" charset="0"/>
+                            </a:rPr>
+                            <m:t>1</m:t>
+                          </m:r>
+                        </m:sub>
+                      </m:sSub>
+                    </m:oMath>
+                  </m:oMathPara>
+                </a14:m>
+                <a:endParaRPr lang="en-US" dirty="0"/>
+              </a:p>
+              <a:p>
+                <a:endParaRPr lang="en-US" dirty="0"/>
+              </a:p>
+            </p:txBody>
+          </p:sp>
+        </mc:Choice>
+        <mc:Fallback>
+          <p:sp>
+            <p:nvSpPr>
+              <p:cNvPr id="28" name="Rectangle 27">
+                <a:extLst>
+                  <a:ext uri="{FF2B5EF4-FFF2-40B4-BE49-F238E27FC236}">
+                    <a16:creationId xmlns:a16="http://schemas.microsoft.com/office/drawing/2014/main" id="{9D9C9A13-9B9C-46EA-90A9-9A94B74122EF}"/>
+                  </a:ext>
+                </a:extLst>
+              </p:cNvPr>
+              <p:cNvSpPr>
+                <a:spLocks noRot="1" noChangeAspect="1" noMove="1" noResize="1" noEditPoints="1" noAdjustHandles="1" noChangeArrowheads="1" noChangeShapeType="1" noTextEdit="1"/>
+              </p:cNvSpPr>
+              <p:nvPr/>
+            </p:nvSpPr>
+            <p:spPr>
+              <a:xfrm>
+                <a:off x="952051" y="3551424"/>
+                <a:ext cx="3658049" cy="1909112"/>
+              </a:xfrm>
+              <a:prstGeom prst="rect">
+                <a:avLst/>
+              </a:prstGeom>
+              <a:blipFill>
+                <a:blip r:embed="rId7"/>
+                <a:stretch>
+                  <a:fillRect t="-2222"/>
+                </a:stretch>
+              </a:blipFill>
+              <a:ln>
+                <a:solidFill>
+                  <a:schemeClr val="tx1"/>
+                </a:solidFill>
+              </a:ln>
+            </p:spPr>
+            <p:txBody>
+              <a:bodyPr/>
+              <a:lstStyle/>
+              <a:p>
+                <a:r>
+                  <a:rPr lang="en-US">
+                    <a:noFill/>
+                  </a:rPr>
+                  <a:t> </a:t>
+                </a:r>
+              </a:p>
+            </p:txBody>
+          </p:sp>
+        </mc:Fallback>
+      </mc:AlternateContent>
     </p:spTree>
     <p:extLst>
       <p:ext uri="{BB962C8B-B14F-4D97-AF65-F5344CB8AC3E}">
         <p14:creationId xmlns:p14="http://schemas.microsoft.com/office/powerpoint/2010/main" val="3531423447"/>
-      </p:ext>
-    </p:extLst>
-  </p:cSld>
-  <p:clrMapOvr>
-    <a:masterClrMapping/>
-  </p:clrMapOvr>
-</p:sld>
-</file>
-
-<file path=ppt/slides/slide9.xml><?xml version="1.0" encoding="utf-8"?>
-<p:sld xmlns:a="http://schemas.openxmlformats.org/drawingml/2006/main" xmlns:r="http://schemas.openxmlformats.org/officeDocument/2006/relationships" xmlns:p="http://schemas.openxmlformats.org/presentationml/2006/main">
-  <p:cSld>
-    <p:spTree>
-      <p:nvGrpSpPr>
-        <p:cNvPr id="1" name=""/>
-        <p:cNvGrpSpPr/>
-        <p:nvPr/>
-      </p:nvGrpSpPr>
-      <p:grpSpPr>
-        <a:xfrm>
-          <a:off x="0" y="0"/>
-          <a:ext cx="0" cy="0"/>
-          <a:chOff x="0" y="0"/>
-          <a:chExt cx="0" cy="0"/>
-        </a:xfrm>
-      </p:grpSpPr>
-      <p:sp>
-        <p:nvSpPr>
-          <p:cNvPr id="2" name="Title 1">
-            <a:extLst>
-              <a:ext uri="{FF2B5EF4-FFF2-40B4-BE49-F238E27FC236}">
-                <a16:creationId xmlns:a16="http://schemas.microsoft.com/office/drawing/2014/main" id="{77A8C97A-2E5F-499F-860C-69BE8ED54F89}"/>
-              </a:ext>
-            </a:extLst>
-          </p:cNvPr>
-          <p:cNvSpPr>
-            <a:spLocks noGrp="1"/>
-          </p:cNvSpPr>
-          <p:nvPr>
-            <p:ph type="title"/>
-          </p:nvPr>
-        </p:nvSpPr>
-        <p:spPr/>
-        <p:txBody>
-          <a:bodyPr>
-            <a:normAutofit/>
-          </a:bodyPr>
-          <a:lstStyle/>
-          <a:p>
-            <a:r>
-              <a:rPr lang="en-US" sz="3600" b="1" dirty="0"/>
-              <a:t>A stable population of cooperators and policers exists</a:t>
-            </a:r>
-          </a:p>
-        </p:txBody>
-      </p:sp>
-      <p:pic>
-        <p:nvPicPr>
-          <p:cNvPr id="5" name="Picture 4" descr="A close up of text on a white background&#10;&#10;Description generated with high confidence">
-            <a:extLst>
-              <a:ext uri="{FF2B5EF4-FFF2-40B4-BE49-F238E27FC236}">
-                <a16:creationId xmlns:a16="http://schemas.microsoft.com/office/drawing/2014/main" id="{23254A1B-644B-4E0D-9A87-C43BCDBC810D}"/>
-              </a:ext>
-            </a:extLst>
-          </p:cNvPr>
-          <p:cNvPicPr>
-            <a:picLocks noChangeAspect="1"/>
-          </p:cNvPicPr>
-          <p:nvPr/>
-        </p:nvPicPr>
-        <p:blipFill>
-          <a:blip r:embed="rId2">
-            <a:extLst>
-              <a:ext uri="{28A0092B-C50C-407E-A947-70E740481C1C}">
-                <a14:useLocalDpi xmlns:a14="http://schemas.microsoft.com/office/drawing/2010/main" val="0"/>
-              </a:ext>
-            </a:extLst>
-          </a:blip>
-          <a:stretch>
-            <a:fillRect/>
-          </a:stretch>
-        </p:blipFill>
-        <p:spPr>
-          <a:xfrm>
-            <a:off x="2989811" y="1612900"/>
-            <a:ext cx="5788429" cy="4341322"/>
-          </a:xfrm>
-          <a:prstGeom prst="rect">
-            <a:avLst/>
-          </a:prstGeom>
-          <a:ln>
-            <a:solidFill>
-              <a:schemeClr val="tx1"/>
-            </a:solidFill>
-          </a:ln>
-        </p:spPr>
-      </p:pic>
-      <p:sp>
-        <p:nvSpPr>
-          <p:cNvPr id="3" name="TextBox 2">
-            <a:extLst>
-              <a:ext uri="{FF2B5EF4-FFF2-40B4-BE49-F238E27FC236}">
-                <a16:creationId xmlns:a16="http://schemas.microsoft.com/office/drawing/2014/main" id="{3771B25A-7FE9-4E96-ACAD-E862A5C8AB57}"/>
-              </a:ext>
-            </a:extLst>
-          </p:cNvPr>
-          <p:cNvSpPr txBox="1"/>
-          <p:nvPr/>
-        </p:nvSpPr>
-        <p:spPr>
-          <a:xfrm>
-            <a:off x="9174480" y="1321356"/>
-            <a:ext cx="2622898" cy="369332"/>
-          </a:xfrm>
-          <a:prstGeom prst="rect">
-            <a:avLst/>
-          </a:prstGeom>
-          <a:noFill/>
-        </p:spPr>
-        <p:txBody>
-          <a:bodyPr wrap="none" rtlCol="0">
-            <a:spAutoFit/>
-          </a:bodyPr>
-          <a:lstStyle/>
-          <a:p>
-            <a:r>
-              <a:rPr lang="en-US" dirty="0"/>
-              <a:t>(under certain conditions)</a:t>
-            </a:r>
-          </a:p>
-        </p:txBody>
-      </p:sp>
-    </p:spTree>
-    <p:extLst>
-      <p:ext uri="{BB962C8B-B14F-4D97-AF65-F5344CB8AC3E}">
-        <p14:creationId xmlns:p14="http://schemas.microsoft.com/office/powerpoint/2010/main" val="4184590970"/>
       </p:ext>
     </p:extLst>
   </p:cSld>

</xml_diff>

<commit_message>
added reproducibility chanded dilution on diagram to include whats coming in/out
</commit_message>
<xml_diff>
--- a/Products/AW_fin.pptx
+++ b/Products/AW_fin.pptx
@@ -11,6 +11,7 @@
     <p:sldId id="268" r:id="rId5"/>
     <p:sldId id="269" r:id="rId6"/>
     <p:sldId id="270" r:id="rId7"/>
+    <p:sldId id="271" r:id="rId8"/>
   </p:sldIdLst>
   <p:sldSz cx="12192000" cy="6858000"/>
   <p:notesSz cx="6858000" cy="9144000"/>
@@ -3754,9 +3755,9 @@
         <p:grpSpPr>
           <a:xfrm>
             <a:off x="464117" y="1369892"/>
-            <a:ext cx="6093229" cy="3541222"/>
+            <a:ext cx="6417686" cy="3541222"/>
             <a:chOff x="464117" y="1369892"/>
-            <a:chExt cx="6093229" cy="3541222"/>
+            <a:chExt cx="6417686" cy="3541222"/>
           </a:xfrm>
         </p:grpSpPr>
         <p:grpSp>
@@ -3774,9 +3775,9 @@
           <p:grpSpPr>
             <a:xfrm>
               <a:off x="464117" y="1369892"/>
-              <a:ext cx="6093229" cy="3541222"/>
+              <a:ext cx="6417686" cy="3541222"/>
               <a:chOff x="482138" y="1388225"/>
-              <a:chExt cx="6093229" cy="3541222"/>
+              <a:chExt cx="6417686" cy="3541222"/>
             </a:xfrm>
           </p:grpSpPr>
           <p:grpSp>
@@ -4229,60 +4230,16 @@
                 <a:p>
                   <a:r>
                     <a:rPr lang="en-US" sz="1400" dirty="0"/>
-                    <a:t>d</a:t>
-                  </a:r>
-                </a:p>
-              </p:txBody>
-            </p:sp>
-            <p:sp>
-              <p:nvSpPr>
-                <p:cNvPr id="65" name="TextBox 64">
-                  <a:extLst>
-                    <a:ext uri="{FF2B5EF4-FFF2-40B4-BE49-F238E27FC236}">
-                      <a16:creationId xmlns:a16="http://schemas.microsoft.com/office/drawing/2014/main" id="{E35BB981-F7BF-4337-B84D-9E13845E4AE6}"/>
-                    </a:ext>
-                  </a:extLst>
-                </p:cNvPr>
-                <p:cNvSpPr txBox="1"/>
-                <p:nvPr/>
-              </p:nvSpPr>
-              <p:spPr>
-                <a:xfrm>
-                  <a:off x="1651113" y="2219396"/>
-                  <a:ext cx="673330" cy="307777"/>
-                </a:xfrm>
-                <a:prstGeom prst="rect">
-                  <a:avLst/>
-                </a:prstGeom>
-                <a:noFill/>
-              </p:spPr>
-              <p:txBody>
-                <a:bodyPr wrap="square" rtlCol="0">
-                  <a:spAutoFit/>
-                </a:bodyPr>
-                <a:lstStyle/>
-                <a:p>
-                  <a:r>
-                    <a:rPr lang="en-US" sz="1400" dirty="0">
-                      <a:solidFill>
-                        <a:srgbClr val="7030A0"/>
-                      </a:solidFill>
-                    </a:rPr>
-                    <a:t>s</a:t>
+                    <a:t>d(s</a:t>
                   </a:r>
                   <a:r>
-                    <a:rPr lang="en-US" sz="1400" baseline="30000" dirty="0">
-                      <a:solidFill>
-                        <a:srgbClr val="7030A0"/>
-                      </a:solidFill>
-                    </a:rPr>
+                    <a:rPr lang="en-US" sz="1400" baseline="30000" dirty="0"/>
                     <a:t>0</a:t>
                   </a:r>
-                  <a:endParaRPr lang="en-US" sz="1400" dirty="0">
-                    <a:solidFill>
-                      <a:srgbClr val="7030A0"/>
-                    </a:solidFill>
-                  </a:endParaRPr>
+                  <a:r>
+                    <a:rPr lang="en-US" sz="1400" dirty="0"/>
+                    <a:t> )</a:t>
+                  </a:r>
                 </a:p>
               </p:txBody>
             </p:sp>
@@ -4301,8 +4258,8 @@
             </p:nvSpPr>
             <p:spPr>
               <a:xfrm>
-                <a:off x="5338850" y="3815335"/>
-                <a:ext cx="673330" cy="307777"/>
+                <a:off x="5338849" y="3815335"/>
+                <a:ext cx="1560975" cy="307777"/>
               </a:xfrm>
               <a:prstGeom prst="rect">
                 <a:avLst/>
@@ -4317,8 +4274,45 @@
               <a:p>
                 <a:r>
                   <a:rPr lang="en-US" sz="1400" dirty="0"/>
-                  <a:t>d</a:t>
+                  <a:t>d(</a:t>
                 </a:r>
+                <a:r>
+                  <a:rPr lang="en-US" sz="1400" dirty="0" err="1"/>
+                  <a:t>s,e,t</a:t>
+                </a:r>
+                <a:r>
+                  <a:rPr lang="en-US" sz="1400" err="1"/>
+                  <a:t>,</a:t>
+                </a:r>
+                <a:r>
+                  <a:rPr lang="en-US" sz="1400"/>
+                  <a:t>x</a:t>
+                </a:r>
+                <a:r>
+                  <a:rPr lang="en-US" sz="1400" baseline="-25000"/>
+                  <a:t>1</a:t>
+                </a:r>
+                <a:r>
+                  <a:rPr lang="en-US" sz="1400"/>
+                  <a:t>,x</a:t>
+                </a:r>
+                <a:r>
+                  <a:rPr lang="en-US" sz="1400" baseline="-25000"/>
+                  <a:t>2</a:t>
+                </a:r>
+                <a:r>
+                  <a:rPr lang="en-US" sz="1400"/>
+                  <a:t>,x</a:t>
+                </a:r>
+                <a:r>
+                  <a:rPr lang="en-US" sz="1400" baseline="-25000"/>
+                  <a:t>3</a:t>
+                </a:r>
+                <a:r>
+                  <a:rPr lang="en-US" sz="1400"/>
+                  <a:t>)</a:t>
+                </a:r>
+                <a:endParaRPr lang="en-US" sz="1400" dirty="0"/>
               </a:p>
             </p:txBody>
           </p:sp>
@@ -9187,7 +9181,7 @@
         </p:nvSpPr>
         <p:spPr>
           <a:xfrm>
-            <a:off x="2216554" y="140698"/>
+            <a:off x="1191503" y="156825"/>
             <a:ext cx="10515600" cy="1325563"/>
           </a:xfrm>
         </p:spPr>
@@ -9197,238 +9191,84 @@
           <a:p>
             <a:r>
               <a:rPr lang="en-US" b="1" dirty="0"/>
-              <a:t>Division of labor in cooperators</a:t>
+              <a:t>Policing to avoid a tragedy of the commons</a:t>
             </a:r>
           </a:p>
         </p:txBody>
       </p:sp>
-      <mc:AlternateContent xmlns:mc="http://schemas.openxmlformats.org/markup-compatibility/2006" xmlns:a14="http://schemas.microsoft.com/office/drawing/2010/main">
-        <mc:Choice Requires="a14">
-          <p:sp>
-            <p:nvSpPr>
-              <p:cNvPr id="2" name="TextBox 1">
-                <a:extLst>
-                  <a:ext uri="{FF2B5EF4-FFF2-40B4-BE49-F238E27FC236}">
-                    <a16:creationId xmlns:a16="http://schemas.microsoft.com/office/drawing/2014/main" id="{14086DAB-715F-4472-A179-C941C2F2049F}"/>
-                  </a:ext>
-                </a:extLst>
-              </p:cNvPr>
-              <p:cNvSpPr txBox="1"/>
-              <p:nvPr/>
-            </p:nvSpPr>
-            <p:spPr>
-              <a:xfrm>
-                <a:off x="6969416" y="4856159"/>
-                <a:ext cx="3778620" cy="646331"/>
-              </a:xfrm>
-              <a:prstGeom prst="rect">
-                <a:avLst/>
-              </a:prstGeom>
-              <a:noFill/>
-            </p:spPr>
-            <p:txBody>
-              <a:bodyPr wrap="square" rtlCol="0">
-                <a:spAutoFit/>
-              </a:bodyPr>
-              <a:lstStyle/>
-              <a:p>
-                <a:pPr/>
-                <a14:m>
-                  <m:oMathPara xmlns:m="http://schemas.openxmlformats.org/officeDocument/2006/math">
-                    <m:oMathParaPr>
-                      <m:jc m:val="centerGroup"/>
-                    </m:oMathParaPr>
-                    <m:oMath xmlns:m="http://schemas.openxmlformats.org/officeDocument/2006/math">
-                      <m:r>
-                        <a:rPr lang="en-US" b="0" i="1" smtClean="0">
-                          <a:latin typeface="Cambria Math" panose="02040503050406030204" pitchFamily="18" charset="0"/>
-                        </a:rPr>
-                        <m:t>𝑓</m:t>
-                      </m:r>
-                      <m:d>
-                        <m:dPr>
-                          <m:ctrlPr>
-                            <a:rPr lang="en-US" b="0" i="1" smtClean="0">
-                              <a:latin typeface="Cambria Math" panose="02040503050406030204" pitchFamily="18" charset="0"/>
-                            </a:rPr>
-                          </m:ctrlPr>
-                        </m:dPr>
-                        <m:e>
-                          <m:r>
-                            <a:rPr lang="en-US" b="0" i="1" smtClean="0">
-                              <a:latin typeface="Cambria Math" panose="02040503050406030204" pitchFamily="18" charset="0"/>
-                            </a:rPr>
-                            <m:t>𝑠</m:t>
-                          </m:r>
-                          <m:r>
-                            <a:rPr lang="en-US" b="0" i="1" smtClean="0">
-                              <a:latin typeface="Cambria Math" panose="02040503050406030204" pitchFamily="18" charset="0"/>
-                            </a:rPr>
-                            <m:t>,</m:t>
-                          </m:r>
-                          <m:r>
-                            <a:rPr lang="en-US" b="0" i="1" smtClean="0">
-                              <a:latin typeface="Cambria Math" panose="02040503050406030204" pitchFamily="18" charset="0"/>
-                            </a:rPr>
-                            <m:t>𝑒</m:t>
-                          </m:r>
-                        </m:e>
-                      </m:d>
-                      <m:r>
-                        <a:rPr lang="en-US" b="0" i="1" smtClean="0">
-                          <a:latin typeface="Cambria Math" panose="02040503050406030204" pitchFamily="18" charset="0"/>
-                        </a:rPr>
-                        <m:t>&gt;0 ∀</m:t>
-                      </m:r>
-                      <m:r>
-                        <a:rPr lang="en-US" b="0" i="1" smtClean="0">
-                          <a:latin typeface="Cambria Math" panose="02040503050406030204" pitchFamily="18" charset="0"/>
-                        </a:rPr>
-                        <m:t>𝑠</m:t>
-                      </m:r>
-                      <m:r>
-                        <a:rPr lang="en-US" b="0" i="1" smtClean="0">
-                          <a:latin typeface="Cambria Math" panose="02040503050406030204" pitchFamily="18" charset="0"/>
-                        </a:rPr>
-                        <m:t>,</m:t>
-                      </m:r>
-                      <m:r>
-                        <a:rPr lang="en-US" b="0" i="1" smtClean="0">
-                          <a:latin typeface="Cambria Math" panose="02040503050406030204" pitchFamily="18" charset="0"/>
-                        </a:rPr>
-                        <m:t>𝑒</m:t>
-                      </m:r>
-                      <m:r>
-                        <a:rPr lang="en-US" b="0" i="1" smtClean="0">
-                          <a:latin typeface="Cambria Math" panose="02040503050406030204" pitchFamily="18" charset="0"/>
-                        </a:rPr>
-                        <m:t>&gt;0</m:t>
-                      </m:r>
-                    </m:oMath>
-                    <m:oMath xmlns:m="http://schemas.openxmlformats.org/officeDocument/2006/math">
-                      <m:r>
-                        <a:rPr lang="en-US" b="0" i="1" smtClean="0">
-                          <a:latin typeface="Cambria Math" panose="02040503050406030204" pitchFamily="18" charset="0"/>
-                        </a:rPr>
-                        <m:t>𝑓</m:t>
-                      </m:r>
-                      <m:d>
-                        <m:dPr>
-                          <m:ctrlPr>
-                            <a:rPr lang="en-US" b="0" i="1" smtClean="0">
-                              <a:latin typeface="Cambria Math" panose="02040503050406030204" pitchFamily="18" charset="0"/>
-                            </a:rPr>
-                          </m:ctrlPr>
-                        </m:dPr>
-                        <m:e>
-                          <m:r>
-                            <a:rPr lang="en-US" b="0" i="1" smtClean="0">
-                              <a:latin typeface="Cambria Math" panose="02040503050406030204" pitchFamily="18" charset="0"/>
-                            </a:rPr>
-                            <m:t>0,</m:t>
-                          </m:r>
-                          <m:r>
-                            <a:rPr lang="en-US" b="0" i="1" smtClean="0">
-                              <a:latin typeface="Cambria Math" panose="02040503050406030204" pitchFamily="18" charset="0"/>
-                            </a:rPr>
-                            <m:t>𝑒</m:t>
-                          </m:r>
-                        </m:e>
-                      </m:d>
-                      <m:r>
-                        <a:rPr lang="en-US" b="0" i="1" smtClean="0">
-                          <a:latin typeface="Cambria Math" panose="02040503050406030204" pitchFamily="18" charset="0"/>
-                        </a:rPr>
-                        <m:t>=</m:t>
-                      </m:r>
-                      <m:r>
-                        <a:rPr lang="en-US" b="0" i="1" smtClean="0">
-                          <a:latin typeface="Cambria Math" panose="02040503050406030204" pitchFamily="18" charset="0"/>
-                        </a:rPr>
-                        <m:t>𝑓</m:t>
-                      </m:r>
-                      <m:d>
-                        <m:dPr>
-                          <m:ctrlPr>
-                            <a:rPr lang="en-US" b="0" i="1" smtClean="0">
-                              <a:latin typeface="Cambria Math" panose="02040503050406030204" pitchFamily="18" charset="0"/>
-                            </a:rPr>
-                          </m:ctrlPr>
-                        </m:dPr>
-                        <m:e>
-                          <m:r>
-                            <a:rPr lang="en-US" b="0" i="1" smtClean="0">
-                              <a:latin typeface="Cambria Math" panose="02040503050406030204" pitchFamily="18" charset="0"/>
-                            </a:rPr>
-                            <m:t>𝑠</m:t>
-                          </m:r>
-                          <m:r>
-                            <a:rPr lang="en-US" b="0" i="1" smtClean="0">
-                              <a:latin typeface="Cambria Math" panose="02040503050406030204" pitchFamily="18" charset="0"/>
-                            </a:rPr>
-                            <m:t>,0</m:t>
-                          </m:r>
-                        </m:e>
-                      </m:d>
-                      <m:r>
-                        <a:rPr lang="en-US" b="0" i="1" smtClean="0">
-                          <a:latin typeface="Cambria Math" panose="02040503050406030204" pitchFamily="18" charset="0"/>
-                        </a:rPr>
-                        <m:t>=0</m:t>
-                      </m:r>
-                    </m:oMath>
-                  </m:oMathPara>
-                </a14:m>
-                <a:endParaRPr lang="en-US" dirty="0"/>
-              </a:p>
-            </p:txBody>
-          </p:sp>
-        </mc:Choice>
-        <mc:Fallback xmlns="">
-          <p:sp>
-            <p:nvSpPr>
-              <p:cNvPr id="2" name="TextBox 1">
-                <a:extLst>
-                  <a:ext uri="{FF2B5EF4-FFF2-40B4-BE49-F238E27FC236}">
-                    <a16:creationId xmlns:a16="http://schemas.microsoft.com/office/drawing/2014/main" id="{14086DAB-715F-4472-A179-C941C2F2049F}"/>
-                  </a:ext>
-                </a:extLst>
-              </p:cNvPr>
-              <p:cNvSpPr txBox="1">
-                <a:spLocks noRot="1" noChangeAspect="1" noMove="1" noResize="1" noEditPoints="1" noAdjustHandles="1" noChangeArrowheads="1" noChangeShapeType="1" noTextEdit="1"/>
-              </p:cNvSpPr>
-              <p:nvPr/>
-            </p:nvSpPr>
-            <p:spPr>
-              <a:xfrm>
-                <a:off x="6969416" y="4856159"/>
-                <a:ext cx="3778620" cy="646331"/>
-              </a:xfrm>
-              <a:prstGeom prst="rect">
-                <a:avLst/>
-              </a:prstGeom>
-              <a:blipFill>
-                <a:blip r:embed="rId8"/>
-                <a:stretch>
-                  <a:fillRect b="-6604"/>
-                </a:stretch>
-              </a:blipFill>
-            </p:spPr>
-            <p:txBody>
-              <a:bodyPr/>
-              <a:lstStyle/>
-              <a:p>
-                <a:r>
-                  <a:rPr lang="en-US">
-                    <a:noFill/>
-                  </a:rPr>
-                  <a:t> </a:t>
-                </a:r>
-              </a:p>
-            </p:txBody>
-          </p:sp>
-        </mc:Fallback>
-      </mc:AlternateContent>
+      <p:sp>
+        <p:nvSpPr>
+          <p:cNvPr id="93" name="Content Placeholder 2">
+            <a:extLst>
+              <a:ext uri="{FF2B5EF4-FFF2-40B4-BE49-F238E27FC236}">
+                <a16:creationId xmlns:a16="http://schemas.microsoft.com/office/drawing/2014/main" id="{4772C51A-22CE-4C8E-87B7-9747CE612620}"/>
+              </a:ext>
+            </a:extLst>
+          </p:cNvPr>
+          <p:cNvSpPr>
+            <a:spLocks noGrp="1"/>
+          </p:cNvSpPr>
+          <p:nvPr>
+            <p:ph idx="1"/>
+          </p:nvPr>
+        </p:nvSpPr>
+        <p:spPr>
+          <a:xfrm>
+            <a:off x="7081235" y="4448732"/>
+            <a:ext cx="4182425" cy="1862755"/>
+          </a:xfrm>
+          <a:ln>
+            <a:solidFill>
+              <a:schemeClr val="tx1"/>
+            </a:solidFill>
+          </a:ln>
+        </p:spPr>
+        <p:txBody>
+          <a:bodyPr>
+            <a:normAutofit fontScale="62500" lnSpcReduction="20000"/>
+          </a:bodyPr>
+          <a:lstStyle/>
+          <a:p>
+            <a:pPr marL="0" indent="0">
+              <a:buNone/>
+            </a:pPr>
+            <a:r>
+              <a:rPr lang="en-US" b="1" dirty="0"/>
+              <a:t>Reproducibility:</a:t>
+            </a:r>
+          </a:p>
+          <a:p>
+            <a:r>
+              <a:rPr lang="en-US" dirty="0"/>
+              <a:t>Readme file: </a:t>
+            </a:r>
+          </a:p>
+          <a:p>
+            <a:pPr marL="457200" lvl="1" indent="0">
+              <a:buNone/>
+            </a:pPr>
+            <a:r>
+              <a:rPr lang="en-US" dirty="0"/>
+              <a:t>Explains the function of each piece of code, as well as describes all other non-figure files</a:t>
+            </a:r>
+          </a:p>
+          <a:p>
+            <a:r>
+              <a:rPr lang="en-US" dirty="0"/>
+              <a:t>Text files with each figure: </a:t>
+            </a:r>
+          </a:p>
+          <a:p>
+            <a:pPr marL="457200" lvl="1" indent="0">
+              <a:buNone/>
+            </a:pPr>
+            <a:r>
+              <a:rPr lang="en-US" dirty="0"/>
+              <a:t>Records the initial condition and parameter values associated with each figure</a:t>
+            </a:r>
+          </a:p>
+        </p:txBody>
+      </p:sp>
     </p:spTree>
     <p:extLst>
       <p:ext uri="{BB962C8B-B14F-4D97-AF65-F5344CB8AC3E}">
@@ -19396,6 +19236,135 @@
 </p:sld>
 </file>
 
+<file path=ppt/slides/slide7.xml><?xml version="1.0" encoding="utf-8"?>
+<p:sld xmlns:a="http://schemas.openxmlformats.org/drawingml/2006/main" xmlns:r="http://schemas.openxmlformats.org/officeDocument/2006/relationships" xmlns:p="http://schemas.openxmlformats.org/presentationml/2006/main">
+  <p:cSld>
+    <p:spTree>
+      <p:nvGrpSpPr>
+        <p:cNvPr id="1" name=""/>
+        <p:cNvGrpSpPr/>
+        <p:nvPr/>
+      </p:nvGrpSpPr>
+      <p:grpSpPr>
+        <a:xfrm>
+          <a:off x="0" y="0"/>
+          <a:ext cx="0" cy="0"/>
+          <a:chOff x="0" y="0"/>
+          <a:chExt cx="0" cy="0"/>
+        </a:xfrm>
+      </p:grpSpPr>
+      <p:sp>
+        <p:nvSpPr>
+          <p:cNvPr id="2" name="Title 1">
+            <a:extLst>
+              <a:ext uri="{FF2B5EF4-FFF2-40B4-BE49-F238E27FC236}">
+                <a16:creationId xmlns:a16="http://schemas.microsoft.com/office/drawing/2014/main" id="{60045A96-676C-4725-9915-5F537E460177}"/>
+              </a:ext>
+            </a:extLst>
+          </p:cNvPr>
+          <p:cNvSpPr>
+            <a:spLocks noGrp="1"/>
+          </p:cNvSpPr>
+          <p:nvPr>
+            <p:ph type="title"/>
+          </p:nvPr>
+        </p:nvSpPr>
+        <p:spPr/>
+        <p:txBody>
+          <a:bodyPr/>
+          <a:lstStyle/>
+          <a:p>
+            <a:r>
+              <a:rPr lang="en-US" dirty="0"/>
+              <a:t>Reproducibility</a:t>
+            </a:r>
+          </a:p>
+        </p:txBody>
+      </p:sp>
+      <p:sp>
+        <p:nvSpPr>
+          <p:cNvPr id="3" name="Content Placeholder 2">
+            <a:extLst>
+              <a:ext uri="{FF2B5EF4-FFF2-40B4-BE49-F238E27FC236}">
+                <a16:creationId xmlns:a16="http://schemas.microsoft.com/office/drawing/2014/main" id="{12309FE7-267F-4027-B647-21B36B5B8FC9}"/>
+              </a:ext>
+            </a:extLst>
+          </p:cNvPr>
+          <p:cNvSpPr>
+            <a:spLocks noGrp="1"/>
+          </p:cNvSpPr>
+          <p:nvPr>
+            <p:ph idx="1"/>
+          </p:nvPr>
+        </p:nvSpPr>
+        <p:spPr>
+          <a:xfrm>
+            <a:off x="838200" y="1825625"/>
+            <a:ext cx="4723015" cy="4201102"/>
+          </a:xfrm>
+          <a:ln>
+            <a:solidFill>
+              <a:schemeClr val="tx1"/>
+            </a:solidFill>
+          </a:ln>
+        </p:spPr>
+        <p:txBody>
+          <a:bodyPr/>
+          <a:lstStyle/>
+          <a:p>
+            <a:pPr marL="0" indent="0">
+              <a:buNone/>
+            </a:pPr>
+            <a:r>
+              <a:rPr lang="en-US" b="1" dirty="0"/>
+              <a:t>Reproducibility:</a:t>
+            </a:r>
+          </a:p>
+          <a:p>
+            <a:r>
+              <a:rPr lang="en-US" dirty="0"/>
+              <a:t>Readme file: </a:t>
+            </a:r>
+          </a:p>
+          <a:p>
+            <a:pPr marL="457200" lvl="1" indent="0">
+              <a:buNone/>
+            </a:pPr>
+            <a:r>
+              <a:rPr lang="en-US" dirty="0"/>
+              <a:t>Explains the function of each piece of code, as well as describes all other non-figure files</a:t>
+            </a:r>
+          </a:p>
+          <a:p>
+            <a:r>
+              <a:rPr lang="en-US" dirty="0"/>
+              <a:t>Text files with each figure: </a:t>
+            </a:r>
+          </a:p>
+          <a:p>
+            <a:pPr marL="457200" lvl="1" indent="0">
+              <a:buNone/>
+            </a:pPr>
+            <a:r>
+              <a:rPr lang="en-US" dirty="0"/>
+              <a:t>Records the initial condition and parameter values associated with each figure</a:t>
+            </a:r>
+          </a:p>
+        </p:txBody>
+      </p:sp>
+    </p:spTree>
+    <p:extLst>
+      <p:ext uri="{BB962C8B-B14F-4D97-AF65-F5344CB8AC3E}">
+        <p14:creationId xmlns:p14="http://schemas.microsoft.com/office/powerpoint/2010/main" val="173251260"/>
+      </p:ext>
+    </p:extLst>
+  </p:cSld>
+  <p:clrMapOvr>
+    <a:masterClrMapping/>
+  </p:clrMapOvr>
+</p:sld>
+</file>
+
 <file path=ppt/theme/theme1.xml><?xml version="1.0" encoding="utf-8"?>
 <a:theme xmlns:a="http://schemas.openxmlformats.org/drawingml/2006/main" name="Office Theme">
   <a:themeElements>

</xml_diff>

<commit_message>
final slide of next steps, reproducibility, and things learned finalized
removed reproducibility from first slide

changed k variable in cheater from k2 to k3
</commit_message>
<xml_diff>
--- a/Products/AW_fin.pptx
+++ b/Products/AW_fin.pptx
@@ -264,7 +264,7 @@
           <a:p>
             <a:fld id="{F60B097C-15D3-4C10-907C-9D6BDD5AB733}" type="datetimeFigureOut">
               <a:rPr lang="en-US" smtClean="0"/>
-              <a:t>5/31/2019</a:t>
+              <a:t>6/4/2019</a:t>
             </a:fld>
             <a:endParaRPr lang="en-US"/>
           </a:p>
@@ -462,7 +462,7 @@
           <a:p>
             <a:fld id="{F60B097C-15D3-4C10-907C-9D6BDD5AB733}" type="datetimeFigureOut">
               <a:rPr lang="en-US" smtClean="0"/>
-              <a:t>5/31/2019</a:t>
+              <a:t>6/4/2019</a:t>
             </a:fld>
             <a:endParaRPr lang="en-US"/>
           </a:p>
@@ -670,7 +670,7 @@
           <a:p>
             <a:fld id="{F60B097C-15D3-4C10-907C-9D6BDD5AB733}" type="datetimeFigureOut">
               <a:rPr lang="en-US" smtClean="0"/>
-              <a:t>5/31/2019</a:t>
+              <a:t>6/4/2019</a:t>
             </a:fld>
             <a:endParaRPr lang="en-US"/>
           </a:p>
@@ -868,7 +868,7 @@
           <a:p>
             <a:fld id="{F60B097C-15D3-4C10-907C-9D6BDD5AB733}" type="datetimeFigureOut">
               <a:rPr lang="en-US" smtClean="0"/>
-              <a:t>5/31/2019</a:t>
+              <a:t>6/4/2019</a:t>
             </a:fld>
             <a:endParaRPr lang="en-US"/>
           </a:p>
@@ -1143,7 +1143,7 @@
           <a:p>
             <a:fld id="{F60B097C-15D3-4C10-907C-9D6BDD5AB733}" type="datetimeFigureOut">
               <a:rPr lang="en-US" smtClean="0"/>
-              <a:t>5/31/2019</a:t>
+              <a:t>6/4/2019</a:t>
             </a:fld>
             <a:endParaRPr lang="en-US"/>
           </a:p>
@@ -1408,7 +1408,7 @@
           <a:p>
             <a:fld id="{F60B097C-15D3-4C10-907C-9D6BDD5AB733}" type="datetimeFigureOut">
               <a:rPr lang="en-US" smtClean="0"/>
-              <a:t>5/31/2019</a:t>
+              <a:t>6/4/2019</a:t>
             </a:fld>
             <a:endParaRPr lang="en-US"/>
           </a:p>
@@ -1820,7 +1820,7 @@
           <a:p>
             <a:fld id="{F60B097C-15D3-4C10-907C-9D6BDD5AB733}" type="datetimeFigureOut">
               <a:rPr lang="en-US" smtClean="0"/>
-              <a:t>5/31/2019</a:t>
+              <a:t>6/4/2019</a:t>
             </a:fld>
             <a:endParaRPr lang="en-US"/>
           </a:p>
@@ -1961,7 +1961,7 @@
           <a:p>
             <a:fld id="{F60B097C-15D3-4C10-907C-9D6BDD5AB733}" type="datetimeFigureOut">
               <a:rPr lang="en-US" smtClean="0"/>
-              <a:t>5/31/2019</a:t>
+              <a:t>6/4/2019</a:t>
             </a:fld>
             <a:endParaRPr lang="en-US"/>
           </a:p>
@@ -2074,7 +2074,7 @@
           <a:p>
             <a:fld id="{F60B097C-15D3-4C10-907C-9D6BDD5AB733}" type="datetimeFigureOut">
               <a:rPr lang="en-US" smtClean="0"/>
-              <a:t>5/31/2019</a:t>
+              <a:t>6/4/2019</a:t>
             </a:fld>
             <a:endParaRPr lang="en-US"/>
           </a:p>
@@ -2385,7 +2385,7 @@
           <a:p>
             <a:fld id="{F60B097C-15D3-4C10-907C-9D6BDD5AB733}" type="datetimeFigureOut">
               <a:rPr lang="en-US" smtClean="0"/>
-              <a:t>5/31/2019</a:t>
+              <a:t>6/4/2019</a:t>
             </a:fld>
             <a:endParaRPr lang="en-US"/>
           </a:p>
@@ -2673,7 +2673,7 @@
           <a:p>
             <a:fld id="{F60B097C-15D3-4C10-907C-9D6BDD5AB733}" type="datetimeFigureOut">
               <a:rPr lang="en-US" smtClean="0"/>
-              <a:t>5/31/2019</a:t>
+              <a:t>6/4/2019</a:t>
             </a:fld>
             <a:endParaRPr lang="en-US"/>
           </a:p>
@@ -2914,7 +2914,7 @@
           <a:p>
             <a:fld id="{F60B097C-15D3-4C10-907C-9D6BDD5AB733}" type="datetimeFigureOut">
               <a:rPr lang="en-US" smtClean="0"/>
-              <a:t>5/31/2019</a:t>
+              <a:t>6/4/2019</a:t>
             </a:fld>
             <a:endParaRPr lang="en-US"/>
           </a:p>
@@ -7196,7 +7196,7 @@
         </p:nvCxnSpPr>
         <p:spPr>
           <a:xfrm flipH="1" flipV="1">
-            <a:off x="5061665" y="2190479"/>
+            <a:off x="5150634" y="2172557"/>
             <a:ext cx="132224" cy="298372"/>
           </a:xfrm>
           <a:prstGeom prst="straightConnector1">
@@ -8898,8 +8898,8 @@
           </p:sp>
         </mc:Fallback>
       </mc:AlternateContent>
-      <mc:AlternateContent xmlns:mc="http://schemas.openxmlformats.org/markup-compatibility/2006" xmlns:a14="http://schemas.microsoft.com/office/drawing/2010/main">
-        <mc:Choice Requires="a14">
+      <mc:AlternateContent xmlns:mc="http://schemas.openxmlformats.org/markup-compatibility/2006">
+        <mc:Choice xmlns:a14="http://schemas.microsoft.com/office/drawing/2010/main" Requires="a14">
           <p:sp>
             <p:nvSpPr>
               <p:cNvPr id="169" name="TextBox 168">
@@ -9137,7 +9137,7 @@
                               </a:solidFill>
                               <a:latin typeface="Cambria Math" panose="02040503050406030204" pitchFamily="18" charset="0"/>
                             </a:rPr>
-                            <m:t>2</m:t>
+                            <m:t>3</m:t>
                           </m:r>
                         </m:sub>
                       </m:sSub>
@@ -9164,7 +9164,7 @@
             </p:txBody>
           </p:sp>
         </mc:Choice>
-        <mc:Fallback xmlns="">
+        <mc:Fallback>
           <p:sp>
             <p:nvSpPr>
               <p:cNvPr id="169" name="TextBox 168">
@@ -9238,82 +9238,6 @@
             <a:r>
               <a:rPr lang="en-US" b="1" dirty="0"/>
               <a:t>Policing to avoid a tragedy of the commons</a:t>
-            </a:r>
-          </a:p>
-        </p:txBody>
-      </p:sp>
-      <p:sp>
-        <p:nvSpPr>
-          <p:cNvPr id="93" name="Content Placeholder 2">
-            <a:extLst>
-              <a:ext uri="{FF2B5EF4-FFF2-40B4-BE49-F238E27FC236}">
-                <a16:creationId xmlns:a16="http://schemas.microsoft.com/office/drawing/2014/main" id="{4772C51A-22CE-4C8E-87B7-9747CE612620}"/>
-              </a:ext>
-            </a:extLst>
-          </p:cNvPr>
-          <p:cNvSpPr>
-            <a:spLocks noGrp="1"/>
-          </p:cNvSpPr>
-          <p:nvPr>
-            <p:ph idx="1"/>
-          </p:nvPr>
-        </p:nvSpPr>
-        <p:spPr>
-          <a:xfrm>
-            <a:off x="7081235" y="4448732"/>
-            <a:ext cx="4182425" cy="1862755"/>
-          </a:xfrm>
-          <a:ln w="38100">
-            <a:solidFill>
-              <a:schemeClr val="tx1">
-                <a:lumMod val="50000"/>
-                <a:lumOff val="50000"/>
-              </a:schemeClr>
-            </a:solidFill>
-          </a:ln>
-        </p:spPr>
-        <p:txBody>
-          <a:bodyPr>
-            <a:normAutofit fontScale="62500" lnSpcReduction="20000"/>
-          </a:bodyPr>
-          <a:lstStyle/>
-          <a:p>
-            <a:pPr marL="0" indent="0">
-              <a:buNone/>
-            </a:pPr>
-            <a:r>
-              <a:rPr lang="en-US" b="1" dirty="0"/>
-              <a:t>Reproducibility:</a:t>
-            </a:r>
-          </a:p>
-          <a:p>
-            <a:r>
-              <a:rPr lang="en-US" dirty="0"/>
-              <a:t>Readme file: </a:t>
-            </a:r>
-          </a:p>
-          <a:p>
-            <a:pPr marL="457200" lvl="1" indent="0">
-              <a:buNone/>
-            </a:pPr>
-            <a:r>
-              <a:rPr lang="en-US" dirty="0"/>
-              <a:t>Explains the function of each piece of code, as well as describes all other non-figure files</a:t>
-            </a:r>
-          </a:p>
-          <a:p>
-            <a:r>
-              <a:rPr lang="en-US" dirty="0"/>
-              <a:t>Text files with each figure: </a:t>
-            </a:r>
-          </a:p>
-          <a:p>
-            <a:pPr marL="457200" lvl="1" indent="0">
-              <a:buNone/>
-            </a:pPr>
-            <a:r>
-              <a:rPr lang="en-US" dirty="0"/>
-              <a:t>Records the initial condition and parameter values associated with each figure</a:t>
             </a:r>
           </a:p>
         </p:txBody>
@@ -9560,6 +9484,47 @@
           <a:chExt cx="0" cy="0"/>
         </a:xfrm>
       </p:grpSpPr>
+      <p:pic>
+        <p:nvPicPr>
+          <p:cNvPr id="5" name="Picture 4" descr="A close up of a mans face&#10;&#10;Description generated with high confidence">
+            <a:extLst>
+              <a:ext uri="{FF2B5EF4-FFF2-40B4-BE49-F238E27FC236}">
+                <a16:creationId xmlns:a16="http://schemas.microsoft.com/office/drawing/2014/main" id="{BAA0B1B5-1C34-44A0-9939-89BFD14E08EA}"/>
+              </a:ext>
+            </a:extLst>
+          </p:cNvPr>
+          <p:cNvPicPr>
+            <a:picLocks noChangeAspect="1"/>
+          </p:cNvPicPr>
+          <p:nvPr/>
+        </p:nvPicPr>
+        <p:blipFill>
+          <a:blip r:embed="rId2">
+            <a:extLst>
+              <a:ext uri="{28A0092B-C50C-407E-A947-70E740481C1C}">
+                <a14:useLocalDpi xmlns:a14="http://schemas.microsoft.com/office/drawing/2010/main" val="0"/>
+              </a:ext>
+            </a:extLst>
+          </a:blip>
+          <a:stretch>
+            <a:fillRect/>
+          </a:stretch>
+        </p:blipFill>
+        <p:spPr>
+          <a:xfrm>
+            <a:off x="7976642" y="3324809"/>
+            <a:ext cx="3336875" cy="2502656"/>
+          </a:xfrm>
+          <a:prstGeom prst="rect">
+            <a:avLst/>
+          </a:prstGeom>
+          <a:ln>
+            <a:solidFill>
+              <a:schemeClr val="tx1"/>
+            </a:solidFill>
+          </a:ln>
+        </p:spPr>
+      </p:pic>
       <p:sp>
         <p:nvSpPr>
           <p:cNvPr id="2" name="Title 1">
@@ -9593,8 +9558,8 @@
           </a:p>
         </p:txBody>
       </p:sp>
-      <mc:AlternateContent xmlns:mc="http://schemas.openxmlformats.org/markup-compatibility/2006">
-        <mc:Choice xmlns:a14="http://schemas.microsoft.com/office/drawing/2010/main" Requires="a14">
+      <mc:AlternateContent xmlns:mc="http://schemas.openxmlformats.org/markup-compatibility/2006" xmlns:a14="http://schemas.microsoft.com/office/drawing/2010/main">
+        <mc:Choice Requires="a14">
           <p:sp>
             <p:nvSpPr>
               <p:cNvPr id="10" name="TextBox 9">
@@ -9859,7 +9824,7 @@
             </p:txBody>
           </p:sp>
         </mc:Choice>
-        <mc:Fallback>
+        <mc:Fallback xmlns="">
           <p:sp>
             <p:nvSpPr>
               <p:cNvPr id="10" name="TextBox 9">
@@ -9883,7 +9848,7 @@
                 <a:avLst/>
               </a:prstGeom>
               <a:blipFill>
-                <a:blip r:embed="rId2"/>
+                <a:blip r:embed="rId3"/>
                 <a:stretch>
                   <a:fillRect l="-870" t="-4444" b="-35556"/>
                 </a:stretch>
@@ -9904,8 +9869,8 @@
           </p:sp>
         </mc:Fallback>
       </mc:AlternateContent>
-      <mc:AlternateContent xmlns:mc="http://schemas.openxmlformats.org/markup-compatibility/2006">
-        <mc:Choice xmlns:a14="http://schemas.microsoft.com/office/drawing/2010/main" Requires="a14">
+      <mc:AlternateContent xmlns:mc="http://schemas.openxmlformats.org/markup-compatibility/2006" xmlns:a14="http://schemas.microsoft.com/office/drawing/2010/main">
+        <mc:Choice Requires="a14">
           <p:sp>
             <p:nvSpPr>
               <p:cNvPr id="11" name="TextBox 10">
@@ -10005,7 +9970,7 @@
             </p:txBody>
           </p:sp>
         </mc:Choice>
-        <mc:Fallback>
+        <mc:Fallback xmlns="">
           <p:sp>
             <p:nvSpPr>
               <p:cNvPr id="11" name="TextBox 10">
@@ -10029,7 +9994,7 @@
                 <a:avLst/>
               </a:prstGeom>
               <a:blipFill>
-                <a:blip r:embed="rId3"/>
+                <a:blip r:embed="rId4"/>
                 <a:stretch>
                   <a:fillRect l="-4525" t="-2174" r="-1357" b="-8696"/>
                 </a:stretch>
@@ -10050,8 +10015,8 @@
           </p:sp>
         </mc:Fallback>
       </mc:AlternateContent>
-      <mc:AlternateContent xmlns:mc="http://schemas.openxmlformats.org/markup-compatibility/2006">
-        <mc:Choice xmlns:a14="http://schemas.microsoft.com/office/drawing/2010/main" Requires="a14">
+      <mc:AlternateContent xmlns:mc="http://schemas.openxmlformats.org/markup-compatibility/2006" xmlns:a14="http://schemas.microsoft.com/office/drawing/2010/main">
+        <mc:Choice Requires="a14">
           <p:sp>
             <p:nvSpPr>
               <p:cNvPr id="12" name="TextBox 11">
@@ -10267,7 +10232,7 @@
             </p:txBody>
           </p:sp>
         </mc:Choice>
-        <mc:Fallback>
+        <mc:Fallback xmlns="">
           <p:sp>
             <p:nvSpPr>
               <p:cNvPr id="12" name="TextBox 11">
@@ -10291,7 +10256,7 @@
                 <a:avLst/>
               </a:prstGeom>
               <a:blipFill>
-                <a:blip r:embed="rId4"/>
+                <a:blip r:embed="rId5"/>
                 <a:stretch>
                   <a:fillRect l="-2029" t="-10870" b="-34783"/>
                 </a:stretch>
@@ -10312,8 +10277,8 @@
           </p:sp>
         </mc:Fallback>
       </mc:AlternateContent>
-      <mc:AlternateContent xmlns:mc="http://schemas.openxmlformats.org/markup-compatibility/2006">
-        <mc:Choice xmlns:a14="http://schemas.microsoft.com/office/drawing/2010/main" Requires="a14">
+      <mc:AlternateContent xmlns:mc="http://schemas.openxmlformats.org/markup-compatibility/2006" xmlns:a14="http://schemas.microsoft.com/office/drawing/2010/main">
+        <mc:Choice Requires="a14">
           <p:sp>
             <p:nvSpPr>
               <p:cNvPr id="14" name="TextBox 13">
@@ -10583,7 +10548,7 @@
             </p:txBody>
           </p:sp>
         </mc:Choice>
-        <mc:Fallback>
+        <mc:Fallback xmlns="">
           <p:sp>
             <p:nvSpPr>
               <p:cNvPr id="14" name="TextBox 13">
@@ -10607,7 +10572,7 @@
                 <a:avLst/>
               </a:prstGeom>
               <a:blipFill>
-                <a:blip r:embed="rId5"/>
+                <a:blip r:embed="rId6"/>
                 <a:stretch>
                   <a:fillRect t="-2222" r="-613" b="-35556"/>
                 </a:stretch>
@@ -10643,7 +10608,7 @@
           <p:nvPr/>
         </p:nvPicPr>
         <p:blipFill>
-          <a:blip r:embed="rId6">
+          <a:blip r:embed="rId7">
             <a:extLst>
               <a:ext uri="{28A0092B-C50C-407E-A947-70E740481C1C}">
                 <a14:useLocalDpi xmlns:a14="http://schemas.microsoft.com/office/drawing/2010/main" val="0"/>
@@ -10723,8 +10688,8 @@
           </a:p>
         </p:txBody>
       </p:sp>
-      <mc:AlternateContent xmlns:mc="http://schemas.openxmlformats.org/markup-compatibility/2006">
-        <mc:Choice xmlns:a14="http://schemas.microsoft.com/office/drawing/2010/main" Requires="a14">
+      <mc:AlternateContent xmlns:mc="http://schemas.openxmlformats.org/markup-compatibility/2006" xmlns:a14="http://schemas.microsoft.com/office/drawing/2010/main">
+        <mc:Choice Requires="a14">
           <p:sp>
             <p:nvSpPr>
               <p:cNvPr id="13" name="TextBox 12">
@@ -10989,7 +10954,7 @@
             </p:txBody>
           </p:sp>
         </mc:Choice>
-        <mc:Fallback>
+        <mc:Fallback xmlns="">
           <p:sp>
             <p:nvSpPr>
               <p:cNvPr id="13" name="TextBox 12">
@@ -11013,7 +10978,7 @@
                 <a:avLst/>
               </a:prstGeom>
               <a:blipFill>
-                <a:blip r:embed="rId7"/>
+                <a:blip r:embed="rId8"/>
                 <a:stretch>
                   <a:fillRect l="-870" t="-4444" b="-35556"/>
                 </a:stretch>
@@ -11034,8 +10999,8 @@
           </p:sp>
         </mc:Fallback>
       </mc:AlternateContent>
-      <mc:AlternateContent xmlns:mc="http://schemas.openxmlformats.org/markup-compatibility/2006">
-        <mc:Choice xmlns:a14="http://schemas.microsoft.com/office/drawing/2010/main" Requires="a14">
+      <mc:AlternateContent xmlns:mc="http://schemas.openxmlformats.org/markup-compatibility/2006" xmlns:a14="http://schemas.microsoft.com/office/drawing/2010/main">
+        <mc:Choice Requires="a14">
           <p:sp>
             <p:nvSpPr>
               <p:cNvPr id="15" name="TextBox 14">
@@ -11135,7 +11100,7 @@
             </p:txBody>
           </p:sp>
         </mc:Choice>
-        <mc:Fallback>
+        <mc:Fallback xmlns="">
           <p:sp>
             <p:nvSpPr>
               <p:cNvPr id="15" name="TextBox 14">
@@ -11159,7 +11124,7 @@
                 <a:avLst/>
               </a:prstGeom>
               <a:blipFill>
-                <a:blip r:embed="rId8"/>
+                <a:blip r:embed="rId9"/>
                 <a:stretch>
                   <a:fillRect l="-4505" t="-2174" r="-1351" b="-8696"/>
                 </a:stretch>
@@ -11180,8 +11145,8 @@
           </p:sp>
         </mc:Fallback>
       </mc:AlternateContent>
-      <mc:AlternateContent xmlns:mc="http://schemas.openxmlformats.org/markup-compatibility/2006">
-        <mc:Choice xmlns:a14="http://schemas.microsoft.com/office/drawing/2010/main" Requires="a14">
+      <mc:AlternateContent xmlns:mc="http://schemas.openxmlformats.org/markup-compatibility/2006" xmlns:a14="http://schemas.microsoft.com/office/drawing/2010/main">
+        <mc:Choice Requires="a14">
           <p:sp>
             <p:nvSpPr>
               <p:cNvPr id="16" name="TextBox 15">
@@ -11279,7 +11244,7 @@
             </p:txBody>
           </p:sp>
         </mc:Choice>
-        <mc:Fallback>
+        <mc:Fallback xmlns="">
           <p:sp>
             <p:nvSpPr>
               <p:cNvPr id="16" name="TextBox 15">
@@ -11303,7 +11268,7 @@
                 <a:avLst/>
               </a:prstGeom>
               <a:blipFill>
-                <a:blip r:embed="rId9"/>
+                <a:blip r:embed="rId10"/>
                 <a:stretch>
                   <a:fillRect l="-3139" t="-10870" b="-8696"/>
                 </a:stretch>
@@ -11324,8 +11289,8 @@
           </p:sp>
         </mc:Fallback>
       </mc:AlternateContent>
-      <mc:AlternateContent xmlns:mc="http://schemas.openxmlformats.org/markup-compatibility/2006">
-        <mc:Choice xmlns:a14="http://schemas.microsoft.com/office/drawing/2010/main" Requires="a14">
+      <mc:AlternateContent xmlns:mc="http://schemas.openxmlformats.org/markup-compatibility/2006" xmlns:a14="http://schemas.microsoft.com/office/drawing/2010/main">
+        <mc:Choice Requires="a14">
           <p:sp>
             <p:nvSpPr>
               <p:cNvPr id="17" name="TextBox 16">
@@ -11538,7 +11503,7 @@
             </p:txBody>
           </p:sp>
         </mc:Choice>
-        <mc:Fallback>
+        <mc:Fallback xmlns="">
           <p:sp>
             <p:nvSpPr>
               <p:cNvPr id="17" name="TextBox 16">
@@ -11562,7 +11527,7 @@
                 <a:avLst/>
               </a:prstGeom>
               <a:blipFill>
-                <a:blip r:embed="rId10"/>
+                <a:blip r:embed="rId11"/>
                 <a:stretch>
                   <a:fillRect l="-1183" t="-2222" r="-3846" b="-35556"/>
                 </a:stretch>
@@ -11598,7 +11563,7 @@
           <p:nvPr/>
         </p:nvPicPr>
         <p:blipFill>
-          <a:blip r:embed="rId11">
+          <a:blip r:embed="rId12">
             <a:extLst>
               <a:ext uri="{28A0092B-C50C-407E-A947-70E740481C1C}">
                 <a14:useLocalDpi xmlns:a14="http://schemas.microsoft.com/office/drawing/2010/main" val="0"/>
@@ -11612,47 +11577,6 @@
         <p:spPr>
           <a:xfrm>
             <a:off x="4305116" y="3324809"/>
-            <a:ext cx="3199859" cy="2399894"/>
-          </a:xfrm>
-          <a:prstGeom prst="rect">
-            <a:avLst/>
-          </a:prstGeom>
-          <a:ln>
-            <a:solidFill>
-              <a:schemeClr val="tx1"/>
-            </a:solidFill>
-          </a:ln>
-        </p:spPr>
-      </p:pic>
-      <p:pic>
-        <p:nvPicPr>
-          <p:cNvPr id="20" name="Picture 19" descr="A close up of a mans face&#10;&#10;Description generated with high confidence">
-            <a:extLst>
-              <a:ext uri="{FF2B5EF4-FFF2-40B4-BE49-F238E27FC236}">
-                <a16:creationId xmlns:a16="http://schemas.microsoft.com/office/drawing/2014/main" id="{017665ED-8F58-4E9C-A708-7AB462BA15F5}"/>
-              </a:ext>
-            </a:extLst>
-          </p:cNvPr>
-          <p:cNvPicPr>
-            <a:picLocks noChangeAspect="1"/>
-          </p:cNvPicPr>
-          <p:nvPr/>
-        </p:nvPicPr>
-        <p:blipFill>
-          <a:blip r:embed="rId12">
-            <a:extLst>
-              <a:ext uri="{28A0092B-C50C-407E-A947-70E740481C1C}">
-                <a14:useLocalDpi xmlns:a14="http://schemas.microsoft.com/office/drawing/2010/main" val="0"/>
-              </a:ext>
-            </a:extLst>
-          </a:blip>
-          <a:stretch>
-            <a:fillRect/>
-          </a:stretch>
-        </p:blipFill>
-        <p:spPr>
-          <a:xfrm>
-            <a:off x="7997458" y="3324809"/>
             <a:ext cx="3199859" cy="2399894"/>
           </a:xfrm>
           <a:prstGeom prst="rect">
@@ -11719,8 +11643,8 @@
           </a:p>
         </p:txBody>
       </p:sp>
-      <mc:AlternateContent xmlns:mc="http://schemas.openxmlformats.org/markup-compatibility/2006">
-        <mc:Choice xmlns:a14="http://schemas.microsoft.com/office/drawing/2010/main" Requires="a14">
+      <mc:AlternateContent xmlns:mc="http://schemas.openxmlformats.org/markup-compatibility/2006" xmlns:a14="http://schemas.microsoft.com/office/drawing/2010/main">
+        <mc:Choice Requires="a14">
           <p:sp>
             <p:nvSpPr>
               <p:cNvPr id="24" name="TextBox 23">
@@ -12028,7 +11952,7 @@
             </p:txBody>
           </p:sp>
         </mc:Choice>
-        <mc:Fallback>
+        <mc:Fallback xmlns="">
           <p:sp>
             <p:nvSpPr>
               <p:cNvPr id="24" name="TextBox 23">
@@ -12073,8 +11997,8 @@
           </p:sp>
         </mc:Fallback>
       </mc:AlternateContent>
-      <mc:AlternateContent xmlns:mc="http://schemas.openxmlformats.org/markup-compatibility/2006">
-        <mc:Choice xmlns:a14="http://schemas.microsoft.com/office/drawing/2010/main" Requires="a14">
+      <mc:AlternateContent xmlns:mc="http://schemas.openxmlformats.org/markup-compatibility/2006" xmlns:a14="http://schemas.microsoft.com/office/drawing/2010/main">
+        <mc:Choice Requires="a14">
           <p:sp>
             <p:nvSpPr>
               <p:cNvPr id="25" name="TextBox 24">
@@ -12174,7 +12098,7 @@
             </p:txBody>
           </p:sp>
         </mc:Choice>
-        <mc:Fallback>
+        <mc:Fallback xmlns="">
           <p:sp>
             <p:nvSpPr>
               <p:cNvPr id="25" name="TextBox 24">
@@ -12219,8 +12143,8 @@
           </p:sp>
         </mc:Fallback>
       </mc:AlternateContent>
-      <mc:AlternateContent xmlns:mc="http://schemas.openxmlformats.org/markup-compatibility/2006">
-        <mc:Choice xmlns:a14="http://schemas.microsoft.com/office/drawing/2010/main" Requires="a14">
+      <mc:AlternateContent xmlns:mc="http://schemas.openxmlformats.org/markup-compatibility/2006" xmlns:a14="http://schemas.microsoft.com/office/drawing/2010/main">
+        <mc:Choice Requires="a14">
           <p:sp>
             <p:nvSpPr>
               <p:cNvPr id="26" name="TextBox 25">
@@ -12436,7 +12360,7 @@
             </p:txBody>
           </p:sp>
         </mc:Choice>
-        <mc:Fallback>
+        <mc:Fallback xmlns="">
           <p:sp>
             <p:nvSpPr>
               <p:cNvPr id="26" name="TextBox 25">
@@ -12481,8 +12405,8 @@
           </p:sp>
         </mc:Fallback>
       </mc:AlternateContent>
-      <mc:AlternateContent xmlns:mc="http://schemas.openxmlformats.org/markup-compatibility/2006">
-        <mc:Choice xmlns:a14="http://schemas.microsoft.com/office/drawing/2010/main" Requires="a14">
+      <mc:AlternateContent xmlns:mc="http://schemas.openxmlformats.org/markup-compatibility/2006" xmlns:a14="http://schemas.microsoft.com/office/drawing/2010/main">
+        <mc:Choice Requires="a14">
           <p:sp>
             <p:nvSpPr>
               <p:cNvPr id="27" name="TextBox 26">
@@ -12752,7 +12676,7 @@
             </p:txBody>
           </p:sp>
         </mc:Choice>
-        <mc:Fallback>
+        <mc:Fallback xmlns="">
           <p:sp>
             <p:nvSpPr>
               <p:cNvPr id="27" name="TextBox 26">
@@ -13036,7 +12960,7 @@
                               </a:solidFill>
                               <a:latin typeface="Cambria Math" panose="02040503050406030204" pitchFamily="18" charset="0"/>
                             </a:rPr>
-                            <m:t>2</m:t>
+                            <m:t>3</m:t>
                           </m:r>
                         </m:sub>
                       </m:sSub>
@@ -13108,8 +13032,8 @@
           </p:sp>
         </mc:Fallback>
       </mc:AlternateContent>
-      <mc:AlternateContent xmlns:mc="http://schemas.openxmlformats.org/markup-compatibility/2006">
-        <mc:Choice xmlns:a14="http://schemas.microsoft.com/office/drawing/2010/main" Requires="a14">
+      <mc:AlternateContent xmlns:mc="http://schemas.openxmlformats.org/markup-compatibility/2006" xmlns:a14="http://schemas.microsoft.com/office/drawing/2010/main">
+        <mc:Choice Requires="a14">
           <p:sp>
             <p:nvSpPr>
               <p:cNvPr id="34" name="TextBox 33">
@@ -13303,7 +13227,7 @@
             </p:txBody>
           </p:sp>
         </mc:Choice>
-        <mc:Fallback>
+        <mc:Fallback xmlns="">
           <p:sp>
             <p:nvSpPr>
               <p:cNvPr id="34" name="TextBox 33">
@@ -13416,8 +13340,8 @@
           </a:p>
         </p:txBody>
       </p:sp>
-      <mc:AlternateContent xmlns:mc="http://schemas.openxmlformats.org/markup-compatibility/2006">
-        <mc:Choice xmlns:a14="http://schemas.microsoft.com/office/drawing/2010/main" Requires="a14">
+      <mc:AlternateContent xmlns:mc="http://schemas.openxmlformats.org/markup-compatibility/2006" xmlns:a14="http://schemas.microsoft.com/office/drawing/2010/main">
+        <mc:Choice Requires="a14">
           <p:sp>
             <p:nvSpPr>
               <p:cNvPr id="23" name="TextBox 22">
@@ -13605,7 +13529,7 @@
             </p:txBody>
           </p:sp>
         </mc:Choice>
-        <mc:Fallback>
+        <mc:Fallback xmlns="">
           <p:sp>
             <p:nvSpPr>
               <p:cNvPr id="23" name="TextBox 22">
@@ -13655,8 +13579,8 @@
           </p:sp>
         </mc:Fallback>
       </mc:AlternateContent>
-      <mc:AlternateContent xmlns:mc="http://schemas.openxmlformats.org/markup-compatibility/2006">
-        <mc:Choice xmlns:a14="http://schemas.microsoft.com/office/drawing/2010/main" Requires="a14">
+      <mc:AlternateContent xmlns:mc="http://schemas.openxmlformats.org/markup-compatibility/2006" xmlns:a14="http://schemas.microsoft.com/office/drawing/2010/main">
+        <mc:Choice Requires="a14">
           <p:sp>
             <p:nvSpPr>
               <p:cNvPr id="10" name="TextBox 9">
@@ -13921,7 +13845,7 @@
             </p:txBody>
           </p:sp>
         </mc:Choice>
-        <mc:Fallback>
+        <mc:Fallback xmlns="">
           <p:sp>
             <p:nvSpPr>
               <p:cNvPr id="10" name="TextBox 9">
@@ -13966,8 +13890,8 @@
           </p:sp>
         </mc:Fallback>
       </mc:AlternateContent>
-      <mc:AlternateContent xmlns:mc="http://schemas.openxmlformats.org/markup-compatibility/2006">
-        <mc:Choice xmlns:a14="http://schemas.microsoft.com/office/drawing/2010/main" Requires="a14">
+      <mc:AlternateContent xmlns:mc="http://schemas.openxmlformats.org/markup-compatibility/2006" xmlns:a14="http://schemas.microsoft.com/office/drawing/2010/main">
+        <mc:Choice Requires="a14">
           <p:sp>
             <p:nvSpPr>
               <p:cNvPr id="11" name="TextBox 10">
@@ -14176,7 +14100,7 @@
             </p:txBody>
           </p:sp>
         </mc:Choice>
-        <mc:Fallback>
+        <mc:Fallback xmlns="">
           <p:sp>
             <p:nvSpPr>
               <p:cNvPr id="11" name="TextBox 10">
@@ -14221,8 +14145,8 @@
           </p:sp>
         </mc:Fallback>
       </mc:AlternateContent>
-      <mc:AlternateContent xmlns:mc="http://schemas.openxmlformats.org/markup-compatibility/2006">
-        <mc:Choice xmlns:a14="http://schemas.microsoft.com/office/drawing/2010/main" Requires="a14">
+      <mc:AlternateContent xmlns:mc="http://schemas.openxmlformats.org/markup-compatibility/2006" xmlns:a14="http://schemas.microsoft.com/office/drawing/2010/main">
+        <mc:Choice Requires="a14">
           <p:sp>
             <p:nvSpPr>
               <p:cNvPr id="12" name="TextBox 11">
@@ -14320,7 +14244,7 @@
             </p:txBody>
           </p:sp>
         </mc:Choice>
-        <mc:Fallback>
+        <mc:Fallback xmlns="">
           <p:sp>
             <p:nvSpPr>
               <p:cNvPr id="12" name="TextBox 11">
@@ -14365,8 +14289,8 @@
           </p:sp>
         </mc:Fallback>
       </mc:AlternateContent>
-      <mc:AlternateContent xmlns:mc="http://schemas.openxmlformats.org/markup-compatibility/2006">
-        <mc:Choice xmlns:a14="http://schemas.microsoft.com/office/drawing/2010/main" Requires="a14">
+      <mc:AlternateContent xmlns:mc="http://schemas.openxmlformats.org/markup-compatibility/2006" xmlns:a14="http://schemas.microsoft.com/office/drawing/2010/main">
+        <mc:Choice Requires="a14">
           <p:sp>
             <p:nvSpPr>
               <p:cNvPr id="14" name="TextBox 13">
@@ -14636,7 +14560,7 @@
             </p:txBody>
           </p:sp>
         </mc:Choice>
-        <mc:Fallback>
+        <mc:Fallback xmlns="">
           <p:sp>
             <p:nvSpPr>
               <p:cNvPr id="14" name="TextBox 13">
@@ -14763,8 +14687,8 @@
           </a:ln>
         </p:spPr>
       </p:pic>
-      <mc:AlternateContent xmlns:mc="http://schemas.openxmlformats.org/markup-compatibility/2006">
-        <mc:Choice xmlns:a14="http://schemas.microsoft.com/office/drawing/2010/main" Requires="a14">
+      <mc:AlternateContent xmlns:mc="http://schemas.openxmlformats.org/markup-compatibility/2006" xmlns:a14="http://schemas.microsoft.com/office/drawing/2010/main">
+        <mc:Choice Requires="a14">
           <p:sp>
             <p:nvSpPr>
               <p:cNvPr id="13" name="TextBox 12">
@@ -15072,7 +14996,7 @@
             </p:txBody>
           </p:sp>
         </mc:Choice>
-        <mc:Fallback>
+        <mc:Fallback xmlns="">
           <p:sp>
             <p:nvSpPr>
               <p:cNvPr id="13" name="TextBox 12">
@@ -15117,8 +15041,8 @@
           </p:sp>
         </mc:Fallback>
       </mc:AlternateContent>
-      <mc:AlternateContent xmlns:mc="http://schemas.openxmlformats.org/markup-compatibility/2006">
-        <mc:Choice xmlns:a14="http://schemas.microsoft.com/office/drawing/2010/main" Requires="a14">
+      <mc:AlternateContent xmlns:mc="http://schemas.openxmlformats.org/markup-compatibility/2006" xmlns:a14="http://schemas.microsoft.com/office/drawing/2010/main">
+        <mc:Choice Requires="a14">
           <p:sp>
             <p:nvSpPr>
               <p:cNvPr id="15" name="TextBox 14">
@@ -15286,7 +15210,7 @@
             </p:txBody>
           </p:sp>
         </mc:Choice>
-        <mc:Fallback>
+        <mc:Fallback xmlns="">
           <p:sp>
             <p:nvSpPr>
               <p:cNvPr id="15" name="TextBox 14">
@@ -15331,8 +15255,8 @@
           </p:sp>
         </mc:Fallback>
       </mc:AlternateContent>
-      <mc:AlternateContent xmlns:mc="http://schemas.openxmlformats.org/markup-compatibility/2006">
-        <mc:Choice xmlns:a14="http://schemas.microsoft.com/office/drawing/2010/main" Requires="a14">
+      <mc:AlternateContent xmlns:mc="http://schemas.openxmlformats.org/markup-compatibility/2006" xmlns:a14="http://schemas.microsoft.com/office/drawing/2010/main">
+        <mc:Choice Requires="a14">
           <p:sp>
             <p:nvSpPr>
               <p:cNvPr id="16" name="TextBox 15">
@@ -15430,7 +15354,7 @@
             </p:txBody>
           </p:sp>
         </mc:Choice>
-        <mc:Fallback>
+        <mc:Fallback xmlns="">
           <p:sp>
             <p:nvSpPr>
               <p:cNvPr id="16" name="TextBox 15">
@@ -15475,8 +15399,8 @@
           </p:sp>
         </mc:Fallback>
       </mc:AlternateContent>
-      <mc:AlternateContent xmlns:mc="http://schemas.openxmlformats.org/markup-compatibility/2006">
-        <mc:Choice xmlns:a14="http://schemas.microsoft.com/office/drawing/2010/main" Requires="a14">
+      <mc:AlternateContent xmlns:mc="http://schemas.openxmlformats.org/markup-compatibility/2006" xmlns:a14="http://schemas.microsoft.com/office/drawing/2010/main">
+        <mc:Choice Requires="a14">
           <p:sp>
             <p:nvSpPr>
               <p:cNvPr id="17" name="TextBox 16">
@@ -15689,7 +15613,7 @@
             </p:txBody>
           </p:sp>
         </mc:Choice>
-        <mc:Fallback>
+        <mc:Fallback xmlns="">
           <p:sp>
             <p:nvSpPr>
               <p:cNvPr id="17" name="TextBox 16">
@@ -15734,8 +15658,8 @@
           </p:sp>
         </mc:Fallback>
       </mc:AlternateContent>
-      <mc:AlternateContent xmlns:mc="http://schemas.openxmlformats.org/markup-compatibility/2006">
-        <mc:Choice xmlns:a14="http://schemas.microsoft.com/office/drawing/2010/main" Requires="a14">
+      <mc:AlternateContent xmlns:mc="http://schemas.openxmlformats.org/markup-compatibility/2006" xmlns:a14="http://schemas.microsoft.com/office/drawing/2010/main">
+        <mc:Choice Requires="a14">
           <p:sp>
             <p:nvSpPr>
               <p:cNvPr id="18" name="TextBox 17">
@@ -16005,7 +15929,7 @@
             </p:txBody>
           </p:sp>
         </mc:Choice>
-        <mc:Fallback>
+        <mc:Fallback xmlns="">
           <p:sp>
             <p:nvSpPr>
               <p:cNvPr id="18" name="TextBox 17">
@@ -16050,8 +15974,8 @@
           </p:sp>
         </mc:Fallback>
       </mc:AlternateContent>
-      <mc:AlternateContent xmlns:mc="http://schemas.openxmlformats.org/markup-compatibility/2006">
-        <mc:Choice xmlns:a14="http://schemas.microsoft.com/office/drawing/2010/main" Requires="a14">
+      <mc:AlternateContent xmlns:mc="http://schemas.openxmlformats.org/markup-compatibility/2006" xmlns:a14="http://schemas.microsoft.com/office/drawing/2010/main">
+        <mc:Choice Requires="a14">
           <p:sp>
             <p:nvSpPr>
               <p:cNvPr id="19" name="TextBox 18">
@@ -16302,7 +16226,7 @@
             </p:txBody>
           </p:sp>
         </mc:Choice>
-        <mc:Fallback>
+        <mc:Fallback xmlns="">
           <p:sp>
             <p:nvSpPr>
               <p:cNvPr id="19" name="TextBox 18">
@@ -16510,8 +16434,8 @@
           </a:p>
         </p:txBody>
       </p:sp>
-      <mc:AlternateContent xmlns:mc="http://schemas.openxmlformats.org/markup-compatibility/2006">
-        <mc:Choice xmlns:a14="http://schemas.microsoft.com/office/drawing/2010/main" Requires="a14">
+      <mc:AlternateContent xmlns:mc="http://schemas.openxmlformats.org/markup-compatibility/2006" xmlns:a14="http://schemas.microsoft.com/office/drawing/2010/main">
+        <mc:Choice Requires="a14">
           <p:sp>
             <p:nvSpPr>
               <p:cNvPr id="4" name="TextBox 3">
@@ -16819,7 +16743,7 @@
             </p:txBody>
           </p:sp>
         </mc:Choice>
-        <mc:Fallback>
+        <mc:Fallback xmlns="">
           <p:sp>
             <p:nvSpPr>
               <p:cNvPr id="4" name="TextBox 3">
@@ -16864,8 +16788,8 @@
           </p:sp>
         </mc:Fallback>
       </mc:AlternateContent>
-      <mc:AlternateContent xmlns:mc="http://schemas.openxmlformats.org/markup-compatibility/2006">
-        <mc:Choice xmlns:a14="http://schemas.microsoft.com/office/drawing/2010/main" Requires="a14">
+      <mc:AlternateContent xmlns:mc="http://schemas.openxmlformats.org/markup-compatibility/2006" xmlns:a14="http://schemas.microsoft.com/office/drawing/2010/main">
+        <mc:Choice Requires="a14">
           <p:sp>
             <p:nvSpPr>
               <p:cNvPr id="5" name="TextBox 4">
@@ -17074,7 +16998,7 @@
             </p:txBody>
           </p:sp>
         </mc:Choice>
-        <mc:Fallback>
+        <mc:Fallback xmlns="">
           <p:sp>
             <p:nvSpPr>
               <p:cNvPr id="5" name="TextBox 4">
@@ -17119,8 +17043,8 @@
           </p:sp>
         </mc:Fallback>
       </mc:AlternateContent>
-      <mc:AlternateContent xmlns:mc="http://schemas.openxmlformats.org/markup-compatibility/2006">
-        <mc:Choice xmlns:a14="http://schemas.microsoft.com/office/drawing/2010/main" Requires="a14">
+      <mc:AlternateContent xmlns:mc="http://schemas.openxmlformats.org/markup-compatibility/2006" xmlns:a14="http://schemas.microsoft.com/office/drawing/2010/main">
+        <mc:Choice Requires="a14">
           <p:sp>
             <p:nvSpPr>
               <p:cNvPr id="6" name="TextBox 5">
@@ -17336,7 +17260,7 @@
             </p:txBody>
           </p:sp>
         </mc:Choice>
-        <mc:Fallback>
+        <mc:Fallback xmlns="">
           <p:sp>
             <p:nvSpPr>
               <p:cNvPr id="6" name="TextBox 5">
@@ -17381,8 +17305,8 @@
           </p:sp>
         </mc:Fallback>
       </mc:AlternateContent>
-      <mc:AlternateContent xmlns:mc="http://schemas.openxmlformats.org/markup-compatibility/2006">
-        <mc:Choice xmlns:a14="http://schemas.microsoft.com/office/drawing/2010/main" Requires="a14">
+      <mc:AlternateContent xmlns:mc="http://schemas.openxmlformats.org/markup-compatibility/2006" xmlns:a14="http://schemas.microsoft.com/office/drawing/2010/main">
+        <mc:Choice Requires="a14">
           <p:sp>
             <p:nvSpPr>
               <p:cNvPr id="7" name="TextBox 6">
@@ -17704,7 +17628,7 @@
             </p:txBody>
           </p:sp>
         </mc:Choice>
-        <mc:Fallback>
+        <mc:Fallback xmlns="">
           <p:sp>
             <p:nvSpPr>
               <p:cNvPr id="7" name="TextBox 6">
@@ -17749,8 +17673,8 @@
           </p:sp>
         </mc:Fallback>
       </mc:AlternateContent>
-      <mc:AlternateContent xmlns:mc="http://schemas.openxmlformats.org/markup-compatibility/2006">
-        <mc:Choice xmlns:a14="http://schemas.microsoft.com/office/drawing/2010/main" Requires="a14">
+      <mc:AlternateContent xmlns:mc="http://schemas.openxmlformats.org/markup-compatibility/2006" xmlns:a14="http://schemas.microsoft.com/office/drawing/2010/main">
+        <mc:Choice Requires="a14">
           <p:sp>
             <p:nvSpPr>
               <p:cNvPr id="8" name="TextBox 7">
@@ -18020,7 +17944,7 @@
             </p:txBody>
           </p:sp>
         </mc:Choice>
-        <mc:Fallback>
+        <mc:Fallback xmlns="">
           <p:sp>
             <p:nvSpPr>
               <p:cNvPr id="8" name="TextBox 7">
@@ -18081,8 +18005,8 @@
             </p:nvSpPr>
             <p:spPr>
               <a:xfrm>
-                <a:off x="3894694" y="827153"/>
-                <a:ext cx="3143512" cy="2186111"/>
+                <a:off x="3889494" y="844114"/>
+                <a:ext cx="2992964" cy="2463110"/>
               </a:xfrm>
               <a:prstGeom prst="rect">
                 <a:avLst/>
@@ -18114,6 +18038,7 @@
                 </a:endParaRPr>
               </a:p>
               <a:p>
+                <a:pPr algn="ctr"/>
                 <a:r>
                   <a:rPr lang="en-US" i="1" dirty="0">
                     <a:latin typeface="Cambria Math" panose="02040503050406030204" pitchFamily="18" charset="0"/>
@@ -18242,91 +18167,88 @@
                   <a:rPr lang="en-US" dirty="0">
                     <a:latin typeface="Cambria Math" panose="02040503050406030204" pitchFamily="18" charset="0"/>
                   </a:rPr>
-                  <a:t> is sufficiently </a:t>
+                  <a:t> is sufficiently small and </a:t>
                 </a:r>
               </a:p>
               <a:p>
-                <a:r>
-                  <a:rPr lang="en-US" dirty="0">
-                    <a:latin typeface="Cambria Math" panose="02040503050406030204" pitchFamily="18" charset="0"/>
-                  </a:rPr>
-                  <a:t>              small and </a:t>
-                </a:r>
+                <a:pPr algn="ctr"/>
                 <a14:m>
-                  <m:oMath xmlns:m="http://schemas.openxmlformats.org/officeDocument/2006/math">
-                    <m:sSub>
-                      <m:sSubPr>
-                        <m:ctrlPr>
-                          <a:rPr lang="en-US" b="0" i="1" smtClean="0">
-                            <a:latin typeface="Cambria Math" panose="02040503050406030204" pitchFamily="18" charset="0"/>
-                          </a:rPr>
-                        </m:ctrlPr>
-                      </m:sSubPr>
-                      <m:e>
-                        <m:r>
-                          <a:rPr lang="en-US" b="0" i="1" smtClean="0">
-                            <a:latin typeface="Cambria Math" panose="02040503050406030204" pitchFamily="18" charset="0"/>
-                          </a:rPr>
-                          <m:t>𝑞</m:t>
-                        </m:r>
-                      </m:e>
-                      <m:sub>
-                        <m:r>
-                          <a:rPr lang="en-US" b="0" i="1" smtClean="0">
-                            <a:latin typeface="Cambria Math" panose="02040503050406030204" pitchFamily="18" charset="0"/>
-                          </a:rPr>
-                          <m:t>2</m:t>
-                        </m:r>
-                      </m:sub>
-                    </m:sSub>
-                    <m:r>
-                      <a:rPr lang="en-US" b="0" i="1" smtClean="0">
-                        <a:latin typeface="Cambria Math" panose="02040503050406030204" pitchFamily="18" charset="0"/>
-                      </a:rPr>
-                      <m:t>&gt;</m:t>
-                    </m:r>
-                    <m:sSub>
-                      <m:sSubPr>
-                        <m:ctrlPr>
-                          <a:rPr lang="en-US" b="0" i="1" smtClean="0">
-                            <a:latin typeface="Cambria Math" panose="02040503050406030204" pitchFamily="18" charset="0"/>
-                          </a:rPr>
-                        </m:ctrlPr>
-                      </m:sSubPr>
-                      <m:e>
-                        <m:r>
-                          <a:rPr lang="en-US" b="0" i="1" smtClean="0">
-                            <a:latin typeface="Cambria Math" panose="02040503050406030204" pitchFamily="18" charset="0"/>
-                          </a:rPr>
-                          <m:t>𝑞</m:t>
-                        </m:r>
-                      </m:e>
-                      <m:sub>
-                        <m:r>
-                          <a:rPr lang="en-US" b="0" i="1" smtClean="0">
-                            <a:latin typeface="Cambria Math" panose="02040503050406030204" pitchFamily="18" charset="0"/>
-                          </a:rPr>
-                          <m:t>1</m:t>
-                        </m:r>
-                      </m:sub>
-                    </m:sSub>
-                  </m:oMath>
+                  <m:oMathPara xmlns:m="http://schemas.openxmlformats.org/officeDocument/2006/math">
+                    <m:oMathParaPr>
+                      <m:jc m:val="centerGroup"/>
+                    </m:oMathParaPr>
+                    <m:oMath xmlns:m="http://schemas.openxmlformats.org/officeDocument/2006/math">
+                      <m:sSub>
+                        <m:sSubPr>
+                          <m:ctrlPr>
+                            <a:rPr lang="en-US" b="0" i="1" smtClean="0">
+                              <a:latin typeface="Cambria Math" panose="02040503050406030204" pitchFamily="18" charset="0"/>
+                            </a:rPr>
+                          </m:ctrlPr>
+                        </m:sSubPr>
+                        <m:e>
+                          <m:r>
+                            <a:rPr lang="en-US" b="0" i="1" smtClean="0">
+                              <a:latin typeface="Cambria Math" panose="02040503050406030204" pitchFamily="18" charset="0"/>
+                            </a:rPr>
+                            <m:t>𝑞</m:t>
+                          </m:r>
+                        </m:e>
+                        <m:sub>
+                          <m:r>
+                            <a:rPr lang="en-US" b="0" i="1" smtClean="0">
+                              <a:latin typeface="Cambria Math" panose="02040503050406030204" pitchFamily="18" charset="0"/>
+                            </a:rPr>
+                            <m:t>2</m:t>
+                          </m:r>
+                        </m:sub>
+                      </m:sSub>
+                      <m:r>
+                        <a:rPr lang="en-US" b="0" i="1" smtClean="0">
+                          <a:latin typeface="Cambria Math" panose="02040503050406030204" pitchFamily="18" charset="0"/>
+                        </a:rPr>
+                        <m:t>&gt;</m:t>
+                      </m:r>
+                      <m:sSub>
+                        <m:sSubPr>
+                          <m:ctrlPr>
+                            <a:rPr lang="en-US" b="0" i="1" smtClean="0">
+                              <a:latin typeface="Cambria Math" panose="02040503050406030204" pitchFamily="18" charset="0"/>
+                            </a:rPr>
+                          </m:ctrlPr>
+                        </m:sSubPr>
+                        <m:e>
+                          <m:r>
+                            <a:rPr lang="en-US" b="0" i="1" smtClean="0">
+                              <a:latin typeface="Cambria Math" panose="02040503050406030204" pitchFamily="18" charset="0"/>
+                            </a:rPr>
+                            <m:t>𝑞</m:t>
+                          </m:r>
+                        </m:e>
+                        <m:sub>
+                          <m:r>
+                            <a:rPr lang="en-US" b="0" i="1" smtClean="0">
+                              <a:latin typeface="Cambria Math" panose="02040503050406030204" pitchFamily="18" charset="0"/>
+                            </a:rPr>
+                            <m:t>1</m:t>
+                          </m:r>
+                        </m:sub>
+                      </m:sSub>
+                    </m:oMath>
+                  </m:oMathPara>
                 </a14:m>
                 <a:endParaRPr lang="en-US" dirty="0"/>
               </a:p>
               <a:p>
-                <a:pPr/>
                 <a:endParaRPr lang="en-US" dirty="0"/>
               </a:p>
               <a:p>
-                <a:pPr/>
                 <a:r>
                   <a:rPr lang="en-US" dirty="0"/>
                   <a:t>Two additional steady states; </a:t>
                 </a:r>
               </a:p>
               <a:p>
-                <a:pPr/>
                 <a:r>
                   <a:rPr lang="en-US" dirty="0"/>
                   <a:t>one stable, one unstable.</a:t>
@@ -18352,8 +18274,8 @@
             </p:nvSpPr>
             <p:spPr>
               <a:xfrm>
-                <a:off x="3894694" y="827153"/>
-                <a:ext cx="3143512" cy="2186111"/>
+                <a:off x="3889494" y="844114"/>
+                <a:ext cx="2992964" cy="2463110"/>
               </a:xfrm>
               <a:prstGeom prst="rect">
                 <a:avLst/>
@@ -18361,7 +18283,7 @@
               <a:blipFill>
                 <a:blip r:embed="rId7"/>
                 <a:stretch>
-                  <a:fillRect l="-1544" t="-1944" r="-1544" b="-3333"/>
+                  <a:fillRect l="-1420" t="-1474" b="-2457"/>
                 </a:stretch>
               </a:blipFill>
               <a:ln>
@@ -18385,88 +18307,6 @@
           </p:sp>
         </mc:Fallback>
       </mc:AlternateContent>
-      <p:pic>
-        <p:nvPicPr>
-          <p:cNvPr id="9" name="Picture 8" descr="A screenshot of a cell phone&#10;&#10;Description generated with high confidence">
-            <a:extLst>
-              <a:ext uri="{FF2B5EF4-FFF2-40B4-BE49-F238E27FC236}">
-                <a16:creationId xmlns:a16="http://schemas.microsoft.com/office/drawing/2014/main" id="{C4C61BDB-2B12-40D5-86B3-B32A8D4A4635}"/>
-              </a:ext>
-            </a:extLst>
-          </p:cNvPr>
-          <p:cNvPicPr>
-            <a:picLocks noChangeAspect="1"/>
-          </p:cNvPicPr>
-          <p:nvPr/>
-        </p:nvPicPr>
-        <p:blipFill>
-          <a:blip r:embed="rId8">
-            <a:extLst>
-              <a:ext uri="{28A0092B-C50C-407E-A947-70E740481C1C}">
-                <a14:useLocalDpi xmlns:a14="http://schemas.microsoft.com/office/drawing/2010/main" val="0"/>
-              </a:ext>
-            </a:extLst>
-          </a:blip>
-          <a:stretch>
-            <a:fillRect/>
-          </a:stretch>
-        </p:blipFill>
-        <p:spPr>
-          <a:xfrm>
-            <a:off x="7089203" y="115475"/>
-            <a:ext cx="3653477" cy="2740108"/>
-          </a:xfrm>
-          <a:prstGeom prst="rect">
-            <a:avLst/>
-          </a:prstGeom>
-          <a:ln>
-            <a:solidFill>
-              <a:schemeClr val="tx1"/>
-            </a:solidFill>
-          </a:ln>
-        </p:spPr>
-      </p:pic>
-      <p:pic>
-        <p:nvPicPr>
-          <p:cNvPr id="11" name="Picture 10" descr="A screenshot of a cell phone&#10;&#10;Description generated with very high confidence">
-            <a:extLst>
-              <a:ext uri="{FF2B5EF4-FFF2-40B4-BE49-F238E27FC236}">
-                <a16:creationId xmlns:a16="http://schemas.microsoft.com/office/drawing/2014/main" id="{765C6F87-E915-4C0B-9635-5B72CD064E33}"/>
-              </a:ext>
-            </a:extLst>
-          </p:cNvPr>
-          <p:cNvPicPr>
-            <a:picLocks noChangeAspect="1"/>
-          </p:cNvPicPr>
-          <p:nvPr/>
-        </p:nvPicPr>
-        <p:blipFill>
-          <a:blip r:embed="rId9">
-            <a:extLst>
-              <a:ext uri="{28A0092B-C50C-407E-A947-70E740481C1C}">
-                <a14:useLocalDpi xmlns:a14="http://schemas.microsoft.com/office/drawing/2010/main" val="0"/>
-              </a:ext>
-            </a:extLst>
-          </a:blip>
-          <a:stretch>
-            <a:fillRect/>
-          </a:stretch>
-        </p:blipFill>
-        <p:spPr>
-          <a:xfrm>
-            <a:off x="9759142" y="1829949"/>
-            <a:ext cx="2315323" cy="1736492"/>
-          </a:xfrm>
-          <a:prstGeom prst="rect">
-            <a:avLst/>
-          </a:prstGeom>
-          <a:ln>
-            <a:solidFill>
-              <a:schemeClr val="tx1"/>
-            </a:solidFill>
-          </a:ln>
-        </p:spPr>
-      </p:pic>
       <p:sp>
         <p:nvSpPr>
           <p:cNvPr id="14" name="Title 1">
@@ -18521,8 +18361,8 @@
           </a:p>
         </p:txBody>
       </p:sp>
-      <mc:AlternateContent xmlns:mc="http://schemas.openxmlformats.org/markup-compatibility/2006">
-        <mc:Choice xmlns:a14="http://schemas.microsoft.com/office/drawing/2010/main" Requires="a14">
+      <mc:AlternateContent xmlns:mc="http://schemas.openxmlformats.org/markup-compatibility/2006" xmlns:a14="http://schemas.microsoft.com/office/drawing/2010/main">
+        <mc:Choice Requires="a14">
           <p:sp>
             <p:nvSpPr>
               <p:cNvPr id="15" name="TextBox 14">
@@ -18873,7 +18713,7 @@
             </p:txBody>
           </p:sp>
         </mc:Choice>
-        <mc:Fallback>
+        <mc:Fallback xmlns="">
           <p:sp>
             <p:nvSpPr>
               <p:cNvPr id="15" name="TextBox 14">
@@ -18918,8 +18758,8 @@
           </p:sp>
         </mc:Fallback>
       </mc:AlternateContent>
-      <mc:AlternateContent xmlns:mc="http://schemas.openxmlformats.org/markup-compatibility/2006">
-        <mc:Choice xmlns:a14="http://schemas.microsoft.com/office/drawing/2010/main" Requires="a14">
+      <mc:AlternateContent xmlns:mc="http://schemas.openxmlformats.org/markup-compatibility/2006" xmlns:a14="http://schemas.microsoft.com/office/drawing/2010/main">
+        <mc:Choice Requires="a14">
           <p:sp>
             <p:nvSpPr>
               <p:cNvPr id="16" name="TextBox 15">
@@ -19128,7 +18968,7 @@
             </p:txBody>
           </p:sp>
         </mc:Choice>
-        <mc:Fallback>
+        <mc:Fallback xmlns="">
           <p:sp>
             <p:nvSpPr>
               <p:cNvPr id="16" name="TextBox 15">
@@ -19173,8 +19013,8 @@
           </p:sp>
         </mc:Fallback>
       </mc:AlternateContent>
-      <mc:AlternateContent xmlns:mc="http://schemas.openxmlformats.org/markup-compatibility/2006">
-        <mc:Choice xmlns:a14="http://schemas.microsoft.com/office/drawing/2010/main" Requires="a14">
+      <mc:AlternateContent xmlns:mc="http://schemas.openxmlformats.org/markup-compatibility/2006" xmlns:a14="http://schemas.microsoft.com/office/drawing/2010/main">
+        <mc:Choice Requires="a14">
           <p:sp>
             <p:nvSpPr>
               <p:cNvPr id="17" name="TextBox 16">
@@ -19390,7 +19230,7 @@
             </p:txBody>
           </p:sp>
         </mc:Choice>
-        <mc:Fallback>
+        <mc:Fallback xmlns="">
           <p:sp>
             <p:nvSpPr>
               <p:cNvPr id="17" name="TextBox 16">
@@ -19435,8 +19275,8 @@
           </p:sp>
         </mc:Fallback>
       </mc:AlternateContent>
-      <mc:AlternateContent xmlns:mc="http://schemas.openxmlformats.org/markup-compatibility/2006">
-        <mc:Choice xmlns:a14="http://schemas.microsoft.com/office/drawing/2010/main" Requires="a14">
+      <mc:AlternateContent xmlns:mc="http://schemas.openxmlformats.org/markup-compatibility/2006" xmlns:a14="http://schemas.microsoft.com/office/drawing/2010/main">
+        <mc:Choice Requires="a14">
           <p:sp>
             <p:nvSpPr>
               <p:cNvPr id="18" name="TextBox 17">
@@ -19758,7 +19598,7 @@
             </p:txBody>
           </p:sp>
         </mc:Choice>
-        <mc:Fallback>
+        <mc:Fallback xmlns="">
           <p:sp>
             <p:nvSpPr>
               <p:cNvPr id="18" name="TextBox 17">
@@ -19803,8 +19643,8 @@
           </p:sp>
         </mc:Fallback>
       </mc:AlternateContent>
-      <mc:AlternateContent xmlns:mc="http://schemas.openxmlformats.org/markup-compatibility/2006">
-        <mc:Choice xmlns:a14="http://schemas.microsoft.com/office/drawing/2010/main" Requires="a14">
+      <mc:AlternateContent xmlns:mc="http://schemas.openxmlformats.org/markup-compatibility/2006" xmlns:a14="http://schemas.microsoft.com/office/drawing/2010/main">
+        <mc:Choice Requires="a14">
           <p:sp>
             <p:nvSpPr>
               <p:cNvPr id="19" name="TextBox 18">
@@ -20074,7 +19914,7 @@
             </p:txBody>
           </p:sp>
         </mc:Choice>
-        <mc:Fallback>
+        <mc:Fallback xmlns="">
           <p:sp>
             <p:nvSpPr>
               <p:cNvPr id="19" name="TextBox 18">
@@ -20358,7 +20198,7 @@
                               </a:solidFill>
                               <a:latin typeface="Cambria Math" panose="02040503050406030204" pitchFamily="18" charset="0"/>
                             </a:rPr>
-                            <m:t>2</m:t>
+                            <m:t>3</m:t>
                           </m:r>
                         </m:sub>
                       </m:sSub>
@@ -20444,7 +20284,7 @@
         </p:nvSpPr>
         <p:spPr>
           <a:xfrm>
-            <a:off x="3502173" y="5620528"/>
+            <a:off x="3596986" y="5356661"/>
             <a:ext cx="2279453" cy="923330"/>
           </a:xfrm>
           <a:prstGeom prst="rect">
@@ -20471,11 +20311,9 @@
             <a:endParaRPr lang="en-US" dirty="0"/>
           </a:p>
           <a:p>
-            <a:pPr/>
             <a:endParaRPr lang="en-US" dirty="0"/>
           </a:p>
           <a:p>
-            <a:pPr/>
             <a:r>
               <a:rPr lang="en-US" dirty="0"/>
               <a:t>No classical solutions.</a:t>
@@ -20565,6 +20403,88 @@
           </a:ln>
         </p:spPr>
       </p:pic>
+      <p:pic>
+        <p:nvPicPr>
+          <p:cNvPr id="10" name="Picture 9" descr="A close up of a logo&#10;&#10;Description generated with high confidence">
+            <a:extLst>
+              <a:ext uri="{FF2B5EF4-FFF2-40B4-BE49-F238E27FC236}">
+                <a16:creationId xmlns:a16="http://schemas.microsoft.com/office/drawing/2014/main" id="{BA7382C4-AB87-4412-BCD6-710075C2B526}"/>
+              </a:ext>
+            </a:extLst>
+          </p:cNvPr>
+          <p:cNvPicPr>
+            <a:picLocks noChangeAspect="1"/>
+          </p:cNvPicPr>
+          <p:nvPr/>
+        </p:nvPicPr>
+        <p:blipFill>
+          <a:blip r:embed="rId18">
+            <a:extLst>
+              <a:ext uri="{28A0092B-C50C-407E-A947-70E740481C1C}">
+                <a14:useLocalDpi xmlns:a14="http://schemas.microsoft.com/office/drawing/2010/main" val="0"/>
+              </a:ext>
+            </a:extLst>
+          </a:blip>
+          <a:stretch>
+            <a:fillRect/>
+          </a:stretch>
+        </p:blipFill>
+        <p:spPr>
+          <a:xfrm>
+            <a:off x="6979275" y="245977"/>
+            <a:ext cx="3812556" cy="2859417"/>
+          </a:xfrm>
+          <a:prstGeom prst="rect">
+            <a:avLst/>
+          </a:prstGeom>
+          <a:ln>
+            <a:solidFill>
+              <a:schemeClr val="tx1"/>
+            </a:solidFill>
+          </a:ln>
+        </p:spPr>
+      </p:pic>
+      <p:pic>
+        <p:nvPicPr>
+          <p:cNvPr id="13" name="Picture 12" descr="A screenshot of a cell phone&#10;&#10;Description generated with very high confidence">
+            <a:extLst>
+              <a:ext uri="{FF2B5EF4-FFF2-40B4-BE49-F238E27FC236}">
+                <a16:creationId xmlns:a16="http://schemas.microsoft.com/office/drawing/2014/main" id="{DEDB5218-1CB5-4FC6-8A6E-B50D0FE9EC42}"/>
+              </a:ext>
+            </a:extLst>
+          </p:cNvPr>
+          <p:cNvPicPr>
+            <a:picLocks noChangeAspect="1"/>
+          </p:cNvPicPr>
+          <p:nvPr/>
+        </p:nvPicPr>
+        <p:blipFill>
+          <a:blip r:embed="rId19">
+            <a:extLst>
+              <a:ext uri="{28A0092B-C50C-407E-A947-70E740481C1C}">
+                <a14:useLocalDpi xmlns:a14="http://schemas.microsoft.com/office/drawing/2010/main" val="0"/>
+              </a:ext>
+            </a:extLst>
+          </a:blip>
+          <a:stretch>
+            <a:fillRect/>
+          </a:stretch>
+        </p:blipFill>
+        <p:spPr>
+          <a:xfrm>
+            <a:off x="9803472" y="2148937"/>
+            <a:ext cx="2304872" cy="1728654"/>
+          </a:xfrm>
+          <a:prstGeom prst="rect">
+            <a:avLst/>
+          </a:prstGeom>
+          <a:ln>
+            <a:solidFill>
+              <a:schemeClr val="tx1"/>
+            </a:solidFill>
+          </a:ln>
+        </p:spPr>
+      </p:pic>
     </p:spTree>
     <p:extLst>
       <p:ext uri="{BB962C8B-B14F-4D97-AF65-F5344CB8AC3E}">
@@ -20613,8 +20533,8 @@
         </p:nvSpPr>
         <p:spPr>
           <a:xfrm>
-            <a:off x="1112697" y="1281261"/>
-            <a:ext cx="4182425" cy="3897246"/>
+            <a:off x="4279064" y="947650"/>
+            <a:ext cx="3633871" cy="4547063"/>
           </a:xfrm>
           <a:ln w="38100">
             <a:solidFill>
@@ -20631,12 +20551,9 @@
           </a:bodyPr>
           <a:lstStyle/>
           <a:p>
-            <a:pPr marL="0" indent="0">
-              <a:buNone/>
-            </a:pPr>
             <a:r>
-              <a:rPr lang="en-US" sz="2000" b="1" dirty="0"/>
-              <a:t>Reproducibility:</a:t>
+              <a:rPr lang="en-US" sz="2000" dirty="0"/>
+              <a:t>Actually commented my code for once.</a:t>
             </a:r>
           </a:p>
           <a:p>
@@ -20656,14 +20573,14 @@
             <a:pPr lvl="1"/>
             <a:r>
               <a:rPr lang="en-US" sz="2000" dirty="0"/>
-              <a:t>Describes all other non-figure files</a:t>
+              <a:t>describes all other non-figure files</a:t>
             </a:r>
           </a:p>
           <a:p>
             <a:pPr lvl="1"/>
             <a:r>
               <a:rPr lang="en-US" sz="2000" dirty="0"/>
-              <a:t>Explains system for naming files</a:t>
+              <a:t>records system for naming files</a:t>
             </a:r>
           </a:p>
           <a:p>
@@ -20697,8 +20614,8 @@
         </p:nvSpPr>
         <p:spPr>
           <a:xfrm>
-            <a:off x="6261046" y="1822973"/>
-            <a:ext cx="4182425" cy="2813821"/>
+            <a:off x="8295320" y="947650"/>
+            <a:ext cx="3633871" cy="3265802"/>
           </a:xfrm>
           <a:prstGeom prst="rect">
             <a:avLst/>
@@ -20714,7 +20631,7 @@
         </p:spPr>
         <p:txBody>
           <a:bodyPr vert="horz" lIns="91440" tIns="45720" rIns="91440" bIns="45720" rtlCol="0">
-            <a:normAutofit lnSpcReduction="10000"/>
+            <a:normAutofit/>
           </a:bodyPr>
           <a:lstStyle>
             <a:lvl1pPr marL="228600" indent="-228600" algn="l" defTabSz="914400" rtl="0" eaLnBrk="1" latinLnBrk="0" hangingPunct="1">
@@ -20881,16 +20798,6 @@
             </a:lvl9pPr>
           </a:lstStyle>
           <a:p>
-            <a:pPr marL="0" indent="0">
-              <a:buFont typeface="Arial" panose="020B0604020202020204" pitchFamily="34" charset="0"/>
-              <a:buNone/>
-            </a:pPr>
-            <a:r>
-              <a:rPr lang="en-US" sz="2000" b="1" dirty="0"/>
-              <a:t>Next steps:</a:t>
-            </a:r>
-          </a:p>
-          <a:p>
             <a:r>
               <a:rPr lang="en-US" sz="2000" dirty="0"/>
               <a:t>Finalize rigorous analysis of what occurs at steady states when cheater introduced. </a:t>
@@ -20920,6 +20827,370 @@
               <a:rPr lang="en-US" sz="2000" dirty="0"/>
               <a:t>Take the nap </a:t>
             </a:r>
+          </a:p>
+        </p:txBody>
+      </p:sp>
+      <p:sp>
+        <p:nvSpPr>
+          <p:cNvPr id="4" name="Content Placeholder 2">
+            <a:extLst>
+              <a:ext uri="{FF2B5EF4-FFF2-40B4-BE49-F238E27FC236}">
+                <a16:creationId xmlns:a16="http://schemas.microsoft.com/office/drawing/2014/main" id="{89B3CF3C-5BB5-45C5-9D32-6C038A9837F9}"/>
+              </a:ext>
+            </a:extLst>
+          </p:cNvPr>
+          <p:cNvSpPr txBox="1">
+            <a:spLocks/>
+          </p:cNvSpPr>
+          <p:nvPr/>
+        </p:nvSpPr>
+        <p:spPr>
+          <a:xfrm>
+            <a:off x="262809" y="947650"/>
+            <a:ext cx="3633871" cy="5335787"/>
+          </a:xfrm>
+          <a:prstGeom prst="rect">
+            <a:avLst/>
+          </a:prstGeom>
+          <a:ln w="38100">
+            <a:solidFill>
+              <a:schemeClr val="tx1">
+                <a:lumMod val="50000"/>
+                <a:lumOff val="50000"/>
+              </a:schemeClr>
+            </a:solidFill>
+          </a:ln>
+        </p:spPr>
+        <p:txBody>
+          <a:bodyPr vert="horz" lIns="91440" tIns="45720" rIns="91440" bIns="45720" rtlCol="0">
+            <a:noAutofit/>
+          </a:bodyPr>
+          <a:lstStyle>
+            <a:lvl1pPr marL="228600" indent="-228600" algn="l" defTabSz="914400" rtl="0" eaLnBrk="1" latinLnBrk="0" hangingPunct="1">
+              <a:lnSpc>
+                <a:spcPct val="90000"/>
+              </a:lnSpc>
+              <a:spcBef>
+                <a:spcPts val="1000"/>
+              </a:spcBef>
+              <a:buFont typeface="Arial" panose="020B0604020202020204" pitchFamily="34" charset="0"/>
+              <a:buChar char="•"/>
+              <a:defRPr sz="2800" kern="1200">
+                <a:solidFill>
+                  <a:schemeClr val="tx1"/>
+                </a:solidFill>
+                <a:latin typeface="+mn-lt"/>
+                <a:ea typeface="+mn-ea"/>
+                <a:cs typeface="+mn-cs"/>
+              </a:defRPr>
+            </a:lvl1pPr>
+            <a:lvl2pPr marL="685800" indent="-228600" algn="l" defTabSz="914400" rtl="0" eaLnBrk="1" latinLnBrk="0" hangingPunct="1">
+              <a:lnSpc>
+                <a:spcPct val="90000"/>
+              </a:lnSpc>
+              <a:spcBef>
+                <a:spcPts val="500"/>
+              </a:spcBef>
+              <a:buFont typeface="Arial" panose="020B0604020202020204" pitchFamily="34" charset="0"/>
+              <a:buChar char="•"/>
+              <a:defRPr sz="2400" kern="1200">
+                <a:solidFill>
+                  <a:schemeClr val="tx1"/>
+                </a:solidFill>
+                <a:latin typeface="+mn-lt"/>
+                <a:ea typeface="+mn-ea"/>
+                <a:cs typeface="+mn-cs"/>
+              </a:defRPr>
+            </a:lvl2pPr>
+            <a:lvl3pPr marL="1143000" indent="-228600" algn="l" defTabSz="914400" rtl="0" eaLnBrk="1" latinLnBrk="0" hangingPunct="1">
+              <a:lnSpc>
+                <a:spcPct val="90000"/>
+              </a:lnSpc>
+              <a:spcBef>
+                <a:spcPts val="500"/>
+              </a:spcBef>
+              <a:buFont typeface="Arial" panose="020B0604020202020204" pitchFamily="34" charset="0"/>
+              <a:buChar char="•"/>
+              <a:defRPr sz="2000" kern="1200">
+                <a:solidFill>
+                  <a:schemeClr val="tx1"/>
+                </a:solidFill>
+                <a:latin typeface="+mn-lt"/>
+                <a:ea typeface="+mn-ea"/>
+                <a:cs typeface="+mn-cs"/>
+              </a:defRPr>
+            </a:lvl3pPr>
+            <a:lvl4pPr marL="1600200" indent="-228600" algn="l" defTabSz="914400" rtl="0" eaLnBrk="1" latinLnBrk="0" hangingPunct="1">
+              <a:lnSpc>
+                <a:spcPct val="90000"/>
+              </a:lnSpc>
+              <a:spcBef>
+                <a:spcPts val="500"/>
+              </a:spcBef>
+              <a:buFont typeface="Arial" panose="020B0604020202020204" pitchFamily="34" charset="0"/>
+              <a:buChar char="•"/>
+              <a:defRPr sz="1800" kern="1200">
+                <a:solidFill>
+                  <a:schemeClr val="tx1"/>
+                </a:solidFill>
+                <a:latin typeface="+mn-lt"/>
+                <a:ea typeface="+mn-ea"/>
+                <a:cs typeface="+mn-cs"/>
+              </a:defRPr>
+            </a:lvl4pPr>
+            <a:lvl5pPr marL="2057400" indent="-228600" algn="l" defTabSz="914400" rtl="0" eaLnBrk="1" latinLnBrk="0" hangingPunct="1">
+              <a:lnSpc>
+                <a:spcPct val="90000"/>
+              </a:lnSpc>
+              <a:spcBef>
+                <a:spcPts val="500"/>
+              </a:spcBef>
+              <a:buFont typeface="Arial" panose="020B0604020202020204" pitchFamily="34" charset="0"/>
+              <a:buChar char="•"/>
+              <a:defRPr sz="1800" kern="1200">
+                <a:solidFill>
+                  <a:schemeClr val="tx1"/>
+                </a:solidFill>
+                <a:latin typeface="+mn-lt"/>
+                <a:ea typeface="+mn-ea"/>
+                <a:cs typeface="+mn-cs"/>
+              </a:defRPr>
+            </a:lvl5pPr>
+            <a:lvl6pPr marL="2514600" indent="-228600" algn="l" defTabSz="914400" rtl="0" eaLnBrk="1" latinLnBrk="0" hangingPunct="1">
+              <a:lnSpc>
+                <a:spcPct val="90000"/>
+              </a:lnSpc>
+              <a:spcBef>
+                <a:spcPts val="500"/>
+              </a:spcBef>
+              <a:buFont typeface="Arial" panose="020B0604020202020204" pitchFamily="34" charset="0"/>
+              <a:buChar char="•"/>
+              <a:defRPr sz="1800" kern="1200">
+                <a:solidFill>
+                  <a:schemeClr val="tx1"/>
+                </a:solidFill>
+                <a:latin typeface="+mn-lt"/>
+                <a:ea typeface="+mn-ea"/>
+                <a:cs typeface="+mn-cs"/>
+              </a:defRPr>
+            </a:lvl6pPr>
+            <a:lvl7pPr marL="2971800" indent="-228600" algn="l" defTabSz="914400" rtl="0" eaLnBrk="1" latinLnBrk="0" hangingPunct="1">
+              <a:lnSpc>
+                <a:spcPct val="90000"/>
+              </a:lnSpc>
+              <a:spcBef>
+                <a:spcPts val="500"/>
+              </a:spcBef>
+              <a:buFont typeface="Arial" panose="020B0604020202020204" pitchFamily="34" charset="0"/>
+              <a:buChar char="•"/>
+              <a:defRPr sz="1800" kern="1200">
+                <a:solidFill>
+                  <a:schemeClr val="tx1"/>
+                </a:solidFill>
+                <a:latin typeface="+mn-lt"/>
+                <a:ea typeface="+mn-ea"/>
+                <a:cs typeface="+mn-cs"/>
+              </a:defRPr>
+            </a:lvl7pPr>
+            <a:lvl8pPr marL="3429000" indent="-228600" algn="l" defTabSz="914400" rtl="0" eaLnBrk="1" latinLnBrk="0" hangingPunct="1">
+              <a:lnSpc>
+                <a:spcPct val="90000"/>
+              </a:lnSpc>
+              <a:spcBef>
+                <a:spcPts val="500"/>
+              </a:spcBef>
+              <a:buFont typeface="Arial" panose="020B0604020202020204" pitchFamily="34" charset="0"/>
+              <a:buChar char="•"/>
+              <a:defRPr sz="1800" kern="1200">
+                <a:solidFill>
+                  <a:schemeClr val="tx1"/>
+                </a:solidFill>
+                <a:latin typeface="+mn-lt"/>
+                <a:ea typeface="+mn-ea"/>
+                <a:cs typeface="+mn-cs"/>
+              </a:defRPr>
+            </a:lvl8pPr>
+            <a:lvl9pPr marL="3886200" indent="-228600" algn="l" defTabSz="914400" rtl="0" eaLnBrk="1" latinLnBrk="0" hangingPunct="1">
+              <a:lnSpc>
+                <a:spcPct val="90000"/>
+              </a:lnSpc>
+              <a:spcBef>
+                <a:spcPts val="500"/>
+              </a:spcBef>
+              <a:buFont typeface="Arial" panose="020B0604020202020204" pitchFamily="34" charset="0"/>
+              <a:buChar char="•"/>
+              <a:defRPr sz="1800" kern="1200">
+                <a:solidFill>
+                  <a:schemeClr val="tx1"/>
+                </a:solidFill>
+                <a:latin typeface="+mn-lt"/>
+                <a:ea typeface="+mn-ea"/>
+                <a:cs typeface="+mn-cs"/>
+              </a:defRPr>
+            </a:lvl9pPr>
+          </a:lstStyle>
+          <a:p>
+            <a:r>
+              <a:rPr lang="en-US" sz="2000" dirty="0"/>
+              <a:t>The power of doing mathematical analysis before numerical simulations.</a:t>
+            </a:r>
+          </a:p>
+          <a:p>
+            <a:r>
+              <a:rPr lang="en-US" sz="2000" dirty="0"/>
+              <a:t>Coding best practices:</a:t>
+            </a:r>
+          </a:p>
+          <a:p>
+            <a:pPr lvl="1"/>
+            <a:r>
+              <a:rPr lang="en-US" sz="2000" dirty="0"/>
+              <a:t>So, maybe I’m finally convinced of the importance of commenting code and not using silly variable names.</a:t>
+            </a:r>
+          </a:p>
+          <a:p>
+            <a:r>
+              <a:rPr lang="en-US" sz="2000" dirty="0"/>
+              <a:t>Having a workflow (AKA a roadmap of goals) increased my productivity by narrowing my focus to the immediate steps.</a:t>
+            </a:r>
+          </a:p>
+          <a:p>
+            <a:r>
+              <a:rPr lang="en-US" sz="2000" dirty="0"/>
+              <a:t>Sometimes what you set out to prove is different from what you find.</a:t>
+            </a:r>
+          </a:p>
+          <a:p>
+            <a:endParaRPr lang="en-US" sz="2000" dirty="0"/>
+          </a:p>
+          <a:p>
+            <a:endParaRPr lang="en-US" sz="2000" dirty="0"/>
+          </a:p>
+          <a:p>
+            <a:endParaRPr lang="en-US" sz="2000" dirty="0"/>
+          </a:p>
+          <a:p>
+            <a:endParaRPr lang="en-US" sz="2000" dirty="0"/>
+          </a:p>
+        </p:txBody>
+      </p:sp>
+      <p:sp>
+        <p:nvSpPr>
+          <p:cNvPr id="2" name="TextBox 1">
+            <a:extLst>
+              <a:ext uri="{FF2B5EF4-FFF2-40B4-BE49-F238E27FC236}">
+                <a16:creationId xmlns:a16="http://schemas.microsoft.com/office/drawing/2014/main" id="{96C4B274-4CAC-4756-8A10-37207CB6C563}"/>
+              </a:ext>
+            </a:extLst>
+          </p:cNvPr>
+          <p:cNvSpPr txBox="1"/>
+          <p:nvPr/>
+        </p:nvSpPr>
+        <p:spPr>
+          <a:xfrm>
+            <a:off x="403804" y="312953"/>
+            <a:ext cx="3351880" cy="523220"/>
+          </a:xfrm>
+          <a:prstGeom prst="rect">
+            <a:avLst/>
+          </a:prstGeom>
+          <a:noFill/>
+        </p:spPr>
+        <p:txBody>
+          <a:bodyPr wrap="none" rtlCol="0">
+            <a:spAutoFit/>
+          </a:bodyPr>
+          <a:lstStyle/>
+          <a:p>
+            <a:r>
+              <a:rPr lang="en-US" sz="2800" b="1" dirty="0">
+                <a:latin typeface="+mj-lt"/>
+              </a:rPr>
+              <a:t>Useful things I learned</a:t>
+            </a:r>
+            <a:endParaRPr lang="en-US" b="1" dirty="0">
+              <a:latin typeface="+mj-lt"/>
+            </a:endParaRPr>
+          </a:p>
+        </p:txBody>
+      </p:sp>
+      <p:sp>
+        <p:nvSpPr>
+          <p:cNvPr id="7" name="TextBox 6">
+            <a:extLst>
+              <a:ext uri="{FF2B5EF4-FFF2-40B4-BE49-F238E27FC236}">
+                <a16:creationId xmlns:a16="http://schemas.microsoft.com/office/drawing/2014/main" id="{98D09B9F-27C2-4573-B89E-A486182630E3}"/>
+              </a:ext>
+            </a:extLst>
+          </p:cNvPr>
+          <p:cNvSpPr txBox="1"/>
+          <p:nvPr/>
+        </p:nvSpPr>
+        <p:spPr>
+          <a:xfrm>
+            <a:off x="4279064" y="312953"/>
+            <a:ext cx="2305888" cy="523220"/>
+          </a:xfrm>
+          <a:prstGeom prst="rect">
+            <a:avLst/>
+          </a:prstGeom>
+          <a:noFill/>
+        </p:spPr>
+        <p:txBody>
+          <a:bodyPr wrap="none" rtlCol="0">
+            <a:spAutoFit/>
+          </a:bodyPr>
+          <a:lstStyle/>
+          <a:p>
+            <a:r>
+              <a:rPr lang="en-US" sz="2800" b="1" dirty="0">
+                <a:latin typeface="+mj-lt"/>
+              </a:rPr>
+              <a:t>Reproducibility</a:t>
+            </a:r>
+            <a:endParaRPr lang="en-US" b="1" dirty="0">
+              <a:latin typeface="+mj-lt"/>
+            </a:endParaRPr>
+          </a:p>
+        </p:txBody>
+      </p:sp>
+      <p:sp>
+        <p:nvSpPr>
+          <p:cNvPr id="8" name="TextBox 7">
+            <a:extLst>
+              <a:ext uri="{FF2B5EF4-FFF2-40B4-BE49-F238E27FC236}">
+                <a16:creationId xmlns:a16="http://schemas.microsoft.com/office/drawing/2014/main" id="{09FA8997-709D-4126-8CC1-4A6713FD61EB}"/>
+              </a:ext>
+            </a:extLst>
+          </p:cNvPr>
+          <p:cNvSpPr txBox="1"/>
+          <p:nvPr/>
+        </p:nvSpPr>
+        <p:spPr>
+          <a:xfrm>
+            <a:off x="8295320" y="312953"/>
+            <a:ext cx="1687513" cy="523220"/>
+          </a:xfrm>
+          <a:prstGeom prst="rect">
+            <a:avLst/>
+          </a:prstGeom>
+          <a:noFill/>
+        </p:spPr>
+        <p:txBody>
+          <a:bodyPr wrap="none" rtlCol="0">
+            <a:spAutoFit/>
+          </a:bodyPr>
+          <a:lstStyle/>
+          <a:p>
+            <a:r>
+              <a:rPr lang="en-US" sz="2800" b="1" dirty="0">
+                <a:latin typeface="+mj-lt"/>
+              </a:rPr>
+              <a:t>Next Steps</a:t>
+            </a:r>
+            <a:endParaRPr lang="en-US" b="1" dirty="0">
+              <a:latin typeface="+mj-lt"/>
+            </a:endParaRPr>
           </a:p>
         </p:txBody>
       </p:sp>

</xml_diff>

<commit_message>
minor text alignment changes
</commit_message>
<xml_diff>
--- a/Products/AW_fin.pptx
+++ b/Products/AW_fin.pptx
@@ -264,7 +264,7 @@
           <a:p>
             <a:fld id="{F60B097C-15D3-4C10-907C-9D6BDD5AB733}" type="datetimeFigureOut">
               <a:rPr lang="en-US" smtClean="0"/>
-              <a:t>6/4/2019</a:t>
+              <a:t>6/8/2019</a:t>
             </a:fld>
             <a:endParaRPr lang="en-US"/>
           </a:p>
@@ -462,7 +462,7 @@
           <a:p>
             <a:fld id="{F60B097C-15D3-4C10-907C-9D6BDD5AB733}" type="datetimeFigureOut">
               <a:rPr lang="en-US" smtClean="0"/>
-              <a:t>6/4/2019</a:t>
+              <a:t>6/8/2019</a:t>
             </a:fld>
             <a:endParaRPr lang="en-US"/>
           </a:p>
@@ -670,7 +670,7 @@
           <a:p>
             <a:fld id="{F60B097C-15D3-4C10-907C-9D6BDD5AB733}" type="datetimeFigureOut">
               <a:rPr lang="en-US" smtClean="0"/>
-              <a:t>6/4/2019</a:t>
+              <a:t>6/8/2019</a:t>
             </a:fld>
             <a:endParaRPr lang="en-US"/>
           </a:p>
@@ -868,7 +868,7 @@
           <a:p>
             <a:fld id="{F60B097C-15D3-4C10-907C-9D6BDD5AB733}" type="datetimeFigureOut">
               <a:rPr lang="en-US" smtClean="0"/>
-              <a:t>6/4/2019</a:t>
+              <a:t>6/8/2019</a:t>
             </a:fld>
             <a:endParaRPr lang="en-US"/>
           </a:p>
@@ -1143,7 +1143,7 @@
           <a:p>
             <a:fld id="{F60B097C-15D3-4C10-907C-9D6BDD5AB733}" type="datetimeFigureOut">
               <a:rPr lang="en-US" smtClean="0"/>
-              <a:t>6/4/2019</a:t>
+              <a:t>6/8/2019</a:t>
             </a:fld>
             <a:endParaRPr lang="en-US"/>
           </a:p>
@@ -1408,7 +1408,7 @@
           <a:p>
             <a:fld id="{F60B097C-15D3-4C10-907C-9D6BDD5AB733}" type="datetimeFigureOut">
               <a:rPr lang="en-US" smtClean="0"/>
-              <a:t>6/4/2019</a:t>
+              <a:t>6/8/2019</a:t>
             </a:fld>
             <a:endParaRPr lang="en-US"/>
           </a:p>
@@ -1820,7 +1820,7 @@
           <a:p>
             <a:fld id="{F60B097C-15D3-4C10-907C-9D6BDD5AB733}" type="datetimeFigureOut">
               <a:rPr lang="en-US" smtClean="0"/>
-              <a:t>6/4/2019</a:t>
+              <a:t>6/8/2019</a:t>
             </a:fld>
             <a:endParaRPr lang="en-US"/>
           </a:p>
@@ -1961,7 +1961,7 @@
           <a:p>
             <a:fld id="{F60B097C-15D3-4C10-907C-9D6BDD5AB733}" type="datetimeFigureOut">
               <a:rPr lang="en-US" smtClean="0"/>
-              <a:t>6/4/2019</a:t>
+              <a:t>6/8/2019</a:t>
             </a:fld>
             <a:endParaRPr lang="en-US"/>
           </a:p>
@@ -2074,7 +2074,7 @@
           <a:p>
             <a:fld id="{F60B097C-15D3-4C10-907C-9D6BDD5AB733}" type="datetimeFigureOut">
               <a:rPr lang="en-US" smtClean="0"/>
-              <a:t>6/4/2019</a:t>
+              <a:t>6/8/2019</a:t>
             </a:fld>
             <a:endParaRPr lang="en-US"/>
           </a:p>
@@ -2385,7 +2385,7 @@
           <a:p>
             <a:fld id="{F60B097C-15D3-4C10-907C-9D6BDD5AB733}" type="datetimeFigureOut">
               <a:rPr lang="en-US" smtClean="0"/>
-              <a:t>6/4/2019</a:t>
+              <a:t>6/8/2019</a:t>
             </a:fld>
             <a:endParaRPr lang="en-US"/>
           </a:p>
@@ -2673,7 +2673,7 @@
           <a:p>
             <a:fld id="{F60B097C-15D3-4C10-907C-9D6BDD5AB733}" type="datetimeFigureOut">
               <a:rPr lang="en-US" smtClean="0"/>
-              <a:t>6/4/2019</a:t>
+              <a:t>6/8/2019</a:t>
             </a:fld>
             <a:endParaRPr lang="en-US"/>
           </a:p>
@@ -2914,7 +2914,7 @@
           <a:p>
             <a:fld id="{F60B097C-15D3-4C10-907C-9D6BDD5AB733}" type="datetimeFigureOut">
               <a:rPr lang="en-US" smtClean="0"/>
-              <a:t>6/4/2019</a:t>
+              <a:t>6/8/2019</a:t>
             </a:fld>
             <a:endParaRPr lang="en-US"/>
           </a:p>
@@ -8898,8 +8898,8 @@
           </p:sp>
         </mc:Fallback>
       </mc:AlternateContent>
-      <mc:AlternateContent xmlns:mc="http://schemas.openxmlformats.org/markup-compatibility/2006">
-        <mc:Choice xmlns:a14="http://schemas.microsoft.com/office/drawing/2010/main" Requires="a14">
+      <mc:AlternateContent xmlns:mc="http://schemas.openxmlformats.org/markup-compatibility/2006" xmlns:a14="http://schemas.microsoft.com/office/drawing/2010/main">
+        <mc:Choice Requires="a14">
           <p:sp>
             <p:nvSpPr>
               <p:cNvPr id="169" name="TextBox 168">
@@ -9164,7 +9164,7 @@
             </p:txBody>
           </p:sp>
         </mc:Choice>
-        <mc:Fallback>
+        <mc:Fallback xmlns="">
           <p:sp>
             <p:nvSpPr>
               <p:cNvPr id="169" name="TextBox 168">
@@ -12721,8 +12721,8 @@
           </p:sp>
         </mc:Fallback>
       </mc:AlternateContent>
-      <mc:AlternateContent xmlns:mc="http://schemas.openxmlformats.org/markup-compatibility/2006">
-        <mc:Choice xmlns:a14="http://schemas.microsoft.com/office/drawing/2010/main" Requires="a14">
+      <mc:AlternateContent xmlns:mc="http://schemas.openxmlformats.org/markup-compatibility/2006" xmlns:a14="http://schemas.microsoft.com/office/drawing/2010/main">
+        <mc:Choice Requires="a14">
           <p:sp>
             <p:nvSpPr>
               <p:cNvPr id="28" name="TextBox 27">
@@ -12987,7 +12987,7 @@
             </p:txBody>
           </p:sp>
         </mc:Choice>
-        <mc:Fallback>
+        <mc:Fallback xmlns="">
           <p:sp>
             <p:nvSpPr>
               <p:cNvPr id="28" name="TextBox 27">
@@ -17989,8 +17989,8 @@
           </p:sp>
         </mc:Fallback>
       </mc:AlternateContent>
-      <mc:AlternateContent xmlns:mc="http://schemas.openxmlformats.org/markup-compatibility/2006">
-        <mc:Choice xmlns:a14="http://schemas.microsoft.com/office/drawing/2010/main" Requires="a14">
+      <mc:AlternateContent xmlns:mc="http://schemas.openxmlformats.org/markup-compatibility/2006" xmlns:a14="http://schemas.microsoft.com/office/drawing/2010/main">
+        <mc:Choice Requires="a14">
           <p:sp>
             <p:nvSpPr>
               <p:cNvPr id="28" name="Rectangle 27">
@@ -18257,7 +18257,7 @@
             </p:txBody>
           </p:sp>
         </mc:Choice>
-        <mc:Fallback>
+        <mc:Fallback xmlns="">
           <p:sp>
             <p:nvSpPr>
               <p:cNvPr id="28" name="Rectangle 27">
@@ -19959,8 +19959,8 @@
           </p:sp>
         </mc:Fallback>
       </mc:AlternateContent>
-      <mc:AlternateContent xmlns:mc="http://schemas.openxmlformats.org/markup-compatibility/2006">
-        <mc:Choice xmlns:a14="http://schemas.microsoft.com/office/drawing/2010/main" Requires="a14">
+      <mc:AlternateContent xmlns:mc="http://schemas.openxmlformats.org/markup-compatibility/2006" xmlns:a14="http://schemas.microsoft.com/office/drawing/2010/main">
+        <mc:Choice Requires="a14">
           <p:sp>
             <p:nvSpPr>
               <p:cNvPr id="20" name="TextBox 19">
@@ -20225,7 +20225,7 @@
             </p:txBody>
           </p:sp>
         </mc:Choice>
-        <mc:Fallback>
+        <mc:Fallback xmlns="">
           <p:sp>
             <p:nvSpPr>
               <p:cNvPr id="20" name="TextBox 19">
@@ -20846,8 +20846,8 @@
         </p:nvSpPr>
         <p:spPr>
           <a:xfrm>
-            <a:off x="262809" y="947650"/>
-            <a:ext cx="3633871" cy="5335787"/>
+            <a:off x="262809" y="947651"/>
+            <a:ext cx="3633871" cy="5112908"/>
           </a:xfrm>
           <a:prstGeom prst="rect">
             <a:avLst/>
@@ -21051,7 +21051,7 @@
           <a:p>
             <a:r>
               <a:rPr lang="en-US" sz="2000" dirty="0"/>
-              <a:t>Having a workflow (AKA a roadmap of goals) increased my productivity by narrowing my focus to the immediate steps.</a:t>
+              <a:t>Having a workflow increased my productivity by narrowing my focus to the immediate steps.</a:t>
             </a:r>
           </a:p>
           <a:p>
@@ -21059,9 +21059,6 @@
               <a:rPr lang="en-US" sz="2000" dirty="0"/>
               <a:t>Sometimes what you set out to prove is different from what you find.</a:t>
             </a:r>
-          </a:p>
-          <a:p>
-            <a:endParaRPr lang="en-US" sz="2000" dirty="0"/>
           </a:p>
           <a:p>
             <a:endParaRPr lang="en-US" sz="2000" dirty="0"/>
@@ -21088,7 +21085,7 @@
         </p:nvSpPr>
         <p:spPr>
           <a:xfrm>
-            <a:off x="403804" y="312953"/>
+            <a:off x="262809" y="312953"/>
             <a:ext cx="3351880" cy="523220"/>
           </a:xfrm>
           <a:prstGeom prst="rect">

</xml_diff>